<commit_message>
modified:   group_assigment/group_assigment.pptx 	modified:   lectures/01.md 	modified:   lectures/faculty.md
</commit_message>
<xml_diff>
--- a/group_assigment/group_assigment.pptx
+++ b/group_assigment/group_assigment.pptx
@@ -122,9 +122,9 @@
   <p:cSld name="Title Slide">
     <p:spTree>
       <p:nvGrpSpPr>
-        <p:cNvPr id="1" name=""/>
+        <p:cNvPr id="1" name="" hidden="0"/>
         <p:cNvGrpSpPr/>
-        <p:nvPr/>
+        <p:nvPr isPhoto="0" userDrawn="0"/>
       </p:nvGrpSpPr>
       <p:grpSpPr bwMode="auto">
         <a:xfrm>
@@ -136,11 +136,11 @@
       </p:grpSpPr>
       <p:sp>
         <p:nvSpPr>
-          <p:cNvPr id="13" name="Shape 1059"/>
+          <p:cNvPr id="13" name="Shape 1059" hidden="0"/>
           <p:cNvSpPr>
             <a:spLocks noChangeArrowheads="1" noGrp="1"/>
           </p:cNvSpPr>
-          <p:nvPr userDrawn="1"/>
+          <p:nvPr isPhoto="0" userDrawn="1"/>
         </p:nvSpPr>
         <p:spPr bwMode="auto">
           <a:xfrm>
@@ -259,16 +259,16 @@
       </p:sp>
       <p:sp>
         <p:nvSpPr>
-          <p:cNvPr id="14" name="Shape 1060"/>
+          <p:cNvPr id="14" name="Shape 1060" hidden="0"/>
           <p:cNvSpPr>
             <a:spLocks noChangeArrowheads="1" noGrp="1"/>
           </p:cNvSpPr>
-          <p:nvPr userDrawn="1"/>
+          <p:nvPr isPhoto="0" userDrawn="1"/>
         </p:nvSpPr>
         <p:spPr bwMode="auto">
           <a:xfrm>
             <a:off x="1309514" y="1839834"/>
-            <a:ext cx="4011787" cy="1314325"/>
+            <a:ext cx="4011787" cy="1314324"/>
           </a:xfrm>
           <a:custGeom>
             <a:avLst/>
@@ -350,15 +350,15 @@
       </p:sp>
       <p:sp>
         <p:nvSpPr>
-          <p:cNvPr id="15" name="Shape 1061"/>
+          <p:cNvPr id="15" name="Shape 1061" hidden="0"/>
           <p:cNvSpPr>
             <a:spLocks noChangeArrowheads="1" noGrp="1"/>
           </p:cNvSpPr>
-          <p:nvPr userDrawn="1"/>
+          <p:nvPr isPhoto="0" userDrawn="1"/>
         </p:nvSpPr>
         <p:spPr bwMode="auto">
           <a:xfrm>
-            <a:off x="6567031" y="4629133"/>
+            <a:off x="6567030" y="4629133"/>
             <a:ext cx="5395523" cy="2231707"/>
           </a:xfrm>
           <a:custGeom>
@@ -436,11 +436,11 @@
       </p:sp>
       <p:sp>
         <p:nvSpPr>
-          <p:cNvPr id="16" name="Shape 1062"/>
+          <p:cNvPr id="16" name="Shape 1062" hidden="0"/>
           <p:cNvSpPr>
             <a:spLocks noChangeArrowheads="1" noGrp="1"/>
           </p:cNvSpPr>
-          <p:nvPr userDrawn="1"/>
+          <p:nvPr isPhoto="0" userDrawn="1"/>
         </p:nvSpPr>
         <p:spPr bwMode="auto">
           <a:xfrm>
@@ -514,11 +514,11 @@
       </p:sp>
       <p:sp>
         <p:nvSpPr>
-          <p:cNvPr id="17" name="Shape 1063"/>
+          <p:cNvPr id="17" name="Shape 1063" hidden="0"/>
           <p:cNvSpPr>
             <a:spLocks noChangeArrowheads="1" noGrp="1"/>
           </p:cNvSpPr>
-          <p:nvPr userDrawn="1"/>
+          <p:nvPr isPhoto="0" userDrawn="1"/>
         </p:nvSpPr>
         <p:spPr bwMode="auto">
           <a:xfrm>
@@ -592,18 +592,18 @@
       </p:sp>
       <p:sp>
         <p:nvSpPr>
-          <p:cNvPr id="3" name="Подзаголовок 2"/>
-          <p:cNvSpPr>
-            <a:spLocks noGrp="1"/>
-          </p:cNvSpPr>
-          <p:nvPr>
-            <p:ph type="subTitle" idx="1"/>
+          <p:cNvPr id="3" name="Подзаголовок 2" hidden="0"/>
+          <p:cNvSpPr>
+            <a:spLocks noGrp="1"/>
+          </p:cNvSpPr>
+          <p:nvPr isPhoto="0" userDrawn="0">
+            <p:ph type="subTitle" idx="1" hasCustomPrompt="0"/>
           </p:nvPr>
         </p:nvSpPr>
         <p:spPr bwMode="auto">
           <a:xfrm>
             <a:off x="4655839" y="2708919"/>
-            <a:ext cx="6720746" cy="720079"/>
+            <a:ext cx="6720745" cy="720079"/>
           </a:xfrm>
         </p:spPr>
         <p:txBody>
@@ -715,12 +715,12 @@
       </p:sp>
       <p:sp>
         <p:nvSpPr>
-          <p:cNvPr id="4" name="Дата 3"/>
-          <p:cNvSpPr>
-            <a:spLocks noGrp="1"/>
-          </p:cNvSpPr>
-          <p:nvPr>
-            <p:ph type="dt" sz="half" idx="10"/>
+          <p:cNvPr id="4" name="Дата 3" hidden="0"/>
+          <p:cNvSpPr>
+            <a:spLocks noGrp="1"/>
+          </p:cNvSpPr>
+          <p:nvPr isPhoto="0" userDrawn="0">
+            <p:ph type="dt" sz="half" idx="10" hasCustomPrompt="0"/>
           </p:nvPr>
         </p:nvSpPr>
         <p:spPr bwMode="auto"/>
@@ -741,12 +741,12 @@
       </p:sp>
       <p:sp>
         <p:nvSpPr>
-          <p:cNvPr id="5" name="Нижний колонтитул 4"/>
-          <p:cNvSpPr>
-            <a:spLocks noGrp="1"/>
-          </p:cNvSpPr>
-          <p:nvPr>
-            <p:ph type="ftr" sz="quarter" idx="11"/>
+          <p:cNvPr id="5" name="Нижний колонтитул 4" hidden="0"/>
+          <p:cNvSpPr>
+            <a:spLocks noGrp="1"/>
+          </p:cNvSpPr>
+          <p:nvPr isPhoto="0" userDrawn="0">
+            <p:ph type="ftr" sz="quarter" idx="11" hasCustomPrompt="0"/>
           </p:nvPr>
         </p:nvSpPr>
         <p:spPr bwMode="auto"/>
@@ -763,12 +763,12 @@
       </p:sp>
       <p:sp>
         <p:nvSpPr>
-          <p:cNvPr id="6" name="Номер слайда 5"/>
-          <p:cNvSpPr>
-            <a:spLocks noGrp="1"/>
-          </p:cNvSpPr>
-          <p:nvPr>
-            <p:ph type="sldNum" sz="quarter" idx="12"/>
+          <p:cNvPr id="6" name="Номер слайда 5" hidden="0"/>
+          <p:cNvSpPr>
+            <a:spLocks noGrp="1"/>
+          </p:cNvSpPr>
+          <p:nvPr isPhoto="0" userDrawn="0">
+            <p:ph type="sldNum" sz="quarter" idx="12" hasCustomPrompt="0"/>
           </p:nvPr>
         </p:nvSpPr>
         <p:spPr bwMode="auto"/>
@@ -789,18 +789,18 @@
       </p:sp>
       <p:sp>
         <p:nvSpPr>
-          <p:cNvPr id="7" name="Заголовок 6"/>
-          <p:cNvSpPr>
-            <a:spLocks noGrp="1"/>
-          </p:cNvSpPr>
-          <p:nvPr>
-            <p:ph type="title"/>
+          <p:cNvPr id="7" name="Заголовок 6" hidden="0"/>
+          <p:cNvSpPr>
+            <a:spLocks noGrp="1"/>
+          </p:cNvSpPr>
+          <p:nvPr isPhoto="0" userDrawn="0">
+            <p:ph type="title" hasCustomPrompt="0"/>
           </p:nvPr>
         </p:nvSpPr>
         <p:spPr bwMode="auto">
           <a:xfrm>
             <a:off x="4595833" y="1808820"/>
-            <a:ext cx="6720746" cy="720079"/>
+            <a:ext cx="6720745" cy="720079"/>
           </a:xfrm>
         </p:spPr>
         <p:txBody>
@@ -835,9 +835,9 @@
   <p:cSld name="Title and Vertical Text">
     <p:spTree>
       <p:nvGrpSpPr>
-        <p:cNvPr id="1" name=""/>
+        <p:cNvPr id="1" name="" hidden="0"/>
         <p:cNvGrpSpPr/>
-        <p:nvPr/>
+        <p:nvPr isPhoto="0" userDrawn="0"/>
       </p:nvGrpSpPr>
       <p:grpSpPr bwMode="auto">
         <a:xfrm>
@@ -849,12 +849,12 @@
       </p:grpSpPr>
       <p:sp>
         <p:nvSpPr>
-          <p:cNvPr id="2" name="Заголовок 1"/>
-          <p:cNvSpPr>
-            <a:spLocks noGrp="1"/>
-          </p:cNvSpPr>
-          <p:nvPr>
-            <p:ph type="title"/>
+          <p:cNvPr id="2" name="Заголовок 1" hidden="0"/>
+          <p:cNvSpPr>
+            <a:spLocks noGrp="1"/>
+          </p:cNvSpPr>
+          <p:nvPr isPhoto="0" userDrawn="0">
+            <p:ph type="title" hasCustomPrompt="0"/>
           </p:nvPr>
         </p:nvSpPr>
         <p:spPr bwMode="auto"/>
@@ -875,12 +875,12 @@
       </p:sp>
       <p:sp>
         <p:nvSpPr>
-          <p:cNvPr id="3" name="Вертикальный текст 2"/>
-          <p:cNvSpPr>
-            <a:spLocks noGrp="1"/>
-          </p:cNvSpPr>
-          <p:nvPr>
-            <p:ph type="body" orient="vert" idx="1"/>
+          <p:cNvPr id="3" name="Вертикальный текст 2" hidden="0"/>
+          <p:cNvSpPr>
+            <a:spLocks noGrp="1"/>
+          </p:cNvSpPr>
+          <p:nvPr isPhoto="0" userDrawn="0">
+            <p:ph type="body" orient="vert" idx="1" hasCustomPrompt="0"/>
           </p:nvPr>
         </p:nvSpPr>
         <p:spPr bwMode="auto"/>
@@ -941,12 +941,12 @@
       </p:sp>
       <p:sp>
         <p:nvSpPr>
-          <p:cNvPr id="4" name="Дата 3"/>
-          <p:cNvSpPr>
-            <a:spLocks noGrp="1"/>
-          </p:cNvSpPr>
-          <p:nvPr>
-            <p:ph type="dt" sz="half" idx="10"/>
+          <p:cNvPr id="4" name="Дата 3" hidden="0"/>
+          <p:cNvSpPr>
+            <a:spLocks noGrp="1"/>
+          </p:cNvSpPr>
+          <p:nvPr isPhoto="0" userDrawn="0">
+            <p:ph type="dt" sz="half" idx="10" hasCustomPrompt="0"/>
           </p:nvPr>
         </p:nvSpPr>
         <p:spPr bwMode="auto"/>
@@ -967,12 +967,12 @@
       </p:sp>
       <p:sp>
         <p:nvSpPr>
-          <p:cNvPr id="5" name="Нижний колонтитул 4"/>
-          <p:cNvSpPr>
-            <a:spLocks noGrp="1"/>
-          </p:cNvSpPr>
-          <p:nvPr>
-            <p:ph type="ftr" sz="quarter" idx="11"/>
+          <p:cNvPr id="5" name="Нижний колонтитул 4" hidden="0"/>
+          <p:cNvSpPr>
+            <a:spLocks noGrp="1"/>
+          </p:cNvSpPr>
+          <p:nvPr isPhoto="0" userDrawn="0">
+            <p:ph type="ftr" sz="quarter" idx="11" hasCustomPrompt="0"/>
           </p:nvPr>
         </p:nvSpPr>
         <p:spPr bwMode="auto"/>
@@ -989,12 +989,12 @@
       </p:sp>
       <p:sp>
         <p:nvSpPr>
-          <p:cNvPr id="6" name="Номер слайда 5"/>
-          <p:cNvSpPr>
-            <a:spLocks noGrp="1"/>
-          </p:cNvSpPr>
-          <p:nvPr>
-            <p:ph type="sldNum" sz="quarter" idx="12"/>
+          <p:cNvPr id="6" name="Номер слайда 5" hidden="0"/>
+          <p:cNvSpPr>
+            <a:spLocks noGrp="1"/>
+          </p:cNvSpPr>
+          <p:nvPr isPhoto="0" userDrawn="0">
+            <p:ph type="sldNum" sz="quarter" idx="12" hasCustomPrompt="0"/>
           </p:nvPr>
         </p:nvSpPr>
         <p:spPr bwMode="auto"/>
@@ -1026,9 +1026,9 @@
   <p:cSld name="Vertical Title and Text">
     <p:spTree>
       <p:nvGrpSpPr>
-        <p:cNvPr id="1" name=""/>
+        <p:cNvPr id="1" name="" hidden="0"/>
         <p:cNvGrpSpPr/>
-        <p:nvPr/>
+        <p:nvPr isPhoto="0" userDrawn="0"/>
       </p:nvGrpSpPr>
       <p:grpSpPr bwMode="auto">
         <a:xfrm>
@@ -1040,12 +1040,12 @@
       </p:grpSpPr>
       <p:sp>
         <p:nvSpPr>
-          <p:cNvPr id="2" name="Вертикальный заголовок 1"/>
-          <p:cNvSpPr>
-            <a:spLocks noGrp="1"/>
-          </p:cNvSpPr>
-          <p:nvPr>
-            <p:ph type="title" orient="vert"/>
+          <p:cNvPr id="2" name="Вертикальный заголовок 1" hidden="0"/>
+          <p:cNvSpPr>
+            <a:spLocks noGrp="1"/>
+          </p:cNvSpPr>
+          <p:nvPr isPhoto="0" userDrawn="0">
+            <p:ph type="title" orient="vert" hasCustomPrompt="0"/>
           </p:nvPr>
         </p:nvSpPr>
         <p:spPr bwMode="auto">
@@ -1075,12 +1075,12 @@
       </p:sp>
       <p:sp>
         <p:nvSpPr>
-          <p:cNvPr id="3" name="Вертикальный текст 2"/>
-          <p:cNvSpPr>
-            <a:spLocks noGrp="1"/>
-          </p:cNvSpPr>
-          <p:nvPr>
-            <p:ph type="body" orient="vert" idx="1"/>
+          <p:cNvPr id="3" name="Вертикальный текст 2" hidden="0"/>
+          <p:cNvSpPr>
+            <a:spLocks noGrp="1"/>
+          </p:cNvSpPr>
+          <p:nvPr isPhoto="0" userDrawn="0">
+            <p:ph type="body" orient="vert" idx="1" hasCustomPrompt="0"/>
           </p:nvPr>
         </p:nvSpPr>
         <p:spPr bwMode="auto">
@@ -1146,12 +1146,12 @@
       </p:sp>
       <p:sp>
         <p:nvSpPr>
-          <p:cNvPr id="4" name="Дата 3"/>
-          <p:cNvSpPr>
-            <a:spLocks noGrp="1"/>
-          </p:cNvSpPr>
-          <p:nvPr>
-            <p:ph type="dt" sz="half" idx="10"/>
+          <p:cNvPr id="4" name="Дата 3" hidden="0"/>
+          <p:cNvSpPr>
+            <a:spLocks noGrp="1"/>
+          </p:cNvSpPr>
+          <p:nvPr isPhoto="0" userDrawn="0">
+            <p:ph type="dt" sz="half" idx="10" hasCustomPrompt="0"/>
           </p:nvPr>
         </p:nvSpPr>
         <p:spPr bwMode="auto"/>
@@ -1172,12 +1172,12 @@
       </p:sp>
       <p:sp>
         <p:nvSpPr>
-          <p:cNvPr id="5" name="Нижний колонтитул 4"/>
-          <p:cNvSpPr>
-            <a:spLocks noGrp="1"/>
-          </p:cNvSpPr>
-          <p:nvPr>
-            <p:ph type="ftr" sz="quarter" idx="11"/>
+          <p:cNvPr id="5" name="Нижний колонтитул 4" hidden="0"/>
+          <p:cNvSpPr>
+            <a:spLocks noGrp="1"/>
+          </p:cNvSpPr>
+          <p:nvPr isPhoto="0" userDrawn="0">
+            <p:ph type="ftr" sz="quarter" idx="11" hasCustomPrompt="0"/>
           </p:nvPr>
         </p:nvSpPr>
         <p:spPr bwMode="auto"/>
@@ -1194,12 +1194,12 @@
       </p:sp>
       <p:sp>
         <p:nvSpPr>
-          <p:cNvPr id="6" name="Номер слайда 5"/>
-          <p:cNvSpPr>
-            <a:spLocks noGrp="1"/>
-          </p:cNvSpPr>
-          <p:nvPr>
-            <p:ph type="sldNum" sz="quarter" idx="12"/>
+          <p:cNvPr id="6" name="Номер слайда 5" hidden="0"/>
+          <p:cNvSpPr>
+            <a:spLocks noGrp="1"/>
+          </p:cNvSpPr>
+          <p:nvPr isPhoto="0" userDrawn="0">
+            <p:ph type="sldNum" sz="quarter" idx="12" hasCustomPrompt="0"/>
           </p:nvPr>
         </p:nvSpPr>
         <p:spPr bwMode="auto"/>
@@ -1231,9 +1231,9 @@
   <p:cSld name="Title and Content">
     <p:spTree>
       <p:nvGrpSpPr>
-        <p:cNvPr id="1" name=""/>
+        <p:cNvPr id="1" name="" hidden="0"/>
         <p:cNvGrpSpPr/>
-        <p:nvPr/>
+        <p:nvPr isPhoto="0" userDrawn="0"/>
       </p:nvGrpSpPr>
       <p:grpSpPr bwMode="auto">
         <a:xfrm>
@@ -1245,12 +1245,12 @@
       </p:grpSpPr>
       <p:sp>
         <p:nvSpPr>
-          <p:cNvPr id="2" name="Заголовок 1"/>
-          <p:cNvSpPr>
-            <a:spLocks noGrp="1"/>
-          </p:cNvSpPr>
-          <p:nvPr>
-            <p:ph type="title"/>
+          <p:cNvPr id="2" name="Заголовок 1" hidden="0"/>
+          <p:cNvSpPr>
+            <a:spLocks noGrp="1"/>
+          </p:cNvSpPr>
+          <p:nvPr isPhoto="0" userDrawn="0">
+            <p:ph type="title" hasCustomPrompt="0"/>
           </p:nvPr>
         </p:nvSpPr>
         <p:spPr bwMode="auto"/>
@@ -1271,12 +1271,12 @@
       </p:sp>
       <p:sp>
         <p:nvSpPr>
-          <p:cNvPr id="3" name="Объект 2"/>
-          <p:cNvSpPr>
-            <a:spLocks noGrp="1"/>
-          </p:cNvSpPr>
-          <p:nvPr>
-            <p:ph idx="1"/>
+          <p:cNvPr id="3" name="Объект 2" hidden="0"/>
+          <p:cNvSpPr>
+            <a:spLocks noGrp="1"/>
+          </p:cNvSpPr>
+          <p:nvPr isPhoto="0" userDrawn="0">
+            <p:ph idx="1" hasCustomPrompt="0"/>
           </p:nvPr>
         </p:nvSpPr>
         <p:spPr bwMode="auto"/>
@@ -1337,12 +1337,12 @@
       </p:sp>
       <p:sp>
         <p:nvSpPr>
-          <p:cNvPr id="4" name="Дата 3"/>
-          <p:cNvSpPr>
-            <a:spLocks noGrp="1"/>
-          </p:cNvSpPr>
-          <p:nvPr>
-            <p:ph type="dt" sz="half" idx="10"/>
+          <p:cNvPr id="4" name="Дата 3" hidden="0"/>
+          <p:cNvSpPr>
+            <a:spLocks noGrp="1"/>
+          </p:cNvSpPr>
+          <p:nvPr isPhoto="0" userDrawn="0">
+            <p:ph type="dt" sz="half" idx="10" hasCustomPrompt="0"/>
           </p:nvPr>
         </p:nvSpPr>
         <p:spPr bwMode="auto"/>
@@ -1363,12 +1363,12 @@
       </p:sp>
       <p:sp>
         <p:nvSpPr>
-          <p:cNvPr id="5" name="Нижний колонтитул 4"/>
-          <p:cNvSpPr>
-            <a:spLocks noGrp="1"/>
-          </p:cNvSpPr>
-          <p:nvPr>
-            <p:ph type="ftr" sz="quarter" idx="11"/>
+          <p:cNvPr id="5" name="Нижний колонтитул 4" hidden="0"/>
+          <p:cNvSpPr>
+            <a:spLocks noGrp="1"/>
+          </p:cNvSpPr>
+          <p:nvPr isPhoto="0" userDrawn="0">
+            <p:ph type="ftr" sz="quarter" idx="11" hasCustomPrompt="0"/>
           </p:nvPr>
         </p:nvSpPr>
         <p:spPr bwMode="auto"/>
@@ -1385,12 +1385,12 @@
       </p:sp>
       <p:sp>
         <p:nvSpPr>
-          <p:cNvPr id="6" name="Номер слайда 5"/>
-          <p:cNvSpPr>
-            <a:spLocks noGrp="1"/>
-          </p:cNvSpPr>
-          <p:nvPr>
-            <p:ph type="sldNum" sz="quarter" idx="12"/>
+          <p:cNvPr id="6" name="Номер слайда 5" hidden="0"/>
+          <p:cNvSpPr>
+            <a:spLocks noGrp="1"/>
+          </p:cNvSpPr>
+          <p:nvPr isPhoto="0" userDrawn="0">
+            <p:ph type="sldNum" sz="quarter" idx="12" hasCustomPrompt="0"/>
           </p:nvPr>
         </p:nvSpPr>
         <p:spPr bwMode="auto"/>
@@ -1422,9 +1422,9 @@
   <p:cSld name="Section Header">
     <p:spTree>
       <p:nvGrpSpPr>
-        <p:cNvPr id="1" name=""/>
+        <p:cNvPr id="1" name="" hidden="0"/>
         <p:cNvGrpSpPr/>
-        <p:nvPr/>
+        <p:nvPr isPhoto="0" userDrawn="0"/>
       </p:nvGrpSpPr>
       <p:grpSpPr bwMode="auto">
         <a:xfrm>
@@ -1436,12 +1436,12 @@
       </p:grpSpPr>
       <p:sp>
         <p:nvSpPr>
-          <p:cNvPr id="2" name="Заголовок 1"/>
-          <p:cNvSpPr>
-            <a:spLocks noGrp="1"/>
-          </p:cNvSpPr>
-          <p:nvPr>
-            <p:ph type="title"/>
+          <p:cNvPr id="2" name="Заголовок 1" hidden="0"/>
+          <p:cNvSpPr>
+            <a:spLocks noGrp="1"/>
+          </p:cNvSpPr>
+          <p:nvPr isPhoto="0" userDrawn="0">
+            <p:ph type="title" hasCustomPrompt="0"/>
           </p:nvPr>
         </p:nvSpPr>
         <p:spPr bwMode="auto">
@@ -1471,12 +1471,12 @@
       </p:sp>
       <p:sp>
         <p:nvSpPr>
-          <p:cNvPr id="3" name="Текст 2"/>
-          <p:cNvSpPr>
-            <a:spLocks noGrp="1"/>
-          </p:cNvSpPr>
-          <p:nvPr>
-            <p:ph type="body" idx="1"/>
+          <p:cNvPr id="3" name="Текст 2" hidden="0"/>
+          <p:cNvSpPr>
+            <a:spLocks noGrp="1"/>
+          </p:cNvSpPr>
+          <p:nvPr isPhoto="0" userDrawn="0">
+            <p:ph type="body" idx="1" hasCustomPrompt="0"/>
           </p:nvPr>
         </p:nvSpPr>
         <p:spPr bwMode="auto">
@@ -1593,12 +1593,12 @@
       </p:sp>
       <p:sp>
         <p:nvSpPr>
-          <p:cNvPr id="4" name="Дата 3"/>
-          <p:cNvSpPr>
-            <a:spLocks noGrp="1"/>
-          </p:cNvSpPr>
-          <p:nvPr>
-            <p:ph type="dt" sz="half" idx="10"/>
+          <p:cNvPr id="4" name="Дата 3" hidden="0"/>
+          <p:cNvSpPr>
+            <a:spLocks noGrp="1"/>
+          </p:cNvSpPr>
+          <p:nvPr isPhoto="0" userDrawn="0">
+            <p:ph type="dt" sz="half" idx="10" hasCustomPrompt="0"/>
           </p:nvPr>
         </p:nvSpPr>
         <p:spPr bwMode="auto"/>
@@ -1619,12 +1619,12 @@
       </p:sp>
       <p:sp>
         <p:nvSpPr>
-          <p:cNvPr id="5" name="Нижний колонтитул 4"/>
-          <p:cNvSpPr>
-            <a:spLocks noGrp="1"/>
-          </p:cNvSpPr>
-          <p:nvPr>
-            <p:ph type="ftr" sz="quarter" idx="11"/>
+          <p:cNvPr id="5" name="Нижний колонтитул 4" hidden="0"/>
+          <p:cNvSpPr>
+            <a:spLocks noGrp="1"/>
+          </p:cNvSpPr>
+          <p:nvPr isPhoto="0" userDrawn="0">
+            <p:ph type="ftr" sz="quarter" idx="11" hasCustomPrompt="0"/>
           </p:nvPr>
         </p:nvSpPr>
         <p:spPr bwMode="auto"/>
@@ -1641,12 +1641,12 @@
       </p:sp>
       <p:sp>
         <p:nvSpPr>
-          <p:cNvPr id="6" name="Номер слайда 5"/>
-          <p:cNvSpPr>
-            <a:spLocks noGrp="1"/>
-          </p:cNvSpPr>
-          <p:nvPr>
-            <p:ph type="sldNum" sz="quarter" idx="12"/>
+          <p:cNvPr id="6" name="Номер слайда 5" hidden="0"/>
+          <p:cNvSpPr>
+            <a:spLocks noGrp="1"/>
+          </p:cNvSpPr>
+          <p:nvPr isPhoto="0" userDrawn="0">
+            <p:ph type="sldNum" sz="quarter" idx="12" hasCustomPrompt="0"/>
           </p:nvPr>
         </p:nvSpPr>
         <p:spPr bwMode="auto"/>
@@ -1678,9 +1678,9 @@
   <p:cSld name="Two Content">
     <p:spTree>
       <p:nvGrpSpPr>
-        <p:cNvPr id="1" name=""/>
+        <p:cNvPr id="1" name="" hidden="0"/>
         <p:cNvGrpSpPr/>
-        <p:nvPr/>
+        <p:nvPr isPhoto="0" userDrawn="0"/>
       </p:nvGrpSpPr>
       <p:grpSpPr bwMode="auto">
         <a:xfrm>
@@ -1692,12 +1692,12 @@
       </p:grpSpPr>
       <p:sp>
         <p:nvSpPr>
-          <p:cNvPr id="2" name="Заголовок 1"/>
-          <p:cNvSpPr>
-            <a:spLocks noGrp="1"/>
-          </p:cNvSpPr>
-          <p:nvPr>
-            <p:ph type="title"/>
+          <p:cNvPr id="2" name="Заголовок 1" hidden="0"/>
+          <p:cNvSpPr>
+            <a:spLocks noGrp="1"/>
+          </p:cNvSpPr>
+          <p:nvPr isPhoto="0" userDrawn="0">
+            <p:ph type="title" hasCustomPrompt="0"/>
           </p:nvPr>
         </p:nvSpPr>
         <p:spPr bwMode="auto"/>
@@ -1718,12 +1718,12 @@
       </p:sp>
       <p:sp>
         <p:nvSpPr>
-          <p:cNvPr id="3" name="Объект 2"/>
-          <p:cNvSpPr>
-            <a:spLocks noGrp="1"/>
-          </p:cNvSpPr>
-          <p:nvPr>
-            <p:ph sz="half" idx="1"/>
+          <p:cNvPr id="3" name="Объект 2" hidden="0"/>
+          <p:cNvSpPr>
+            <a:spLocks noGrp="1"/>
+          </p:cNvSpPr>
+          <p:nvPr isPhoto="0" userDrawn="0">
+            <p:ph sz="half" idx="1" hasCustomPrompt="0"/>
           </p:nvPr>
         </p:nvSpPr>
         <p:spPr bwMode="auto">
@@ -1817,12 +1817,12 @@
       </p:sp>
       <p:sp>
         <p:nvSpPr>
-          <p:cNvPr id="4" name="Объект 3"/>
-          <p:cNvSpPr>
-            <a:spLocks noGrp="1"/>
-          </p:cNvSpPr>
-          <p:nvPr>
-            <p:ph sz="half" idx="2"/>
+          <p:cNvPr id="4" name="Объект 3" hidden="0"/>
+          <p:cNvSpPr>
+            <a:spLocks noGrp="1"/>
+          </p:cNvSpPr>
+          <p:nvPr isPhoto="0" userDrawn="0">
+            <p:ph sz="half" idx="2" hasCustomPrompt="0"/>
           </p:nvPr>
         </p:nvSpPr>
         <p:spPr bwMode="auto">
@@ -1916,12 +1916,12 @@
       </p:sp>
       <p:sp>
         <p:nvSpPr>
-          <p:cNvPr id="5" name="Дата 4"/>
-          <p:cNvSpPr>
-            <a:spLocks noGrp="1"/>
-          </p:cNvSpPr>
-          <p:nvPr>
-            <p:ph type="dt" sz="half" idx="10"/>
+          <p:cNvPr id="5" name="Дата 4" hidden="0"/>
+          <p:cNvSpPr>
+            <a:spLocks noGrp="1"/>
+          </p:cNvSpPr>
+          <p:nvPr isPhoto="0" userDrawn="0">
+            <p:ph type="dt" sz="half" idx="10" hasCustomPrompt="0"/>
           </p:nvPr>
         </p:nvSpPr>
         <p:spPr bwMode="auto"/>
@@ -1942,12 +1942,12 @@
       </p:sp>
       <p:sp>
         <p:nvSpPr>
-          <p:cNvPr id="6" name="Нижний колонтитул 5"/>
-          <p:cNvSpPr>
-            <a:spLocks noGrp="1"/>
-          </p:cNvSpPr>
-          <p:nvPr>
-            <p:ph type="ftr" sz="quarter" idx="11"/>
+          <p:cNvPr id="6" name="Нижний колонтитул 5" hidden="0"/>
+          <p:cNvSpPr>
+            <a:spLocks noGrp="1"/>
+          </p:cNvSpPr>
+          <p:nvPr isPhoto="0" userDrawn="0">
+            <p:ph type="ftr" sz="quarter" idx="11" hasCustomPrompt="0"/>
           </p:nvPr>
         </p:nvSpPr>
         <p:spPr bwMode="auto"/>
@@ -1964,12 +1964,12 @@
       </p:sp>
       <p:sp>
         <p:nvSpPr>
-          <p:cNvPr id="7" name="Номер слайда 6"/>
-          <p:cNvSpPr>
-            <a:spLocks noGrp="1"/>
-          </p:cNvSpPr>
-          <p:nvPr>
-            <p:ph type="sldNum" sz="quarter" idx="12"/>
+          <p:cNvPr id="7" name="Номер слайда 6" hidden="0"/>
+          <p:cNvSpPr>
+            <a:spLocks noGrp="1"/>
+          </p:cNvSpPr>
+          <p:nvPr isPhoto="0" userDrawn="0">
+            <p:ph type="sldNum" sz="quarter" idx="12" hasCustomPrompt="0"/>
           </p:nvPr>
         </p:nvSpPr>
         <p:spPr bwMode="auto"/>
@@ -2001,9 +2001,9 @@
   <p:cSld name="Comparison">
     <p:spTree>
       <p:nvGrpSpPr>
-        <p:cNvPr id="1" name=""/>
+        <p:cNvPr id="1" name="" hidden="0"/>
         <p:cNvGrpSpPr/>
-        <p:nvPr/>
+        <p:nvPr isPhoto="0" userDrawn="0"/>
       </p:nvGrpSpPr>
       <p:grpSpPr bwMode="auto">
         <a:xfrm>
@@ -2015,12 +2015,12 @@
       </p:grpSpPr>
       <p:sp>
         <p:nvSpPr>
-          <p:cNvPr id="2" name="Заголовок 1"/>
-          <p:cNvSpPr>
-            <a:spLocks noGrp="1"/>
-          </p:cNvSpPr>
-          <p:nvPr>
-            <p:ph type="title"/>
+          <p:cNvPr id="2" name="Заголовок 1" hidden="0"/>
+          <p:cNvSpPr>
+            <a:spLocks noGrp="1"/>
+          </p:cNvSpPr>
+          <p:nvPr isPhoto="0" userDrawn="0">
+            <p:ph type="title" hasCustomPrompt="0"/>
           </p:nvPr>
         </p:nvSpPr>
         <p:spPr bwMode="auto"/>
@@ -2045,12 +2045,12 @@
       </p:sp>
       <p:sp>
         <p:nvSpPr>
-          <p:cNvPr id="3" name="Текст 2"/>
-          <p:cNvSpPr>
-            <a:spLocks noGrp="1"/>
-          </p:cNvSpPr>
-          <p:nvPr>
-            <p:ph type="body" idx="1"/>
+          <p:cNvPr id="3" name="Текст 2" hidden="0"/>
+          <p:cNvSpPr>
+            <a:spLocks noGrp="1"/>
+          </p:cNvSpPr>
+          <p:nvPr isPhoto="0" userDrawn="0">
+            <p:ph type="body" idx="1" hasCustomPrompt="0"/>
           </p:nvPr>
         </p:nvSpPr>
         <p:spPr bwMode="auto">
@@ -2113,12 +2113,12 @@
       </p:sp>
       <p:sp>
         <p:nvSpPr>
-          <p:cNvPr id="4" name="Объект 3"/>
-          <p:cNvSpPr>
-            <a:spLocks noGrp="1"/>
-          </p:cNvSpPr>
-          <p:nvPr>
-            <p:ph sz="half" idx="2"/>
+          <p:cNvPr id="4" name="Объект 3" hidden="0"/>
+          <p:cNvSpPr>
+            <a:spLocks noGrp="1"/>
+          </p:cNvSpPr>
+          <p:nvPr isPhoto="0" userDrawn="0">
+            <p:ph sz="half" idx="2" hasCustomPrompt="0"/>
           </p:nvPr>
         </p:nvSpPr>
         <p:spPr bwMode="auto">
@@ -2212,12 +2212,12 @@
       </p:sp>
       <p:sp>
         <p:nvSpPr>
-          <p:cNvPr id="5" name="Текст 4"/>
-          <p:cNvSpPr>
-            <a:spLocks noGrp="1"/>
-          </p:cNvSpPr>
-          <p:nvPr>
-            <p:ph type="body" sz="quarter" idx="3"/>
+          <p:cNvPr id="5" name="Текст 4" hidden="0"/>
+          <p:cNvSpPr>
+            <a:spLocks noGrp="1"/>
+          </p:cNvSpPr>
+          <p:nvPr isPhoto="0" userDrawn="0">
+            <p:ph type="body" sz="quarter" idx="3" hasCustomPrompt="0"/>
           </p:nvPr>
         </p:nvSpPr>
         <p:spPr bwMode="auto">
@@ -2280,12 +2280,12 @@
       </p:sp>
       <p:sp>
         <p:nvSpPr>
-          <p:cNvPr id="6" name="Объект 5"/>
-          <p:cNvSpPr>
-            <a:spLocks noGrp="1"/>
-          </p:cNvSpPr>
-          <p:nvPr>
-            <p:ph sz="quarter" idx="4"/>
+          <p:cNvPr id="6" name="Объект 5" hidden="0"/>
+          <p:cNvSpPr>
+            <a:spLocks noGrp="1"/>
+          </p:cNvSpPr>
+          <p:nvPr isPhoto="0" userDrawn="0">
+            <p:ph sz="quarter" idx="4" hasCustomPrompt="0"/>
           </p:nvPr>
         </p:nvSpPr>
         <p:spPr bwMode="auto">
@@ -2379,12 +2379,12 @@
       </p:sp>
       <p:sp>
         <p:nvSpPr>
-          <p:cNvPr id="7" name="Дата 6"/>
-          <p:cNvSpPr>
-            <a:spLocks noGrp="1"/>
-          </p:cNvSpPr>
-          <p:nvPr>
-            <p:ph type="dt" sz="half" idx="10"/>
+          <p:cNvPr id="7" name="Дата 6" hidden="0"/>
+          <p:cNvSpPr>
+            <a:spLocks noGrp="1"/>
+          </p:cNvSpPr>
+          <p:nvPr isPhoto="0" userDrawn="0">
+            <p:ph type="dt" sz="half" idx="10" hasCustomPrompt="0"/>
           </p:nvPr>
         </p:nvSpPr>
         <p:spPr bwMode="auto"/>
@@ -2405,12 +2405,12 @@
       </p:sp>
       <p:sp>
         <p:nvSpPr>
-          <p:cNvPr id="8" name="Нижний колонтитул 7"/>
-          <p:cNvSpPr>
-            <a:spLocks noGrp="1"/>
-          </p:cNvSpPr>
-          <p:nvPr>
-            <p:ph type="ftr" sz="quarter" idx="11"/>
+          <p:cNvPr id="8" name="Нижний колонтитул 7" hidden="0"/>
+          <p:cNvSpPr>
+            <a:spLocks noGrp="1"/>
+          </p:cNvSpPr>
+          <p:nvPr isPhoto="0" userDrawn="0">
+            <p:ph type="ftr" sz="quarter" idx="11" hasCustomPrompt="0"/>
           </p:nvPr>
         </p:nvSpPr>
         <p:spPr bwMode="auto"/>
@@ -2427,12 +2427,12 @@
       </p:sp>
       <p:sp>
         <p:nvSpPr>
-          <p:cNvPr id="9" name="Номер слайда 8"/>
-          <p:cNvSpPr>
-            <a:spLocks noGrp="1"/>
-          </p:cNvSpPr>
-          <p:nvPr>
-            <p:ph type="sldNum" sz="quarter" idx="12"/>
+          <p:cNvPr id="9" name="Номер слайда 8" hidden="0"/>
+          <p:cNvSpPr>
+            <a:spLocks noGrp="1"/>
+          </p:cNvSpPr>
+          <p:nvPr isPhoto="0" userDrawn="0">
+            <p:ph type="sldNum" sz="quarter" idx="12" hasCustomPrompt="0"/>
           </p:nvPr>
         </p:nvSpPr>
         <p:spPr bwMode="auto"/>
@@ -2464,9 +2464,9 @@
   <p:cSld name="Title Only">
     <p:spTree>
       <p:nvGrpSpPr>
-        <p:cNvPr id="1" name=""/>
+        <p:cNvPr id="1" name="" hidden="0"/>
         <p:cNvGrpSpPr/>
-        <p:nvPr/>
+        <p:nvPr isPhoto="0" userDrawn="0"/>
       </p:nvGrpSpPr>
       <p:grpSpPr bwMode="auto">
         <a:xfrm>
@@ -2478,12 +2478,12 @@
       </p:grpSpPr>
       <p:sp>
         <p:nvSpPr>
-          <p:cNvPr id="2" name="Заголовок 1"/>
-          <p:cNvSpPr>
-            <a:spLocks noGrp="1"/>
-          </p:cNvSpPr>
-          <p:nvPr>
-            <p:ph type="title"/>
+          <p:cNvPr id="2" name="Заголовок 1" hidden="0"/>
+          <p:cNvSpPr>
+            <a:spLocks noGrp="1"/>
+          </p:cNvSpPr>
+          <p:nvPr isPhoto="0" userDrawn="0">
+            <p:ph type="title" hasCustomPrompt="0"/>
           </p:nvPr>
         </p:nvSpPr>
         <p:spPr bwMode="auto"/>
@@ -2504,12 +2504,12 @@
       </p:sp>
       <p:sp>
         <p:nvSpPr>
-          <p:cNvPr id="3" name="Дата 2"/>
-          <p:cNvSpPr>
-            <a:spLocks noGrp="1"/>
-          </p:cNvSpPr>
-          <p:nvPr>
-            <p:ph type="dt" sz="half" idx="10"/>
+          <p:cNvPr id="3" name="Дата 2" hidden="0"/>
+          <p:cNvSpPr>
+            <a:spLocks noGrp="1"/>
+          </p:cNvSpPr>
+          <p:nvPr isPhoto="0" userDrawn="0">
+            <p:ph type="dt" sz="half" idx="10" hasCustomPrompt="0"/>
           </p:nvPr>
         </p:nvSpPr>
         <p:spPr bwMode="auto"/>
@@ -2530,12 +2530,12 @@
       </p:sp>
       <p:sp>
         <p:nvSpPr>
-          <p:cNvPr id="4" name="Нижний колонтитул 3"/>
-          <p:cNvSpPr>
-            <a:spLocks noGrp="1"/>
-          </p:cNvSpPr>
-          <p:nvPr>
-            <p:ph type="ftr" sz="quarter" idx="11"/>
+          <p:cNvPr id="4" name="Нижний колонтитул 3" hidden="0"/>
+          <p:cNvSpPr>
+            <a:spLocks noGrp="1"/>
+          </p:cNvSpPr>
+          <p:nvPr isPhoto="0" userDrawn="0">
+            <p:ph type="ftr" sz="quarter" idx="11" hasCustomPrompt="0"/>
           </p:nvPr>
         </p:nvSpPr>
         <p:spPr bwMode="auto"/>
@@ -2552,12 +2552,12 @@
       </p:sp>
       <p:sp>
         <p:nvSpPr>
-          <p:cNvPr id="5" name="Номер слайда 4"/>
-          <p:cNvSpPr>
-            <a:spLocks noGrp="1"/>
-          </p:cNvSpPr>
-          <p:nvPr>
-            <p:ph type="sldNum" sz="quarter" idx="12"/>
+          <p:cNvPr id="5" name="Номер слайда 4" hidden="0"/>
+          <p:cNvSpPr>
+            <a:spLocks noGrp="1"/>
+          </p:cNvSpPr>
+          <p:nvPr isPhoto="0" userDrawn="0">
+            <p:ph type="sldNum" sz="quarter" idx="12" hasCustomPrompt="0"/>
           </p:nvPr>
         </p:nvSpPr>
         <p:spPr bwMode="auto"/>
@@ -2589,9 +2589,9 @@
   <p:cSld name="Blank">
     <p:spTree>
       <p:nvGrpSpPr>
-        <p:cNvPr id="1" name=""/>
+        <p:cNvPr id="1" name="" hidden="0"/>
         <p:cNvGrpSpPr/>
-        <p:nvPr/>
+        <p:nvPr isPhoto="0" userDrawn="0"/>
       </p:nvGrpSpPr>
       <p:grpSpPr bwMode="auto">
         <a:xfrm>
@@ -2603,12 +2603,12 @@
       </p:grpSpPr>
       <p:sp>
         <p:nvSpPr>
-          <p:cNvPr id="2" name="Дата 1"/>
-          <p:cNvSpPr>
-            <a:spLocks noGrp="1"/>
-          </p:cNvSpPr>
-          <p:nvPr>
-            <p:ph type="dt" sz="half" idx="10"/>
+          <p:cNvPr id="2" name="Дата 1" hidden="0"/>
+          <p:cNvSpPr>
+            <a:spLocks noGrp="1"/>
+          </p:cNvSpPr>
+          <p:nvPr isPhoto="0" userDrawn="0">
+            <p:ph type="dt" sz="half" idx="10" hasCustomPrompt="0"/>
           </p:nvPr>
         </p:nvSpPr>
         <p:spPr bwMode="auto"/>
@@ -2629,12 +2629,12 @@
       </p:sp>
       <p:sp>
         <p:nvSpPr>
-          <p:cNvPr id="3" name="Нижний колонтитул 2"/>
-          <p:cNvSpPr>
-            <a:spLocks noGrp="1"/>
-          </p:cNvSpPr>
-          <p:nvPr>
-            <p:ph type="ftr" sz="quarter" idx="11"/>
+          <p:cNvPr id="3" name="Нижний колонтитул 2" hidden="0"/>
+          <p:cNvSpPr>
+            <a:spLocks noGrp="1"/>
+          </p:cNvSpPr>
+          <p:nvPr isPhoto="0" userDrawn="0">
+            <p:ph type="ftr" sz="quarter" idx="11" hasCustomPrompt="0"/>
           </p:nvPr>
         </p:nvSpPr>
         <p:spPr bwMode="auto"/>
@@ -2651,12 +2651,12 @@
       </p:sp>
       <p:sp>
         <p:nvSpPr>
-          <p:cNvPr id="4" name="Номер слайда 3"/>
-          <p:cNvSpPr>
-            <a:spLocks noGrp="1"/>
-          </p:cNvSpPr>
-          <p:nvPr>
-            <p:ph type="sldNum" sz="quarter" idx="12"/>
+          <p:cNvPr id="4" name="Номер слайда 3" hidden="0"/>
+          <p:cNvSpPr>
+            <a:spLocks noGrp="1"/>
+          </p:cNvSpPr>
+          <p:nvPr isPhoto="0" userDrawn="0">
+            <p:ph type="sldNum" sz="quarter" idx="12" hasCustomPrompt="0"/>
           </p:nvPr>
         </p:nvSpPr>
         <p:spPr bwMode="auto"/>
@@ -2688,9 +2688,9 @@
   <p:cSld name="Content with Caption">
     <p:spTree>
       <p:nvGrpSpPr>
-        <p:cNvPr id="1" name=""/>
+        <p:cNvPr id="1" name="" hidden="0"/>
         <p:cNvGrpSpPr/>
-        <p:nvPr/>
+        <p:nvPr isPhoto="0" userDrawn="0"/>
       </p:nvGrpSpPr>
       <p:grpSpPr bwMode="auto">
         <a:xfrm>
@@ -2702,12 +2702,12 @@
       </p:grpSpPr>
       <p:sp>
         <p:nvSpPr>
-          <p:cNvPr id="2" name="Заголовок 1"/>
-          <p:cNvSpPr>
-            <a:spLocks noGrp="1"/>
-          </p:cNvSpPr>
-          <p:nvPr>
-            <p:ph type="title"/>
+          <p:cNvPr id="2" name="Заголовок 1" hidden="0"/>
+          <p:cNvSpPr>
+            <a:spLocks noGrp="1"/>
+          </p:cNvSpPr>
+          <p:nvPr isPhoto="0" userDrawn="0">
+            <p:ph type="title" hasCustomPrompt="0"/>
           </p:nvPr>
         </p:nvSpPr>
         <p:spPr bwMode="auto">
@@ -2737,12 +2737,12 @@
       </p:sp>
       <p:sp>
         <p:nvSpPr>
-          <p:cNvPr id="3" name="Объект 2"/>
-          <p:cNvSpPr>
-            <a:spLocks noGrp="1"/>
-          </p:cNvSpPr>
-          <p:nvPr>
-            <p:ph idx="1"/>
+          <p:cNvPr id="3" name="Объект 2" hidden="0"/>
+          <p:cNvSpPr>
+            <a:spLocks noGrp="1"/>
+          </p:cNvSpPr>
+          <p:nvPr isPhoto="0" userDrawn="0">
+            <p:ph idx="1" hasCustomPrompt="0"/>
           </p:nvPr>
         </p:nvSpPr>
         <p:spPr bwMode="auto">
@@ -2836,12 +2836,12 @@
       </p:sp>
       <p:sp>
         <p:nvSpPr>
-          <p:cNvPr id="4" name="Текст 3"/>
-          <p:cNvSpPr>
-            <a:spLocks noGrp="1"/>
-          </p:cNvSpPr>
-          <p:nvPr>
-            <p:ph type="body" sz="half" idx="2"/>
+          <p:cNvPr id="4" name="Текст 3" hidden="0"/>
+          <p:cNvSpPr>
+            <a:spLocks noGrp="1"/>
+          </p:cNvSpPr>
+          <p:nvPr isPhoto="0" userDrawn="0">
+            <p:ph type="body" sz="half" idx="2" hasCustomPrompt="0"/>
           </p:nvPr>
         </p:nvSpPr>
         <p:spPr bwMode="auto">
@@ -2904,12 +2904,12 @@
       </p:sp>
       <p:sp>
         <p:nvSpPr>
-          <p:cNvPr id="5" name="Дата 4"/>
-          <p:cNvSpPr>
-            <a:spLocks noGrp="1"/>
-          </p:cNvSpPr>
-          <p:nvPr>
-            <p:ph type="dt" sz="half" idx="10"/>
+          <p:cNvPr id="5" name="Дата 4" hidden="0"/>
+          <p:cNvSpPr>
+            <a:spLocks noGrp="1"/>
+          </p:cNvSpPr>
+          <p:nvPr isPhoto="0" userDrawn="0">
+            <p:ph type="dt" sz="half" idx="10" hasCustomPrompt="0"/>
           </p:nvPr>
         </p:nvSpPr>
         <p:spPr bwMode="auto"/>
@@ -2930,12 +2930,12 @@
       </p:sp>
       <p:sp>
         <p:nvSpPr>
-          <p:cNvPr id="6" name="Нижний колонтитул 5"/>
-          <p:cNvSpPr>
-            <a:spLocks noGrp="1"/>
-          </p:cNvSpPr>
-          <p:nvPr>
-            <p:ph type="ftr" sz="quarter" idx="11"/>
+          <p:cNvPr id="6" name="Нижний колонтитул 5" hidden="0"/>
+          <p:cNvSpPr>
+            <a:spLocks noGrp="1"/>
+          </p:cNvSpPr>
+          <p:nvPr isPhoto="0" userDrawn="0">
+            <p:ph type="ftr" sz="quarter" idx="11" hasCustomPrompt="0"/>
           </p:nvPr>
         </p:nvSpPr>
         <p:spPr bwMode="auto"/>
@@ -2952,12 +2952,12 @@
       </p:sp>
       <p:sp>
         <p:nvSpPr>
-          <p:cNvPr id="7" name="Номер слайда 6"/>
-          <p:cNvSpPr>
-            <a:spLocks noGrp="1"/>
-          </p:cNvSpPr>
-          <p:nvPr>
-            <p:ph type="sldNum" sz="quarter" idx="12"/>
+          <p:cNvPr id="7" name="Номер слайда 6" hidden="0"/>
+          <p:cNvSpPr>
+            <a:spLocks noGrp="1"/>
+          </p:cNvSpPr>
+          <p:nvPr isPhoto="0" userDrawn="0">
+            <p:ph type="sldNum" sz="quarter" idx="12" hasCustomPrompt="0"/>
           </p:nvPr>
         </p:nvSpPr>
         <p:spPr bwMode="auto"/>
@@ -2989,9 +2989,9 @@
   <p:cSld name="Picture with Caption">
     <p:spTree>
       <p:nvGrpSpPr>
-        <p:cNvPr id="1" name=""/>
+        <p:cNvPr id="1" name="" hidden="0"/>
         <p:cNvGrpSpPr/>
-        <p:nvPr/>
+        <p:nvPr isPhoto="0" userDrawn="0"/>
       </p:nvGrpSpPr>
       <p:grpSpPr bwMode="auto">
         <a:xfrm>
@@ -3003,12 +3003,12 @@
       </p:grpSpPr>
       <p:sp>
         <p:nvSpPr>
-          <p:cNvPr id="2" name="Заголовок 1"/>
-          <p:cNvSpPr>
-            <a:spLocks noGrp="1"/>
-          </p:cNvSpPr>
-          <p:nvPr>
-            <p:ph type="title"/>
+          <p:cNvPr id="2" name="Заголовок 1" hidden="0"/>
+          <p:cNvSpPr>
+            <a:spLocks noGrp="1"/>
+          </p:cNvSpPr>
+          <p:nvPr isPhoto="0" userDrawn="0">
+            <p:ph type="title" hasCustomPrompt="0"/>
           </p:nvPr>
         </p:nvSpPr>
         <p:spPr bwMode="auto">
@@ -3038,12 +3038,12 @@
       </p:sp>
       <p:sp>
         <p:nvSpPr>
-          <p:cNvPr id="3" name="Рисунок 2"/>
-          <p:cNvSpPr>
-            <a:spLocks noGrp="1"/>
-          </p:cNvSpPr>
-          <p:nvPr>
-            <p:ph type="pic" idx="1"/>
+          <p:cNvPr id="3" name="Рисунок 2" hidden="0"/>
+          <p:cNvSpPr>
+            <a:spLocks noGrp="1"/>
+          </p:cNvSpPr>
+          <p:nvPr isPhoto="0" userDrawn="0">
+            <p:ph type="pic" idx="1" hasCustomPrompt="0"/>
           </p:nvPr>
         </p:nvSpPr>
         <p:spPr bwMode="auto">
@@ -3102,12 +3102,12 @@
       </p:sp>
       <p:sp>
         <p:nvSpPr>
-          <p:cNvPr id="4" name="Текст 3"/>
-          <p:cNvSpPr>
-            <a:spLocks noGrp="1"/>
-          </p:cNvSpPr>
-          <p:nvPr>
-            <p:ph type="body" sz="half" idx="2"/>
+          <p:cNvPr id="4" name="Текст 3" hidden="0"/>
+          <p:cNvSpPr>
+            <a:spLocks noGrp="1"/>
+          </p:cNvSpPr>
+          <p:nvPr isPhoto="0" userDrawn="0">
+            <p:ph type="body" sz="half" idx="2" hasCustomPrompt="0"/>
           </p:nvPr>
         </p:nvSpPr>
         <p:spPr bwMode="auto">
@@ -3170,12 +3170,12 @@
       </p:sp>
       <p:sp>
         <p:nvSpPr>
-          <p:cNvPr id="5" name="Дата 4"/>
-          <p:cNvSpPr>
-            <a:spLocks noGrp="1"/>
-          </p:cNvSpPr>
-          <p:nvPr>
-            <p:ph type="dt" sz="half" idx="10"/>
+          <p:cNvPr id="5" name="Дата 4" hidden="0"/>
+          <p:cNvSpPr>
+            <a:spLocks noGrp="1"/>
+          </p:cNvSpPr>
+          <p:nvPr isPhoto="0" userDrawn="0">
+            <p:ph type="dt" sz="half" idx="10" hasCustomPrompt="0"/>
           </p:nvPr>
         </p:nvSpPr>
         <p:spPr bwMode="auto"/>
@@ -3196,12 +3196,12 @@
       </p:sp>
       <p:sp>
         <p:nvSpPr>
-          <p:cNvPr id="6" name="Нижний колонтитул 5"/>
-          <p:cNvSpPr>
-            <a:spLocks noGrp="1"/>
-          </p:cNvSpPr>
-          <p:nvPr>
-            <p:ph type="ftr" sz="quarter" idx="11"/>
+          <p:cNvPr id="6" name="Нижний колонтитул 5" hidden="0"/>
+          <p:cNvSpPr>
+            <a:spLocks noGrp="1"/>
+          </p:cNvSpPr>
+          <p:nvPr isPhoto="0" userDrawn="0">
+            <p:ph type="ftr" sz="quarter" idx="11" hasCustomPrompt="0"/>
           </p:nvPr>
         </p:nvSpPr>
         <p:spPr bwMode="auto"/>
@@ -3218,12 +3218,12 @@
       </p:sp>
       <p:sp>
         <p:nvSpPr>
-          <p:cNvPr id="7" name="Номер слайда 6"/>
-          <p:cNvSpPr>
-            <a:spLocks noGrp="1"/>
-          </p:cNvSpPr>
-          <p:nvPr>
-            <p:ph type="sldNum" sz="quarter" idx="12"/>
+          <p:cNvPr id="7" name="Номер слайда 6" hidden="0"/>
+          <p:cNvSpPr>
+            <a:spLocks noGrp="1"/>
+          </p:cNvSpPr>
+          <p:nvPr isPhoto="0" userDrawn="0">
+            <p:ph type="sldNum" sz="quarter" idx="12" hasCustomPrompt="0"/>
           </p:nvPr>
         </p:nvSpPr>
         <p:spPr bwMode="auto"/>
@@ -3260,9 +3260,9 @@
     </p:bg>
     <p:spTree>
       <p:nvGrpSpPr>
-        <p:cNvPr id="1" name=""/>
+        <p:cNvPr id="1" name="" hidden="0"/>
         <p:cNvGrpSpPr/>
-        <p:nvPr/>
+        <p:nvPr isPhoto="0" userDrawn="0"/>
       </p:nvGrpSpPr>
       <p:grpSpPr bwMode="auto">
         <a:xfrm>
@@ -3274,11 +3274,11 @@
       </p:grpSpPr>
       <p:sp>
         <p:nvSpPr>
-          <p:cNvPr id="7" name="Shape 1059"/>
+          <p:cNvPr id="7" name="Shape 1059" hidden="0"/>
           <p:cNvSpPr>
             <a:spLocks noChangeArrowheads="1" noGrp="1"/>
           </p:cNvSpPr>
-          <p:nvPr userDrawn="1"/>
+          <p:nvPr isPhoto="0" userDrawn="1"/>
         </p:nvSpPr>
         <p:spPr bwMode="auto">
           <a:xfrm>
@@ -3352,11 +3352,11 @@
       </p:sp>
       <p:sp>
         <p:nvSpPr>
-          <p:cNvPr id="8" name="Shape 1060"/>
+          <p:cNvPr id="8" name="Shape 1060" hidden="0"/>
           <p:cNvSpPr>
             <a:spLocks noChangeArrowheads="1" noGrp="1"/>
           </p:cNvSpPr>
-          <p:nvPr userDrawn="1"/>
+          <p:nvPr isPhoto="0" userDrawn="1"/>
         </p:nvSpPr>
         <p:spPr bwMode="auto">
           <a:xfrm>
@@ -3433,15 +3433,15 @@
       </p:sp>
       <p:sp>
         <p:nvSpPr>
-          <p:cNvPr id="9" name="Shape 1061"/>
+          <p:cNvPr id="9" name="Shape 1061" hidden="0"/>
           <p:cNvSpPr>
             <a:spLocks noChangeArrowheads="1" noGrp="1"/>
           </p:cNvSpPr>
-          <p:nvPr userDrawn="1"/>
+          <p:nvPr isPhoto="0" userDrawn="1"/>
         </p:nvSpPr>
         <p:spPr bwMode="auto">
           <a:xfrm>
-            <a:off x="1637457" y="1"/>
+            <a:off x="1637456" y="1"/>
             <a:ext cx="3839633" cy="2609650"/>
           </a:xfrm>
           <a:custGeom>
@@ -3551,12 +3551,12 @@
       </p:sp>
       <p:sp>
         <p:nvSpPr>
-          <p:cNvPr id="2" name="Заголовок 1"/>
-          <p:cNvSpPr>
-            <a:spLocks noGrp="1"/>
-          </p:cNvSpPr>
-          <p:nvPr>
-            <p:ph type="title"/>
+          <p:cNvPr id="2" name="Заголовок 1" hidden="0"/>
+          <p:cNvSpPr>
+            <a:spLocks noGrp="1"/>
+          </p:cNvSpPr>
+          <p:nvPr isPhoto="0" userDrawn="0">
+            <p:ph type="title" hasCustomPrompt="0"/>
           </p:nvPr>
         </p:nvSpPr>
         <p:spPr bwMode="auto">
@@ -3587,12 +3587,12 @@
       </p:sp>
       <p:sp>
         <p:nvSpPr>
-          <p:cNvPr id="3" name="Текст 2"/>
-          <p:cNvSpPr>
-            <a:spLocks noGrp="1"/>
-          </p:cNvSpPr>
-          <p:nvPr>
-            <p:ph type="body" idx="1"/>
+          <p:cNvPr id="3" name="Текст 2" hidden="0"/>
+          <p:cNvSpPr>
+            <a:spLocks noGrp="1"/>
+          </p:cNvSpPr>
+          <p:nvPr isPhoto="0" userDrawn="0">
+            <p:ph type="body" idx="1" hasCustomPrompt="0"/>
           </p:nvPr>
         </p:nvSpPr>
         <p:spPr bwMode="auto">
@@ -3663,18 +3663,18 @@
       </p:sp>
       <p:sp>
         <p:nvSpPr>
-          <p:cNvPr id="4" name="Дата 3"/>
-          <p:cNvSpPr>
-            <a:spLocks noGrp="1"/>
-          </p:cNvSpPr>
-          <p:nvPr>
-            <p:ph type="dt" sz="half" idx="2"/>
+          <p:cNvPr id="4" name="Дата 3" hidden="0"/>
+          <p:cNvSpPr>
+            <a:spLocks noGrp="1"/>
+          </p:cNvSpPr>
+          <p:nvPr isPhoto="0" userDrawn="0">
+            <p:ph type="dt" sz="half" idx="2" hasCustomPrompt="0"/>
           </p:nvPr>
         </p:nvSpPr>
         <p:spPr bwMode="auto">
           <a:xfrm>
             <a:off x="609599" y="6356351"/>
-            <a:ext cx="2844799" cy="365125"/>
+            <a:ext cx="2844798" cy="365125"/>
           </a:xfrm>
           <a:prstGeom prst="rect">
             <a:avLst/>
@@ -3707,12 +3707,12 @@
       </p:sp>
       <p:sp>
         <p:nvSpPr>
-          <p:cNvPr id="5" name="Нижний колонтитул 4"/>
-          <p:cNvSpPr>
-            <a:spLocks noGrp="1"/>
-          </p:cNvSpPr>
-          <p:nvPr>
-            <p:ph type="ftr" sz="quarter" idx="3"/>
+          <p:cNvPr id="5" name="Нижний колонтитул 4" hidden="0"/>
+          <p:cNvSpPr>
+            <a:spLocks noGrp="1"/>
+          </p:cNvSpPr>
+          <p:nvPr isPhoto="0" userDrawn="0">
+            <p:ph type="ftr" sz="quarter" idx="3" hasCustomPrompt="0"/>
           </p:nvPr>
         </p:nvSpPr>
         <p:spPr bwMode="auto">
@@ -3747,18 +3747,18 @@
       </p:sp>
       <p:sp>
         <p:nvSpPr>
-          <p:cNvPr id="6" name="Номер слайда 5"/>
-          <p:cNvSpPr>
-            <a:spLocks noGrp="1"/>
-          </p:cNvSpPr>
-          <p:nvPr>
-            <p:ph type="sldNum" sz="quarter" idx="4"/>
+          <p:cNvPr id="6" name="Номер слайда 5" hidden="0"/>
+          <p:cNvSpPr>
+            <a:spLocks noGrp="1"/>
+          </p:cNvSpPr>
+          <p:nvPr isPhoto="0" userDrawn="0">
+            <p:ph type="sldNum" sz="quarter" idx="4" hasCustomPrompt="0"/>
           </p:nvPr>
         </p:nvSpPr>
         <p:spPr bwMode="auto">
           <a:xfrm>
             <a:off x="8737599" y="6356351"/>
-            <a:ext cx="2844799" cy="365125"/>
+            <a:ext cx="2844798" cy="365125"/>
           </a:xfrm>
           <a:prstGeom prst="rect">
             <a:avLst/>
@@ -4081,9 +4081,9 @@
   <p:cSld name="">
     <p:spTree>
       <p:nvGrpSpPr>
-        <p:cNvPr id="1" name=""/>
+        <p:cNvPr id="1" name="" hidden="0"/>
         <p:cNvGrpSpPr/>
-        <p:nvPr/>
+        <p:nvPr isPhoto="0" userDrawn="0"/>
       </p:nvGrpSpPr>
       <p:grpSpPr bwMode="auto">
         <a:xfrm>
@@ -4095,23 +4095,23 @@
       </p:grpSpPr>
       <p:sp>
         <p:nvSpPr>
-          <p:cNvPr id="2" name="Заглавие 1"/>
-          <p:cNvSpPr>
-            <a:spLocks noGrp="1"/>
-          </p:cNvSpPr>
-          <p:nvPr>
-            <p:ph type="ctrTitle"/>
+          <p:cNvPr id="2" name="Заглавие 1" hidden="0"/>
+          <p:cNvSpPr>
+            <a:spLocks noGrp="1"/>
+          </p:cNvSpPr>
+          <p:nvPr isPhoto="0" userDrawn="0">
+            <p:ph type="ctrTitle" hasCustomPrompt="0"/>
           </p:nvPr>
         </p:nvSpPr>
         <p:spPr bwMode="auto">
           <a:xfrm flipH="0" flipV="0">
-            <a:off x="1314101" y="1808820"/>
-            <a:ext cx="10002477" cy="720079"/>
+            <a:off x="502118" y="661906"/>
+            <a:ext cx="11316991" cy="1759703"/>
           </a:xfrm>
         </p:spPr>
         <p:txBody>
           <a:bodyPr vertOverflow="overflow" horzOverflow="overflow" vert="horz" wrap="square" lIns="91440" tIns="45720" rIns="91440" bIns="45720" numCol="1" spcCol="0" rtlCol="0" fromWordArt="0" anchor="ctr" anchorCtr="0" forceAA="0" upright="0" compatLnSpc="0">
-            <a:normAutofit fontScale="90000" lnSpcReduction="2000"/>
+            <a:normAutofit/>
           </a:bodyPr>
           <a:lstStyle/>
           <a:p>
@@ -4137,18 +4137,18 @@
       </p:sp>
       <p:sp>
         <p:nvSpPr>
-          <p:cNvPr id="3" name="Подзаглавие 2"/>
-          <p:cNvSpPr>
-            <a:spLocks noGrp="1"/>
-          </p:cNvSpPr>
-          <p:nvPr>
-            <p:ph type="subTitle" idx="1"/>
+          <p:cNvPr id="3" name="Подзаглавие 2" hidden="0"/>
+          <p:cNvSpPr>
+            <a:spLocks noGrp="1"/>
+          </p:cNvSpPr>
+          <p:nvPr isPhoto="0" userDrawn="0">
+            <p:ph type="subTitle" idx="1" hasCustomPrompt="0"/>
           </p:nvPr>
         </p:nvSpPr>
         <p:spPr bwMode="auto">
           <a:xfrm>
             <a:off x="152271" y="2903118"/>
-            <a:ext cx="6720746" cy="720079"/>
+            <a:ext cx="6720745" cy="720079"/>
           </a:xfrm>
         </p:spPr>
         <p:txBody>
@@ -4160,12 +4160,278 @@
             </a:pPr>
             <a:r>
               <a:rPr lang="en-US"/>
-              <a:t>Group:</a:t>
+              <a:t>Group 3</a:t>
             </a:r>
             <a:endParaRPr lang="bg-BG"/>
           </a:p>
         </p:txBody>
       </p:sp>
+      <p:sp>
+        <p:nvSpPr>
+          <p:cNvPr id="1843669327" name="Подзаглавие 2" hidden="0"/>
+          <p:cNvSpPr>
+            <a:spLocks noGrp="1"/>
+          </p:cNvSpPr>
+          <p:nvPr isPhoto="0" userDrawn="0"/>
+        </p:nvSpPr>
+        <p:spPr bwMode="auto">
+          <a:xfrm flipH="0" flipV="0">
+            <a:off x="4137788" y="2790108"/>
+            <a:ext cx="7310007" cy="3845101"/>
+          </a:xfrm>
+        </p:spPr>
+        <p:txBody>
+          <a:bodyPr vertOverflow="overflow" horzOverflow="clip" vert="horz" wrap="square" lIns="91440" tIns="45720" rIns="91440" bIns="45720" numCol="1" spcCol="0" rtlCol="0" fromWordArt="0" anchor="t" anchorCtr="0" forceAA="0" upright="0" compatLnSpc="0">
+            <a:normAutofit/>
+          </a:bodyPr>
+          <a:lstStyle>
+            <a:lvl1pPr marL="0" indent="0" algn="r" defTabSz="914400">
+              <a:spcBef>
+                <a:spcPts val="0"/>
+              </a:spcBef>
+              <a:buFont typeface="Arial"/>
+              <a:buNone/>
+              <a:defRPr sz="3200">
+                <a:solidFill>
+                  <a:schemeClr val="tx1">
+                    <a:lumMod val="50000"/>
+                    <a:lumOff val="50000"/>
+                  </a:schemeClr>
+                </a:solidFill>
+                <a:latin typeface="+mn-lt"/>
+                <a:ea typeface="+mn-ea"/>
+                <a:cs typeface="+mn-cs"/>
+              </a:defRPr>
+            </a:lvl1pPr>
+            <a:lvl2pPr marL="457200" indent="0" algn="ctr" defTabSz="914400">
+              <a:spcBef>
+                <a:spcPts val="0"/>
+              </a:spcBef>
+              <a:buFont typeface="Arial"/>
+              <a:buNone/>
+              <a:defRPr sz="2800">
+                <a:solidFill>
+                  <a:schemeClr val="tx1">
+                    <a:tint val="75000"/>
+                  </a:schemeClr>
+                </a:solidFill>
+                <a:latin typeface="+mn-lt"/>
+                <a:ea typeface="+mn-ea"/>
+                <a:cs typeface="+mn-cs"/>
+              </a:defRPr>
+            </a:lvl2pPr>
+            <a:lvl3pPr marL="914400" indent="0" algn="ctr" defTabSz="914400">
+              <a:spcBef>
+                <a:spcPts val="0"/>
+              </a:spcBef>
+              <a:buFont typeface="Arial"/>
+              <a:buNone/>
+              <a:defRPr sz="2400">
+                <a:solidFill>
+                  <a:schemeClr val="tx1">
+                    <a:tint val="75000"/>
+                  </a:schemeClr>
+                </a:solidFill>
+                <a:latin typeface="+mn-lt"/>
+                <a:ea typeface="+mn-ea"/>
+                <a:cs typeface="+mn-cs"/>
+              </a:defRPr>
+            </a:lvl3pPr>
+            <a:lvl4pPr marL="1371600" indent="0" algn="ctr" defTabSz="914400">
+              <a:spcBef>
+                <a:spcPts val="0"/>
+              </a:spcBef>
+              <a:buFont typeface="Arial"/>
+              <a:buNone/>
+              <a:defRPr sz="2000">
+                <a:solidFill>
+                  <a:schemeClr val="tx1">
+                    <a:tint val="75000"/>
+                  </a:schemeClr>
+                </a:solidFill>
+                <a:latin typeface="+mn-lt"/>
+                <a:ea typeface="+mn-ea"/>
+                <a:cs typeface="+mn-cs"/>
+              </a:defRPr>
+            </a:lvl4pPr>
+            <a:lvl5pPr marL="1828800" indent="0" algn="ctr" defTabSz="914400">
+              <a:spcBef>
+                <a:spcPts val="0"/>
+              </a:spcBef>
+              <a:buFont typeface="Arial"/>
+              <a:buNone/>
+              <a:defRPr sz="2000">
+                <a:solidFill>
+                  <a:schemeClr val="tx1">
+                    <a:tint val="75000"/>
+                  </a:schemeClr>
+                </a:solidFill>
+                <a:latin typeface="+mn-lt"/>
+                <a:ea typeface="+mn-ea"/>
+                <a:cs typeface="+mn-cs"/>
+              </a:defRPr>
+            </a:lvl5pPr>
+            <a:lvl6pPr marL="2286000" indent="0" algn="ctr" defTabSz="914400">
+              <a:spcBef>
+                <a:spcPts val="0"/>
+              </a:spcBef>
+              <a:buFont typeface="Arial"/>
+              <a:buNone/>
+              <a:defRPr sz="2000">
+                <a:solidFill>
+                  <a:schemeClr val="tx1">
+                    <a:tint val="75000"/>
+                  </a:schemeClr>
+                </a:solidFill>
+                <a:latin typeface="+mn-lt"/>
+                <a:ea typeface="+mn-ea"/>
+                <a:cs typeface="+mn-cs"/>
+              </a:defRPr>
+            </a:lvl6pPr>
+            <a:lvl7pPr marL="2743200" indent="0" algn="ctr" defTabSz="914400">
+              <a:spcBef>
+                <a:spcPts val="0"/>
+              </a:spcBef>
+              <a:buFont typeface="Arial"/>
+              <a:buNone/>
+              <a:defRPr sz="2000">
+                <a:solidFill>
+                  <a:schemeClr val="tx1">
+                    <a:tint val="75000"/>
+                  </a:schemeClr>
+                </a:solidFill>
+                <a:latin typeface="+mn-lt"/>
+                <a:ea typeface="+mn-ea"/>
+                <a:cs typeface="+mn-cs"/>
+              </a:defRPr>
+            </a:lvl7pPr>
+            <a:lvl8pPr marL="3200400" indent="0" algn="ctr" defTabSz="914400">
+              <a:spcBef>
+                <a:spcPts val="0"/>
+              </a:spcBef>
+              <a:buFont typeface="Arial"/>
+              <a:buNone/>
+              <a:defRPr sz="2000">
+                <a:solidFill>
+                  <a:schemeClr val="tx1">
+                    <a:tint val="75000"/>
+                  </a:schemeClr>
+                </a:solidFill>
+                <a:latin typeface="+mn-lt"/>
+                <a:ea typeface="+mn-ea"/>
+                <a:cs typeface="+mn-cs"/>
+              </a:defRPr>
+            </a:lvl8pPr>
+            <a:lvl9pPr marL="3657600" indent="0" algn="ctr" defTabSz="914400">
+              <a:spcBef>
+                <a:spcPts val="0"/>
+              </a:spcBef>
+              <a:buFont typeface="Arial"/>
+              <a:buNone/>
+              <a:defRPr sz="2000">
+                <a:solidFill>
+                  <a:schemeClr val="tx1">
+                    <a:tint val="75000"/>
+                  </a:schemeClr>
+                </a:solidFill>
+                <a:latin typeface="+mn-lt"/>
+                <a:ea typeface="+mn-ea"/>
+                <a:cs typeface="+mn-cs"/>
+              </a:defRPr>
+            </a:lvl9pPr>
+          </a:lstStyle>
+          <a:p>
+            <a:pPr>
+              <a:defRPr/>
+            </a:pPr>
+            <a:r>
+              <a:rPr lang="en-US"/>
+              <a:t>Irine Khubua </a:t>
+            </a:r>
+            <a:endParaRPr lang="en-US"/>
+          </a:p>
+          <a:p>
+            <a:pPr>
+              <a:defRPr/>
+            </a:pPr>
+            <a:r>
+              <a:rPr lang="bg-BG"/>
+              <a:t>Kostadin Kostadinov</a:t>
+            </a:r>
+            <a:endParaRPr lang="bg-BG"/>
+          </a:p>
+          <a:p>
+            <a:pPr>
+              <a:defRPr/>
+            </a:pPr>
+            <a:r>
+              <a:rPr lang="bg-BG"/>
+              <a:t>Vihar Kotecha</a:t>
+            </a:r>
+            <a:endParaRPr lang="bg-BG"/>
+          </a:p>
+          <a:p>
+            <a:pPr>
+              <a:defRPr/>
+            </a:pPr>
+            <a:r>
+              <a:rPr lang="bg-BG"/>
+              <a:t>Olgha Kukhianidze</a:t>
+            </a:r>
+            <a:endParaRPr lang="bg-BG"/>
+          </a:p>
+          <a:p>
+            <a:pPr>
+              <a:defRPr/>
+            </a:pPr>
+            <a:r>
+              <a:rPr lang="bg-BG"/>
+              <a:t>Bojana Letic</a:t>
+            </a:r>
+            <a:endParaRPr lang="bg-BG"/>
+          </a:p>
+        </p:txBody>
+      </p:sp>
+      <p:cxnSp>
+        <p:nvCxnSpPr>
+          <p:cNvPr id="0" name="" hidden="0"/>
+          <p:cNvCxnSpPr>
+            <a:cxnSpLocks/>
+          </p:cNvCxnSpPr>
+          <p:nvPr isPhoto="0" userDrawn="0"/>
+        </p:nvCxnSpPr>
+        <p:spPr bwMode="auto">
+          <a:xfrm flipH="0" flipV="0">
+            <a:off x="7195898" y="2854685"/>
+            <a:ext cx="0" cy="3018940"/>
+          </a:xfrm>
+          <a:prstGeom prst="line">
+            <a:avLst/>
+          </a:prstGeom>
+          <a:ln w="9525" cap="flat" cmpd="sng" algn="ctr">
+            <a:solidFill>
+              <a:schemeClr val="tx1"/>
+            </a:solidFill>
+            <a:prstDash val="solid"/>
+          </a:ln>
+        </p:spPr>
+        <p:style>
+          <a:lnRef idx="1">
+            <a:schemeClr val="accent1">
+              <a:shade val="50000"/>
+            </a:schemeClr>
+          </a:lnRef>
+          <a:fillRef idx="0">
+            <a:schemeClr val="accent1"/>
+          </a:fillRef>
+          <a:effectRef idx="0">
+            <a:schemeClr val="accent1"/>
+          </a:effectRef>
+          <a:fontRef idx="minor">
+            <a:schemeClr val="tx1"/>
+          </a:fontRef>
+        </p:style>
+      </p:cxnSp>
     </p:spTree>
   </p:cSld>
   <p:clrMapOvr>
@@ -4187,9 +4453,9 @@
   <p:cSld name="">
     <p:spTree>
       <p:nvGrpSpPr>
-        <p:cNvPr id="1" name=""/>
+        <p:cNvPr id="1" name="" hidden="0"/>
         <p:cNvGrpSpPr/>
-        <p:nvPr/>
+        <p:nvPr isPhoto="0" userDrawn="0"/>
       </p:nvGrpSpPr>
       <p:grpSpPr bwMode="auto">
         <a:xfrm>
@@ -4201,12 +4467,12 @@
       </p:grpSpPr>
       <p:sp>
         <p:nvSpPr>
-          <p:cNvPr id="1634651692" name="Заголовок 1"/>
-          <p:cNvSpPr>
-            <a:spLocks noGrp="1"/>
-          </p:cNvSpPr>
-          <p:nvPr>
-            <p:ph type="title"/>
+          <p:cNvPr id="1634651692" name="Заголовок 1" hidden="0"/>
+          <p:cNvSpPr>
+            <a:spLocks noGrp="1"/>
+          </p:cNvSpPr>
+          <p:nvPr isPhoto="0" userDrawn="0">
+            <p:ph type="title" hasCustomPrompt="0"/>
           </p:nvPr>
         </p:nvSpPr>
         <p:spPr bwMode="auto"/>
@@ -4236,12 +4502,12 @@
       </p:sp>
       <p:sp>
         <p:nvSpPr>
-          <p:cNvPr id="309910196" name="Объект 2"/>
-          <p:cNvSpPr>
-            <a:spLocks noGrp="1"/>
-          </p:cNvSpPr>
-          <p:nvPr>
-            <p:ph idx="1"/>
+          <p:cNvPr id="309910196" name="Объект 2" hidden="0"/>
+          <p:cNvSpPr>
+            <a:spLocks noGrp="1"/>
+          </p:cNvSpPr>
+          <p:nvPr isPhoto="0" userDrawn="0">
+            <p:ph idx="1" hasCustomPrompt="0"/>
           </p:nvPr>
         </p:nvSpPr>
         <p:spPr bwMode="auto"/>
@@ -4363,9 +4629,9 @@
   <p:cSld name="">
     <p:spTree>
       <p:nvGrpSpPr>
-        <p:cNvPr id="1" name=""/>
+        <p:cNvPr id="1" name="" hidden="0"/>
         <p:cNvGrpSpPr/>
-        <p:nvPr/>
+        <p:nvPr isPhoto="0" userDrawn="0"/>
       </p:nvGrpSpPr>
       <p:grpSpPr bwMode="auto">
         <a:xfrm>
@@ -4377,12 +4643,12 @@
       </p:grpSpPr>
       <p:sp>
         <p:nvSpPr>
-          <p:cNvPr id="1855313048" name="Заголовок 1"/>
-          <p:cNvSpPr>
-            <a:spLocks noGrp="1"/>
-          </p:cNvSpPr>
-          <p:nvPr>
-            <p:ph type="title"/>
+          <p:cNvPr id="1855313048" name="Заголовок 1" hidden="0"/>
+          <p:cNvSpPr>
+            <a:spLocks noGrp="1"/>
+          </p:cNvSpPr>
+          <p:nvPr isPhoto="0" userDrawn="0">
+            <p:ph type="title" hasCustomPrompt="0"/>
           </p:nvPr>
         </p:nvSpPr>
         <p:spPr bwMode="auto"/>
@@ -4412,12 +4678,12 @@
       </p:sp>
       <p:sp>
         <p:nvSpPr>
-          <p:cNvPr id="1781115270" name="Объект 2"/>
-          <p:cNvSpPr>
-            <a:spLocks noGrp="1"/>
-          </p:cNvSpPr>
-          <p:nvPr>
-            <p:ph idx="1"/>
+          <p:cNvPr id="1781115270" name="Объект 2" hidden="0"/>
+          <p:cNvSpPr>
+            <a:spLocks noGrp="1"/>
+          </p:cNvSpPr>
+          <p:nvPr isPhoto="0" userDrawn="0">
+            <p:ph idx="1" hasCustomPrompt="0"/>
           </p:nvPr>
         </p:nvSpPr>
         <p:spPr bwMode="auto"/>
@@ -4653,9 +4919,9 @@
   <p:cSld name="">
     <p:spTree>
       <p:nvGrpSpPr>
-        <p:cNvPr id="1" name=""/>
+        <p:cNvPr id="1" name="" hidden="0"/>
         <p:cNvGrpSpPr/>
-        <p:nvPr/>
+        <p:nvPr isPhoto="0" userDrawn="0"/>
       </p:nvGrpSpPr>
       <p:grpSpPr bwMode="auto">
         <a:xfrm>
@@ -4667,12 +4933,12 @@
       </p:grpSpPr>
       <p:sp>
         <p:nvSpPr>
-          <p:cNvPr id="1409576028" name="Заголовок 1"/>
-          <p:cNvSpPr>
-            <a:spLocks noGrp="1"/>
-          </p:cNvSpPr>
-          <p:nvPr>
-            <p:ph type="title"/>
+          <p:cNvPr id="1409576028" name="Заголовок 1" hidden="0"/>
+          <p:cNvSpPr>
+            <a:spLocks noGrp="1"/>
+          </p:cNvSpPr>
+          <p:nvPr isPhoto="0" userDrawn="0">
+            <p:ph type="title" hasCustomPrompt="0"/>
           </p:nvPr>
         </p:nvSpPr>
         <p:spPr bwMode="auto"/>
@@ -4702,12 +4968,12 @@
       </p:sp>
       <p:sp>
         <p:nvSpPr>
-          <p:cNvPr id="1695486147" name="Объект 2"/>
-          <p:cNvSpPr>
-            <a:spLocks noGrp="1"/>
-          </p:cNvSpPr>
-          <p:nvPr>
-            <p:ph idx="1"/>
+          <p:cNvPr id="1695486147" name="Объект 2" hidden="0"/>
+          <p:cNvSpPr>
+            <a:spLocks noGrp="1"/>
+          </p:cNvSpPr>
+          <p:nvPr isPhoto="0" userDrawn="0">
+            <p:ph idx="1" hasCustomPrompt="0"/>
           </p:nvPr>
         </p:nvSpPr>
         <p:spPr bwMode="auto"/>
@@ -4840,9 +5106,9 @@
   <p:cSld name="">
     <p:spTree>
       <p:nvGrpSpPr>
-        <p:cNvPr id="1" name=""/>
+        <p:cNvPr id="1" name="" hidden="0"/>
         <p:cNvGrpSpPr/>
-        <p:nvPr/>
+        <p:nvPr isPhoto="0" userDrawn="0"/>
       </p:nvGrpSpPr>
       <p:grpSpPr bwMode="auto">
         <a:xfrm>
@@ -4854,12 +5120,12 @@
       </p:grpSpPr>
       <p:sp>
         <p:nvSpPr>
-          <p:cNvPr id="86301605" name="Заголовок 1"/>
-          <p:cNvSpPr>
-            <a:spLocks noGrp="1"/>
-          </p:cNvSpPr>
-          <p:nvPr>
-            <p:ph type="title"/>
+          <p:cNvPr id="86301605" name="Заголовок 1" hidden="0"/>
+          <p:cNvSpPr>
+            <a:spLocks noGrp="1"/>
+          </p:cNvSpPr>
+          <p:nvPr isPhoto="0" userDrawn="0">
+            <p:ph type="title" hasCustomPrompt="0"/>
           </p:nvPr>
         </p:nvSpPr>
         <p:spPr bwMode="auto"/>
@@ -4889,12 +5155,12 @@
       </p:sp>
       <p:sp>
         <p:nvSpPr>
-          <p:cNvPr id="1258433282" name="Объект 2"/>
-          <p:cNvSpPr>
-            <a:spLocks noGrp="1"/>
-          </p:cNvSpPr>
-          <p:nvPr>
-            <p:ph idx="1"/>
+          <p:cNvPr id="1258433282" name="Объект 2" hidden="0"/>
+          <p:cNvSpPr>
+            <a:spLocks noGrp="1"/>
+          </p:cNvSpPr>
+          <p:nvPr isPhoto="0" userDrawn="0">
+            <p:ph idx="1" hasCustomPrompt="0"/>
           </p:nvPr>
         </p:nvSpPr>
         <p:spPr bwMode="auto"/>
@@ -4997,9 +5263,9 @@
   <p:cSld name="">
     <p:spTree>
       <p:nvGrpSpPr>
-        <p:cNvPr id="1" name=""/>
+        <p:cNvPr id="1" name="" hidden="0"/>
         <p:cNvGrpSpPr/>
-        <p:nvPr/>
+        <p:nvPr isPhoto="0" userDrawn="0"/>
       </p:nvGrpSpPr>
       <p:grpSpPr bwMode="auto">
         <a:xfrm>
@@ -5011,12 +5277,12 @@
       </p:grpSpPr>
       <p:sp>
         <p:nvSpPr>
-          <p:cNvPr id="738719686" name="Заголовок 1"/>
-          <p:cNvSpPr>
-            <a:spLocks noGrp="1"/>
-          </p:cNvSpPr>
-          <p:nvPr>
-            <p:ph type="title"/>
+          <p:cNvPr id="738719686" name="Заголовок 1" hidden="0"/>
+          <p:cNvSpPr>
+            <a:spLocks noGrp="1"/>
+          </p:cNvSpPr>
+          <p:nvPr isPhoto="0" userDrawn="0">
+            <p:ph type="title" hasCustomPrompt="0"/>
           </p:nvPr>
         </p:nvSpPr>
         <p:spPr bwMode="auto"/>
@@ -5046,12 +5312,12 @@
       </p:sp>
       <p:sp>
         <p:nvSpPr>
-          <p:cNvPr id="2000400029" name="Объект 2"/>
-          <p:cNvSpPr>
-            <a:spLocks noGrp="1"/>
-          </p:cNvSpPr>
-          <p:nvPr>
-            <p:ph idx="1"/>
+          <p:cNvPr id="2000400029" name="Объект 2" hidden="0"/>
+          <p:cNvSpPr>
+            <a:spLocks noGrp="1"/>
+          </p:cNvSpPr>
+          <p:nvPr isPhoto="0" userDrawn="0">
+            <p:ph idx="1" hasCustomPrompt="0"/>
           </p:nvPr>
         </p:nvSpPr>
         <p:spPr bwMode="auto"/>
@@ -5203,9 +5469,9 @@
   <p:cSld name="">
     <p:spTree>
       <p:nvGrpSpPr>
-        <p:cNvPr id="1" name=""/>
+        <p:cNvPr id="1" name="" hidden="0"/>
         <p:cNvGrpSpPr/>
-        <p:nvPr/>
+        <p:nvPr isPhoto="0" userDrawn="0"/>
       </p:nvGrpSpPr>
       <p:grpSpPr bwMode="auto">
         <a:xfrm>
@@ -5217,12 +5483,12 @@
       </p:grpSpPr>
       <p:sp>
         <p:nvSpPr>
-          <p:cNvPr id="1439137211" name="Заголовок 1"/>
-          <p:cNvSpPr>
-            <a:spLocks noGrp="1"/>
-          </p:cNvSpPr>
-          <p:nvPr>
-            <p:ph type="title"/>
+          <p:cNvPr id="1439137211" name="Заголовок 1" hidden="0"/>
+          <p:cNvSpPr>
+            <a:spLocks noGrp="1"/>
+          </p:cNvSpPr>
+          <p:nvPr isPhoto="0" userDrawn="0">
+            <p:ph type="title" hasCustomPrompt="0"/>
           </p:nvPr>
         </p:nvSpPr>
         <p:spPr bwMode="auto"/>
@@ -5252,12 +5518,12 @@
       </p:sp>
       <p:sp>
         <p:nvSpPr>
-          <p:cNvPr id="544118936" name="Объект 2"/>
-          <p:cNvSpPr>
-            <a:spLocks noGrp="1"/>
-          </p:cNvSpPr>
-          <p:nvPr>
-            <p:ph idx="1"/>
+          <p:cNvPr id="544118936" name="Объект 2" hidden="0"/>
+          <p:cNvSpPr>
+            <a:spLocks noGrp="1"/>
+          </p:cNvSpPr>
+          <p:nvPr isPhoto="0" userDrawn="0">
+            <p:ph idx="1" hasCustomPrompt="0"/>
           </p:nvPr>
         </p:nvSpPr>
         <p:spPr bwMode="auto"/>
@@ -5379,9 +5645,9 @@
   <p:cSld name="">
     <p:spTree>
       <p:nvGrpSpPr>
-        <p:cNvPr id="1" name=""/>
+        <p:cNvPr id="1" name="" hidden="0"/>
         <p:cNvGrpSpPr/>
-        <p:nvPr/>
+        <p:nvPr isPhoto="0" userDrawn="0"/>
       </p:nvGrpSpPr>
       <p:grpSpPr bwMode="auto">
         <a:xfrm>
@@ -5393,12 +5659,12 @@
       </p:grpSpPr>
       <p:sp>
         <p:nvSpPr>
-          <p:cNvPr id="1090714944" name="Заголовок 1"/>
-          <p:cNvSpPr>
-            <a:spLocks noGrp="1"/>
-          </p:cNvSpPr>
-          <p:nvPr>
-            <p:ph type="title"/>
+          <p:cNvPr id="1090714944" name="Заголовок 1" hidden="0"/>
+          <p:cNvSpPr>
+            <a:spLocks noGrp="1"/>
+          </p:cNvSpPr>
+          <p:nvPr isPhoto="0" userDrawn="0">
+            <p:ph type="title" hasCustomPrompt="0"/>
           </p:nvPr>
         </p:nvSpPr>
         <p:spPr bwMode="auto"/>
@@ -5428,12 +5694,12 @@
       </p:sp>
       <p:sp>
         <p:nvSpPr>
-          <p:cNvPr id="1133048120" name="Объект 2"/>
-          <p:cNvSpPr>
-            <a:spLocks noGrp="1"/>
-          </p:cNvSpPr>
-          <p:nvPr>
-            <p:ph idx="1"/>
+          <p:cNvPr id="1133048120" name="Объект 2" hidden="0"/>
+          <p:cNvSpPr>
+            <a:spLocks noGrp="1"/>
+          </p:cNvSpPr>
+          <p:nvPr isPhoto="0" userDrawn="0">
+            <p:ph idx="1" hasCustomPrompt="0"/>
           </p:nvPr>
         </p:nvSpPr>
         <p:spPr bwMode="auto"/>
@@ -5716,9 +5982,9 @@
   <p:cSld name="">
     <p:spTree>
       <p:nvGrpSpPr>
-        <p:cNvPr id="1" name=""/>
+        <p:cNvPr id="1" name="" hidden="0"/>
         <p:cNvGrpSpPr/>
-        <p:nvPr/>
+        <p:nvPr isPhoto="0" userDrawn="0"/>
       </p:nvGrpSpPr>
       <p:grpSpPr bwMode="auto">
         <a:xfrm>
@@ -5730,12 +5996,12 @@
       </p:grpSpPr>
       <p:sp>
         <p:nvSpPr>
-          <p:cNvPr id="817312774" name="Заголовок 1"/>
-          <p:cNvSpPr>
-            <a:spLocks noGrp="1"/>
-          </p:cNvSpPr>
-          <p:nvPr>
-            <p:ph type="title"/>
+          <p:cNvPr id="817312774" name="Заголовок 1" hidden="0"/>
+          <p:cNvSpPr>
+            <a:spLocks noGrp="1"/>
+          </p:cNvSpPr>
+          <p:nvPr isPhoto="0" userDrawn="0">
+            <p:ph type="title" hasCustomPrompt="0"/>
           </p:nvPr>
         </p:nvSpPr>
         <p:spPr bwMode="auto"/>
@@ -5765,12 +6031,12 @@
       </p:sp>
       <p:sp>
         <p:nvSpPr>
-          <p:cNvPr id="1202703553" name="Объект 2"/>
-          <p:cNvSpPr>
-            <a:spLocks noGrp="1"/>
-          </p:cNvSpPr>
-          <p:nvPr>
-            <p:ph idx="1"/>
+          <p:cNvPr id="1202703553" name="Объект 2" hidden="0"/>
+          <p:cNvSpPr>
+            <a:spLocks noGrp="1"/>
+          </p:cNvSpPr>
+          <p:nvPr isPhoto="0" userDrawn="0">
+            <p:ph idx="1" hasCustomPrompt="0"/>
           </p:nvPr>
         </p:nvSpPr>
         <p:spPr bwMode="auto"/>
@@ -5978,9 +6244,9 @@
   <p:cSld name="">
     <p:spTree>
       <p:nvGrpSpPr>
-        <p:cNvPr id="1" name=""/>
+        <p:cNvPr id="1" name="" hidden="0"/>
         <p:cNvGrpSpPr/>
-        <p:nvPr/>
+        <p:nvPr isPhoto="0" userDrawn="0"/>
       </p:nvGrpSpPr>
       <p:grpSpPr bwMode="auto">
         <a:xfrm>
@@ -5992,12 +6258,12 @@
       </p:grpSpPr>
       <p:sp>
         <p:nvSpPr>
-          <p:cNvPr id="2137994161" name="Заголовок 1"/>
-          <p:cNvSpPr>
-            <a:spLocks noGrp="1"/>
-          </p:cNvSpPr>
-          <p:nvPr>
-            <p:ph type="title"/>
+          <p:cNvPr id="2137994161" name="Заголовок 1" hidden="0"/>
+          <p:cNvSpPr>
+            <a:spLocks noGrp="1"/>
+          </p:cNvSpPr>
+          <p:nvPr isPhoto="0" userDrawn="0">
+            <p:ph type="title" hasCustomPrompt="0"/>
           </p:nvPr>
         </p:nvSpPr>
         <p:spPr bwMode="auto"/>
@@ -6027,12 +6293,12 @@
       </p:sp>
       <p:sp>
         <p:nvSpPr>
-          <p:cNvPr id="726372431" name="Объект 2"/>
-          <p:cNvSpPr>
-            <a:spLocks noGrp="1"/>
-          </p:cNvSpPr>
-          <p:nvPr>
-            <p:ph idx="1"/>
+          <p:cNvPr id="726372431" name="Объект 2" hidden="0"/>
+          <p:cNvSpPr>
+            <a:spLocks noGrp="1"/>
+          </p:cNvSpPr>
+          <p:nvPr isPhoto="0" userDrawn="0">
+            <p:ph idx="1" hasCustomPrompt="0"/>
           </p:nvPr>
         </p:nvSpPr>
         <p:spPr bwMode="auto"/>
@@ -6182,9 +6448,9 @@
   <p:cSld name="">
     <p:spTree>
       <p:nvGrpSpPr>
-        <p:cNvPr id="1" name=""/>
+        <p:cNvPr id="1" name="" hidden="0"/>
         <p:cNvGrpSpPr/>
-        <p:nvPr/>
+        <p:nvPr isPhoto="0" userDrawn="0"/>
       </p:nvGrpSpPr>
       <p:grpSpPr bwMode="auto">
         <a:xfrm>
@@ -6196,12 +6462,12 @@
       </p:grpSpPr>
       <p:sp>
         <p:nvSpPr>
-          <p:cNvPr id="1831208734" name="Заголовок 1"/>
-          <p:cNvSpPr>
-            <a:spLocks noGrp="1"/>
-          </p:cNvSpPr>
-          <p:nvPr>
-            <p:ph type="title"/>
+          <p:cNvPr id="1831208734" name="Заголовок 1" hidden="0"/>
+          <p:cNvSpPr>
+            <a:spLocks noGrp="1"/>
+          </p:cNvSpPr>
+          <p:nvPr isPhoto="0" userDrawn="0">
+            <p:ph type="title" hasCustomPrompt="0"/>
           </p:nvPr>
         </p:nvSpPr>
         <p:spPr bwMode="auto"/>
@@ -6231,12 +6497,12 @@
       </p:sp>
       <p:sp>
         <p:nvSpPr>
-          <p:cNvPr id="1155402581" name="Объект 2"/>
-          <p:cNvSpPr>
-            <a:spLocks noGrp="1"/>
-          </p:cNvSpPr>
-          <p:nvPr>
-            <p:ph idx="1"/>
+          <p:cNvPr id="1155402581" name="Объект 2" hidden="0"/>
+          <p:cNvSpPr>
+            <a:spLocks noGrp="1"/>
+          </p:cNvSpPr>
+          <p:nvPr isPhoto="0" userDrawn="0">
+            <p:ph idx="1" hasCustomPrompt="0"/>
           </p:nvPr>
         </p:nvSpPr>
         <p:spPr bwMode="auto"/>

</xml_diff>

<commit_message>
renamed:    README -> README.md modified:   group_assigment/group_assigment.pptx
</commit_message>
<xml_diff>
--- a/group_assigment/group_assigment.pptx
+++ b/group_assigment/group_assigment.pptx
@@ -4079,6 +4079,13 @@
 <file path=ppt/slides/slide1.xml><?xml version="1.0" encoding="utf-8"?>
 <p:sld xmlns:a="http://schemas.openxmlformats.org/drawingml/2006/main" xmlns:r="http://schemas.openxmlformats.org/officeDocument/2006/relationships" xmlns:p="http://schemas.openxmlformats.org/presentationml/2006/main" xmlns:m="http://schemas.openxmlformats.org/officeDocument/2006/math" xmlns:w="http://schemas.openxmlformats.org/wordprocessingml/2006/main" showMasterPhAnim="0" show="1">
   <p:cSld name="">
+    <p:bg>
+      <p:bgPr shadeToTitle="0">
+        <a:solidFill>
+          <a:schemeClr val="bg1"/>
+        </a:solidFill>
+      </p:bgPr>
+    </p:bg>
     <p:spTree>
       <p:nvGrpSpPr>
         <p:cNvPr id="1" name="" hidden="0"/>
@@ -4119,17 +4126,16 @@
               <a:defRPr/>
             </a:pPr>
             <a:r>
-              <a:rPr lang="bg-BG" sz="4400" b="0" i="0" u="none" strike="noStrike" cap="none" spc="0">
-                <a:solidFill>
-                  <a:schemeClr val="tx1">
-                    <a:lumMod val="65000"/>
-                    <a:lumOff val="35000"/>
-                  </a:schemeClr>
-                </a:solidFill>
-                <a:latin typeface="Arial"/>
-                <a:cs typeface="Arial"/>
-              </a:rPr>
-              <a:t>RESEARCH PROPOSAL FOR AN ECONOMIC EVALUATION</a:t>
+              <a:rPr lang="bg-BG"/>
+              <a:t>RESEARCH PROPOSAL FOR AN </a:t>
+            </a:r>
+            <a:r>
+              <a:rPr lang="bg-BG"/>
+              <a:t>ECONOMIC </a:t>
+            </a:r>
+            <a:r>
+              <a:rPr lang="bg-BG"/>
+              <a:t>EVALUATION</a:t>
             </a:r>
             <a:endParaRPr lang="bg-BG"/>
           </a:p>
@@ -4976,7 +4982,12 @@
             <p:ph idx="1" hasCustomPrompt="0"/>
           </p:nvPr>
         </p:nvSpPr>
-        <p:spPr bwMode="auto"/>
+        <p:spPr bwMode="auto">
+          <a:xfrm>
+            <a:off x="415869" y="2019946"/>
+            <a:ext cx="10972800" cy="4525961"/>
+          </a:xfrm>
+        </p:spPr>
         <p:txBody>
           <a:bodyPr/>
           <a:lstStyle/>
@@ -6594,42 +6605,42 @@
 <file path=ppt/theme/theme1.xml><?xml version="1.0" encoding="utf-8"?>
 <a:theme xmlns:a="http://schemas.openxmlformats.org/drawingml/2006/main" xmlns:r="http://schemas.openxmlformats.org/officeDocument/2006/relationships" xmlns:p="http://schemas.openxmlformats.org/presentationml/2006/main" name="Turtle">
   <a:themeElements>
-    <a:clrScheme name="Office">
+    <a:clrScheme name="Aspect">
       <a:dk1>
-        <a:sysClr val="windowText" lastClr="000000"/>
+        <a:srgbClr val="000000"/>
       </a:dk1>
       <a:lt1>
-        <a:sysClr val="window" lastClr="FFFFFF"/>
+        <a:srgbClr val="FFFFFF"/>
       </a:lt1>
       <a:dk2>
-        <a:srgbClr val="1F497D"/>
+        <a:srgbClr val="323232"/>
       </a:dk2>
       <a:lt2>
-        <a:srgbClr val="EEECE1"/>
+        <a:srgbClr val="E3DED1"/>
       </a:lt2>
       <a:accent1>
-        <a:srgbClr val="4F81BD"/>
+        <a:srgbClr val="F07F09"/>
       </a:accent1>
       <a:accent2>
-        <a:srgbClr val="C0504D"/>
+        <a:srgbClr val="9F2936"/>
       </a:accent2>
       <a:accent3>
-        <a:srgbClr val="9BBB59"/>
+        <a:srgbClr val="1B587C"/>
       </a:accent3>
       <a:accent4>
-        <a:srgbClr val="8064A2"/>
+        <a:srgbClr val="4E8542"/>
       </a:accent4>
       <a:accent5>
-        <a:srgbClr val="4BACC6"/>
+        <a:srgbClr val="604878"/>
       </a:accent5>
       <a:accent6>
-        <a:srgbClr val="F79646"/>
+        <a:srgbClr val="C19859"/>
       </a:accent6>
       <a:hlink>
-        <a:srgbClr val="0000FF"/>
+        <a:srgbClr val="6B9F25"/>
       </a:hlink>
       <a:folHlink>
-        <a:srgbClr val="800080"/>
+        <a:srgbClr val="B26B02"/>
       </a:folHlink>
     </a:clrScheme>
     <a:fontScheme name="Классическая 2">

</xml_diff>

<commit_message>
modified:   README.md 	modified:   group_assigment/group_assigment.pptx 	deleted:    lectures/02.md 	modified:   lectures/04.md 	new file:   lectures/05.md
</commit_message>
<xml_diff>
--- a/group_assigment/group_assigment.pptx
+++ b/group_assigment/group_assigment.pptx
@@ -4112,8 +4112,8 @@
         </p:nvSpPr>
         <p:spPr bwMode="auto">
           <a:xfrm flipH="0" flipV="0">
-            <a:off x="502118" y="661906"/>
-            <a:ext cx="11316991" cy="1759703"/>
+            <a:off x="453686" y="320065"/>
+            <a:ext cx="11074830" cy="2211737"/>
           </a:xfrm>
         </p:spPr>
         <p:txBody>
@@ -4126,18 +4126,128 @@
               <a:defRPr/>
             </a:pPr>
             <a:r>
-              <a:rPr lang="bg-BG"/>
-              <a:t>RESEARCH PROPOSAL FOR AN </a:t>
-            </a:r>
-            <a:r>
-              <a:rPr lang="bg-BG"/>
+              <a:rPr lang="bg-BG" sz="2800" b="0">
+                <a:solidFill>
+                  <a:schemeClr val="tx1"/>
+                </a:solidFill>
+                <a:latin typeface="Arial"/>
+                <a:ea typeface="Arial"/>
+                <a:cs typeface="Arial"/>
+              </a:rPr>
+              <a:t>RESEARCH PROPOSAL FOR </a:t>
+            </a:r>
+            <a:r>
+              <a:rPr lang="bg-BG" sz="2800" b="0" i="0" u="none" strike="noStrike" cap="none" spc="0">
+                <a:solidFill>
+                  <a:schemeClr val="tx1"/>
+                </a:solidFill>
+                <a:latin typeface="Arial"/>
+                <a:ea typeface="Arial"/>
+                <a:cs typeface="Arial"/>
+              </a:rPr>
               <a:t>ECONOMIC </a:t>
             </a:r>
             <a:r>
-              <a:rPr lang="bg-BG"/>
+              <a:rPr lang="bg-BG" sz="2800" b="0" i="0" u="none" strike="noStrike" cap="none" spc="0">
+                <a:solidFill>
+                  <a:schemeClr val="tx1"/>
+                </a:solidFill>
+                <a:latin typeface="Arial"/>
+                <a:ea typeface="Arial"/>
+                <a:cs typeface="Arial"/>
+              </a:rPr>
               <a:t>EVALUATION</a:t>
             </a:r>
-            <a:endParaRPr lang="bg-BG"/>
+            <a:r>
+              <a:rPr lang="bg-BG" sz="2800" b="0" i="0" u="none" strike="noStrike" cap="none" spc="-16">
+                <a:solidFill>
+                  <a:schemeClr val="tx1"/>
+                </a:solidFill>
+                <a:latin typeface="Arial"/>
+                <a:ea typeface="Arial"/>
+                <a:cs typeface="Arial"/>
+              </a:rPr>
+              <a:t> </a:t>
+            </a:r>
+            <a:br>
+              <a:rPr lang="bg-BG" sz="2800" b="0" i="0" u="none" strike="noStrike" cap="none" spc="-16">
+                <a:solidFill>
+                  <a:schemeClr val="tx1"/>
+                </a:solidFill>
+                <a:latin typeface="Arial"/>
+                <a:ea typeface="Arial"/>
+                <a:cs typeface="Arial"/>
+              </a:rPr>
+            </a:br>
+            <a:br>
+              <a:rPr lang="bg-BG" sz="2800" b="0" i="0" u="none" strike="noStrike" cap="none" spc="-16">
+                <a:solidFill>
+                  <a:schemeClr val="tx1"/>
+                </a:solidFill>
+                <a:latin typeface="Arial"/>
+                <a:ea typeface="Arial"/>
+                <a:cs typeface="Arial"/>
+              </a:rPr>
+            </a:br>
+            <a:r>
+              <a:rPr lang="bg-BG" sz="2800" b="1" i="0" u="none" strike="noStrike" cap="none" spc="-16">
+                <a:solidFill>
+                  <a:schemeClr val="tx1"/>
+                </a:solidFill>
+                <a:latin typeface="Arial"/>
+                <a:ea typeface="Arial"/>
+                <a:cs typeface="Arial"/>
+              </a:rPr>
+              <a:t>GENETICS SCREENING</a:t>
+            </a:r>
+            <a:r>
+              <a:rPr lang="bg-BG" sz="2800" b="0" i="0" u="none" strike="noStrike" cap="none" spc="-16">
+                <a:solidFill>
+                  <a:schemeClr val="tx1"/>
+                </a:solidFill>
+                <a:latin typeface="Arial"/>
+                <a:ea typeface="Arial"/>
+                <a:cs typeface="Arial"/>
+              </a:rPr>
+              <a:t> </a:t>
+            </a:r>
+            <a:r>
+              <a:rPr lang="bg-BG" sz="2800" b="0" i="0" u="none" strike="noStrike" cap="none" spc="-16">
+                <a:solidFill>
+                  <a:schemeClr val="tx1"/>
+                </a:solidFill>
+                <a:latin typeface="Arial"/>
+                <a:ea typeface="Arial"/>
+                <a:cs typeface="Arial"/>
+              </a:rPr>
+              <a:t>FOR COLON CANCER</a:t>
+            </a:r>
+            <a:br>
+              <a:rPr lang="bg-BG" sz="2800" b="0" i="0" u="none" strike="noStrike" cap="none" spc="-16">
+                <a:solidFill>
+                  <a:schemeClr val="tx1"/>
+                </a:solidFill>
+                <a:latin typeface="Arial"/>
+                <a:ea typeface="Arial"/>
+                <a:cs typeface="Arial"/>
+              </a:rPr>
+            </a:br>
+            <a:r>
+              <a:rPr lang="bg-BG" sz="2800" b="0" i="0" u="none" strike="noStrike" cap="none" spc="-16">
+                <a:solidFill>
+                  <a:schemeClr val="tx1"/>
+                </a:solidFill>
+                <a:latin typeface="Arial"/>
+                <a:ea typeface="Arial"/>
+                <a:cs typeface="Arial"/>
+              </a:rPr>
+              <a:t> </a:t>
+            </a:r>
+            <a:endParaRPr sz="2800" b="1">
+              <a:solidFill>
+                <a:schemeClr val="tx1"/>
+              </a:solidFill>
+            </a:endParaRPr>
           </a:p>
         </p:txBody>
       </p:sp>
@@ -4165,10 +4275,18 @@
               <a:defRPr/>
             </a:pPr>
             <a:r>
-              <a:rPr lang="en-US"/>
+              <a:rPr lang="en-US">
+                <a:solidFill>
+                  <a:schemeClr val="tx1"/>
+                </a:solidFill>
+              </a:rPr>
               <a:t>Group 3</a:t>
             </a:r>
-            <a:endParaRPr lang="bg-BG"/>
+            <a:endParaRPr>
+              <a:solidFill>
+                <a:schemeClr val="tx1"/>
+              </a:solidFill>
+            </a:endParaRPr>
           </a:p>
         </p:txBody>
       </p:sp>
@@ -4182,8 +4300,8 @@
         </p:nvSpPr>
         <p:spPr bwMode="auto">
           <a:xfrm flipH="0" flipV="0">
-            <a:off x="4137788" y="2790108"/>
-            <a:ext cx="7310007" cy="3845101"/>
+            <a:off x="4328262" y="2772557"/>
+            <a:ext cx="7410126" cy="3845100"/>
           </a:xfrm>
         </p:spPr>
         <p:txBody>
@@ -4351,50 +4469,178 @@
               <a:defRPr/>
             </a:pPr>
             <a:r>
-              <a:rPr lang="en-US"/>
-              <a:t>Irine Khubua </a:t>
-            </a:r>
-            <a:endParaRPr lang="en-US"/>
-          </a:p>
-          <a:p>
-            <a:pPr>
-              <a:defRPr/>
-            </a:pPr>
-            <a:r>
-              <a:rPr lang="bg-BG"/>
-              <a:t>Kostadin Kostadinov</a:t>
-            </a:r>
-            <a:endParaRPr lang="bg-BG"/>
-          </a:p>
-          <a:p>
-            <a:pPr>
-              <a:defRPr/>
-            </a:pPr>
-            <a:r>
-              <a:rPr lang="bg-BG"/>
-              <a:t>Vihar Kotecha</a:t>
-            </a:r>
-            <a:endParaRPr lang="bg-BG"/>
-          </a:p>
-          <a:p>
-            <a:pPr>
-              <a:defRPr/>
-            </a:pPr>
-            <a:r>
-              <a:rPr lang="bg-BG"/>
-              <a:t>Olgha Kukhianidze</a:t>
-            </a:r>
-            <a:endParaRPr lang="bg-BG"/>
-          </a:p>
-          <a:p>
-            <a:pPr>
-              <a:defRPr/>
-            </a:pPr>
-            <a:r>
-              <a:rPr lang="bg-BG"/>
-              <a:t>Bojana Letic</a:t>
-            </a:r>
-            <a:endParaRPr lang="bg-BG"/>
+              <a:rPr lang="en-US" b="1">
+                <a:solidFill>
+                  <a:schemeClr val="tx1"/>
+                </a:solidFill>
+              </a:rPr>
+              <a:t>Irine</a:t>
+            </a:r>
+            <a:r>
+              <a:rPr lang="en-US">
+                <a:solidFill>
+                  <a:schemeClr val="tx1"/>
+                </a:solidFill>
+              </a:rPr>
+              <a:t> </a:t>
+            </a:r>
+            <a:r>
+              <a:rPr lang="en-US" sz="3600" i="1">
+                <a:solidFill>
+                  <a:schemeClr val="tx1"/>
+                </a:solidFill>
+              </a:rPr>
+              <a:t>Khubua</a:t>
+            </a:r>
+            <a:r>
+              <a:rPr lang="en-US" sz="3600">
+                <a:solidFill>
+                  <a:schemeClr val="tx1"/>
+                </a:solidFill>
+              </a:rPr>
+              <a:t> </a:t>
+            </a:r>
+            <a:endParaRPr sz="3600">
+              <a:solidFill>
+                <a:schemeClr val="tx1"/>
+              </a:solidFill>
+            </a:endParaRPr>
+          </a:p>
+          <a:p>
+            <a:pPr>
+              <a:defRPr/>
+            </a:pPr>
+            <a:r>
+              <a:rPr lang="bg-BG" b="1">
+                <a:solidFill>
+                  <a:schemeClr val="tx1"/>
+                </a:solidFill>
+              </a:rPr>
+              <a:t>Kostadin</a:t>
+            </a:r>
+            <a:r>
+              <a:rPr lang="bg-BG">
+                <a:solidFill>
+                  <a:schemeClr val="tx1"/>
+                </a:solidFill>
+              </a:rPr>
+              <a:t> </a:t>
+            </a:r>
+            <a:r>
+              <a:rPr lang="bg-BG" sz="3600" i="1">
+                <a:solidFill>
+                  <a:schemeClr val="tx1"/>
+                </a:solidFill>
+              </a:rPr>
+              <a:t>Kostadinov</a:t>
+            </a:r>
+            <a:endParaRPr sz="3600">
+              <a:solidFill>
+                <a:schemeClr val="tx1"/>
+              </a:solidFill>
+            </a:endParaRPr>
+          </a:p>
+          <a:p>
+            <a:pPr>
+              <a:defRPr/>
+            </a:pPr>
+            <a:r>
+              <a:rPr lang="bg-BG" b="1">
+                <a:solidFill>
+                  <a:schemeClr val="tx1"/>
+                </a:solidFill>
+              </a:rPr>
+              <a:t>Vihar</a:t>
+            </a:r>
+            <a:r>
+              <a:rPr lang="bg-BG">
+                <a:solidFill>
+                  <a:schemeClr val="tx1"/>
+                </a:solidFill>
+              </a:rPr>
+              <a:t> </a:t>
+            </a:r>
+            <a:r>
+              <a:rPr lang="bg-BG" sz="3600" i="1">
+                <a:solidFill>
+                  <a:schemeClr val="tx1"/>
+                </a:solidFill>
+              </a:rPr>
+              <a:t>Kotecha</a:t>
+            </a:r>
+            <a:endParaRPr sz="3600">
+              <a:solidFill>
+                <a:schemeClr val="tx1"/>
+              </a:solidFill>
+            </a:endParaRPr>
+          </a:p>
+          <a:p>
+            <a:pPr>
+              <a:defRPr/>
+            </a:pPr>
+            <a:r>
+              <a:rPr lang="bg-BG" b="1">
+                <a:solidFill>
+                  <a:schemeClr val="tx1"/>
+                </a:solidFill>
+              </a:rPr>
+              <a:t>Olgha</a:t>
+            </a:r>
+            <a:r>
+              <a:rPr lang="bg-BG">
+                <a:solidFill>
+                  <a:schemeClr val="tx1"/>
+                </a:solidFill>
+              </a:rPr>
+              <a:t> </a:t>
+            </a:r>
+            <a:r>
+              <a:rPr lang="bg-BG" sz="3600" i="1">
+                <a:solidFill>
+                  <a:schemeClr val="tx1"/>
+                </a:solidFill>
+              </a:rPr>
+              <a:t>Kukhianidze</a:t>
+            </a:r>
+            <a:endParaRPr sz="3600">
+              <a:solidFill>
+                <a:schemeClr val="tx1"/>
+              </a:solidFill>
+            </a:endParaRPr>
+          </a:p>
+          <a:p>
+            <a:pPr>
+              <a:defRPr/>
+            </a:pPr>
+            <a:r>
+              <a:rPr lang="bg-BG" b="1">
+                <a:solidFill>
+                  <a:schemeClr val="tx1"/>
+                </a:solidFill>
+              </a:rPr>
+              <a:t>Bojana</a:t>
+            </a:r>
+            <a:r>
+              <a:rPr lang="bg-BG">
+                <a:solidFill>
+                  <a:schemeClr val="tx1"/>
+                </a:solidFill>
+              </a:rPr>
+              <a:t> </a:t>
+            </a:r>
+            <a:r>
+              <a:rPr lang="bg-BG" sz="3600" i="1">
+                <a:solidFill>
+                  <a:schemeClr val="tx1"/>
+                </a:solidFill>
+              </a:rPr>
+              <a:t>Letic</a:t>
+            </a:r>
+            <a:endParaRPr sz="3600" i="1">
+              <a:solidFill>
+                <a:schemeClr val="tx1"/>
+              </a:solidFill>
+            </a:endParaRPr>
           </a:p>
         </p:txBody>
       </p:sp>
@@ -4958,17 +5204,18 @@
             <a:r>
               <a:rPr lang="bg-BG" sz="4400" b="0" i="0" u="none" strike="noStrike" cap="none" spc="0">
                 <a:solidFill>
-                  <a:schemeClr val="tx1">
-                    <a:lumMod val="65000"/>
-                    <a:lumOff val="35000"/>
-                  </a:schemeClr>
+                  <a:schemeClr val="tx1"/>
                 </a:solidFill>
                 <a:latin typeface="Arial"/>
                 <a:cs typeface="Arial"/>
               </a:rPr>
               <a:t>Characteristics of the disease</a:t>
             </a:r>
-            <a:endParaRPr/>
+            <a:endParaRPr>
+              <a:solidFill>
+                <a:schemeClr val="tx1"/>
+              </a:solidFill>
+            </a:endParaRPr>
           </a:p>
         </p:txBody>
       </p:sp>
@@ -5150,17 +5397,18 @@
             <a:r>
               <a:rPr lang="bg-BG" sz="4400" b="0" i="0" u="none" strike="noStrike" cap="none" spc="0">
                 <a:solidFill>
-                  <a:schemeClr val="tx1">
-                    <a:lumMod val="65000"/>
-                    <a:lumOff val="35000"/>
-                  </a:schemeClr>
+                  <a:schemeClr val="tx1"/>
                 </a:solidFill>
                 <a:latin typeface="Arial"/>
                 <a:cs typeface="Arial"/>
               </a:rPr>
               <a:t>Characteristics of patients</a:t>
             </a:r>
-            <a:endParaRPr/>
+            <a:endParaRPr>
+              <a:solidFill>
+                <a:schemeClr val="tx1"/>
+              </a:solidFill>
+            </a:endParaRPr>
           </a:p>
         </p:txBody>
       </p:sp>

</xml_diff>

<commit_message>
new file:   group_assigment/Markov_Models_for_Health_Economic_Evaluation_The_R.pdf 	new file:   group_assigment/Master-thesis-Vera-Baaij-343915-.pdf 	new file:   group_assigment/S4C WP1 T1.2 Survey-responses_1.10.2022 .doc 	new file:   group_assigment/af.drawio 	new file:   group_assigment/af.png 	new file:   group_assigment/ehaa612.pdf 	modified:   group_assigment/group_assigment.pptx 	new file:   "group_assigment/https:\342\201\204\342\201\204www.ncbi.nlm.nih.gov\342\201\204pmc\342\201\204articles\342\201\204PMC9356321\342\201\204.desktop" 	new file:   group_assigment/interventions.drawio 	new file:   group_assigment/interventions.png
</commit_message>
<xml_diff>
--- a/group_assigment/group_assigment.pptx
+++ b/group_assigment/group_assigment.pptx
@@ -16,6 +16,8 @@
     <p:sldId id="264" r:id="rId11"/>
     <p:sldId id="265" r:id="rId12"/>
     <p:sldId id="266" r:id="rId13"/>
+    <p:sldId id="267" r:id="rId14"/>
+    <p:sldId id="268" r:id="rId15"/>
   </p:sldIdLst>
   <p:sldSz cx="12192000" cy="6858000"/>
   <p:notesSz cx="12192000" cy="6858000"/>
@@ -4166,7 +4168,7 @@
                 <a:ea typeface="Arial"/>
                 <a:cs typeface="Arial"/>
               </a:rPr>
-              <a:t>DIGITAL WATCH A-FIB DETECTION</a:t>
+              <a:t>DIGITAL WATCHS A-FIB SCRENING </a:t>
             </a:r>
             <a:br>
               <a:rPr lang="bg-BG" sz="2800" b="0" i="0" u="none" strike="noStrike" cap="none" spc="-16">
@@ -4232,45 +4234,6 @@
       </p:sp>
       <p:sp>
         <p:nvSpPr>
-          <p:cNvPr id="3" name="Подзаглавие 2" hidden="0"/>
-          <p:cNvSpPr>
-            <a:spLocks noGrp="1"/>
-          </p:cNvSpPr>
-          <p:nvPr isPhoto="0" userDrawn="0">
-            <p:ph type="subTitle" idx="1" hasCustomPrompt="0"/>
-          </p:nvPr>
-        </p:nvSpPr>
-        <p:spPr bwMode="auto">
-          <a:xfrm>
-            <a:off x="152271" y="2903118"/>
-            <a:ext cx="6720745" cy="720079"/>
-          </a:xfrm>
-        </p:spPr>
-        <p:txBody>
-          <a:bodyPr/>
-          <a:lstStyle/>
-          <a:p>
-            <a:pPr>
-              <a:defRPr/>
-            </a:pPr>
-            <a:r>
-              <a:rPr lang="en-US">
-                <a:solidFill>
-                  <a:schemeClr val="tx1"/>
-                </a:solidFill>
-              </a:rPr>
-              <a:t>Group 3</a:t>
-            </a:r>
-            <a:endParaRPr>
-              <a:solidFill>
-                <a:schemeClr val="tx1"/>
-              </a:solidFill>
-            </a:endParaRPr>
-          </a:p>
-        </p:txBody>
-      </p:sp>
-      <p:sp>
-        <p:nvSpPr>
           <p:cNvPr id="1843669327" name="Подзаглавие 2" hidden="0"/>
           <p:cNvSpPr>
             <a:spLocks noGrp="1"/>
@@ -4279,7 +4242,7 @@
         </p:nvSpPr>
         <p:spPr bwMode="auto">
           <a:xfrm flipH="0" flipV="0">
-            <a:off x="4328262" y="2772557"/>
+            <a:off x="4436211" y="2594004"/>
             <a:ext cx="7410126" cy="3845100"/>
           </a:xfrm>
         </p:spPr>
@@ -4471,6 +4434,49 @@
               </a:rPr>
               <a:t>Khubua</a:t>
             </a:r>
+            <a:endParaRPr lang="en-US" sz="3600" i="1">
+              <a:solidFill>
+                <a:schemeClr val="tx1"/>
+              </a:solidFill>
+            </a:endParaRPr>
+          </a:p>
+          <a:p>
+            <a:pPr>
+              <a:defRPr/>
+            </a:pPr>
+            <a:r>
+              <a:rPr lang="bg-BG" sz="3600" b="1" i="0" u="none" strike="noStrike" cap="none" spc="0">
+                <a:solidFill>
+                  <a:schemeClr val="tx1"/>
+                </a:solidFill>
+                <a:latin typeface="+mn-lt"/>
+                <a:ea typeface="+mn-ea"/>
+                <a:cs typeface="+mn-cs"/>
+              </a:rPr>
+              <a:t>Olgha</a:t>
+            </a:r>
+            <a:r>
+              <a:rPr lang="bg-BG" sz="3600" b="0" i="0" u="none" strike="noStrike" cap="none" spc="0">
+                <a:solidFill>
+                  <a:schemeClr val="tx1"/>
+                </a:solidFill>
+                <a:latin typeface="+mn-lt"/>
+                <a:ea typeface="+mn-ea"/>
+                <a:cs typeface="+mn-cs"/>
+              </a:rPr>
+              <a:t> </a:t>
+            </a:r>
+            <a:r>
+              <a:rPr lang="bg-BG" sz="3600" b="0" i="1" u="none" strike="noStrike" cap="none" spc="0">
+                <a:solidFill>
+                  <a:schemeClr val="tx1"/>
+                </a:solidFill>
+                <a:latin typeface="+mn-lt"/>
+                <a:ea typeface="+mn-ea"/>
+                <a:cs typeface="+mn-cs"/>
+              </a:rPr>
+              <a:t>Kukhianidze</a:t>
+            </a:r>
             <a:r>
               <a:rPr lang="en-US" sz="3600">
                 <a:solidFill>
@@ -4546,40 +4552,6 @@
                 </a:solidFill>
               </a:rPr>
               <a:t>Kotecha</a:t>
-            </a:r>
-            <a:endParaRPr sz="3600">
-              <a:solidFill>
-                <a:schemeClr val="tx1"/>
-              </a:solidFill>
-            </a:endParaRPr>
-          </a:p>
-          <a:p>
-            <a:pPr>
-              <a:defRPr/>
-            </a:pPr>
-            <a:r>
-              <a:rPr lang="bg-BG" b="1">
-                <a:solidFill>
-                  <a:schemeClr val="tx1"/>
-                </a:solidFill>
-              </a:rPr>
-              <a:t>Olgha</a:t>
-            </a:r>
-            <a:r>
-              <a:rPr lang="bg-BG">
-                <a:solidFill>
-                  <a:schemeClr val="tx1"/>
-                </a:solidFill>
-              </a:rPr>
-              <a:t> </a:t>
-            </a:r>
-            <a:r>
-              <a:rPr lang="bg-BG" sz="3600" i="1">
-                <a:solidFill>
-                  <a:schemeClr val="tx1"/>
-                </a:solidFill>
-              </a:rPr>
-              <a:t>Kukhianidze</a:t>
             </a:r>
             <a:endParaRPr sz="3600">
               <a:solidFill>
@@ -4663,6 +4635,169 @@
           </a:fontRef>
         </p:style>
       </p:cxnSp>
+      <p:pic>
+        <p:nvPicPr>
+          <p:cNvPr id="161430471" name="" hidden="0"/>
+          <p:cNvPicPr>
+            <a:picLocks noChangeAspect="1"/>
+          </p:cNvPicPr>
+          <p:nvPr isPhoto="0" userDrawn="0"/>
+        </p:nvPicPr>
+        <p:blipFill>
+          <a:blip r:embed="rId2"/>
+          <a:stretch/>
+        </p:blipFill>
+        <p:spPr bwMode="auto">
+          <a:xfrm flipH="0" flipV="0">
+            <a:off x="5834637" y="2693712"/>
+            <a:ext cx="1190624" cy="714375"/>
+          </a:xfrm>
+          <a:prstGeom prst="rect">
+            <a:avLst/>
+          </a:prstGeom>
+        </p:spPr>
+      </p:pic>
+      <p:sp>
+        <p:nvSpPr>
+          <p:cNvPr id="396845692" name="" hidden="0"/>
+          <p:cNvSpPr/>
+          <p:nvPr isPhoto="0" userDrawn="0"/>
+        </p:nvSpPr>
+        <p:spPr bwMode="auto">
+          <a:xfrm flipH="0" flipV="0">
+            <a:off x="9127684" y="7022464"/>
+            <a:ext cx="160815" cy="365795"/>
+          </a:xfrm>
+        </p:spPr>
+        <p:txBody>
+          <a:bodyPr rot="0" spcFirstLastPara="0" vertOverflow="overflow" horzOverflow="clip" vert="horz" wrap="square" lIns="91440" tIns="45720" rIns="91440" bIns="45720" numCol="1" spcCol="0" rtlCol="0" fromWordArt="0" anchor="t" anchorCtr="0" forceAA="0" upright="0" compatLnSpc="1">
+            <a:prstTxWarp prst="textNoShape"/>
+            <a:spAutoFit/>
+          </a:bodyPr>
+          <a:p>
+            <a:pPr>
+              <a:defRPr/>
+            </a:pPr>
+            <a:endParaRPr/>
+          </a:p>
+        </p:txBody>
+      </p:sp>
+      <p:pic>
+        <p:nvPicPr>
+          <p:cNvPr id="2141269568" name="" hidden="0"/>
+          <p:cNvPicPr>
+            <a:picLocks noChangeAspect="1"/>
+          </p:cNvPicPr>
+          <p:nvPr isPhoto="0" userDrawn="0"/>
+        </p:nvPicPr>
+        <p:blipFill>
+          <a:blip r:embed="rId3"/>
+          <a:stretch/>
+        </p:blipFill>
+        <p:spPr bwMode="auto">
+          <a:xfrm flipH="0" flipV="0">
+            <a:off x="5808443" y="5027337"/>
+            <a:ext cx="1190624" cy="714375"/>
+          </a:xfrm>
+          <a:prstGeom prst="rect">
+            <a:avLst/>
+          </a:prstGeom>
+        </p:spPr>
+      </p:pic>
+      <p:sp>
+        <p:nvSpPr>
+          <p:cNvPr id="374716833" name="" hidden="0"/>
+          <p:cNvSpPr/>
+          <p:nvPr isPhoto="0" userDrawn="0"/>
+        </p:nvSpPr>
+        <p:spPr bwMode="auto">
+          <a:xfrm flipH="0" flipV="0">
+            <a:off x="10389765" y="9118921"/>
+            <a:ext cx="255060" cy="365795"/>
+          </a:xfrm>
+        </p:spPr>
+        <p:txBody>
+          <a:bodyPr rot="0" spcFirstLastPara="0" vertOverflow="overflow" horzOverflow="clip" vert="horz" wrap="square" lIns="91440" tIns="45720" rIns="91440" bIns="45720" numCol="1" spcCol="0" rtlCol="0" fromWordArt="0" anchor="t" anchorCtr="0" forceAA="0" upright="0" compatLnSpc="1">
+            <a:prstTxWarp prst="textNoShape"/>
+            <a:spAutoFit/>
+          </a:bodyPr>
+          <a:p>
+            <a:pPr>
+              <a:defRPr/>
+            </a:pPr>
+            <a:endParaRPr/>
+          </a:p>
+        </p:txBody>
+      </p:sp>
+      <p:pic>
+        <p:nvPicPr>
+          <p:cNvPr id="1359804530" name="" hidden="0"/>
+          <p:cNvPicPr>
+            <a:picLocks noChangeAspect="1"/>
+          </p:cNvPicPr>
+          <p:nvPr isPhoto="0" userDrawn="0"/>
+        </p:nvPicPr>
+        <p:blipFill>
+          <a:blip r:embed="rId4"/>
+          <a:stretch/>
+        </p:blipFill>
+        <p:spPr bwMode="auto">
+          <a:xfrm flipH="0" flipV="0">
+            <a:off x="5834637" y="4255456"/>
+            <a:ext cx="1190624" cy="685238"/>
+          </a:xfrm>
+          <a:prstGeom prst="rect">
+            <a:avLst/>
+          </a:prstGeom>
+        </p:spPr>
+      </p:pic>
+      <p:sp>
+        <p:nvSpPr>
+          <p:cNvPr id="1069474478" name="" hidden="0"/>
+          <p:cNvSpPr/>
+          <p:nvPr isPhoto="0" userDrawn="0"/>
+        </p:nvSpPr>
+        <p:spPr bwMode="auto">
+          <a:xfrm>
+            <a:off x="14581340" y="9081177"/>
+            <a:ext cx="254916" cy="365795"/>
+          </a:xfrm>
+        </p:spPr>
+        <p:txBody>
+          <a:bodyPr rot="0" spcFirstLastPara="0" vertOverflow="overflow" horzOverflow="clip" vert="horz" wrap="square" lIns="91440" tIns="45720" rIns="91440" bIns="45720" numCol="1" spcCol="0" rtlCol="0" fromWordArt="0" anchor="t" anchorCtr="0" forceAA="0" upright="0" compatLnSpc="1">
+            <a:prstTxWarp prst="textNoShape"/>
+            <a:spAutoFit/>
+          </a:bodyPr>
+          <a:p>
+            <a:pPr>
+              <a:defRPr/>
+            </a:pPr>
+            <a:endParaRPr/>
+          </a:p>
+        </p:txBody>
+      </p:sp>
+      <p:pic>
+        <p:nvPicPr>
+          <p:cNvPr id="2124612467" name="" hidden="0"/>
+          <p:cNvPicPr>
+            <a:picLocks noChangeAspect="1"/>
+          </p:cNvPicPr>
+          <p:nvPr isPhoto="0" userDrawn="0"/>
+        </p:nvPicPr>
+        <p:blipFill>
+          <a:blip r:embed="rId5"/>
+          <a:stretch/>
+        </p:blipFill>
+        <p:spPr bwMode="auto">
+          <a:xfrm>
+            <a:off x="5834637" y="3461974"/>
+            <a:ext cx="1190624" cy="714375"/>
+          </a:xfrm>
+          <a:prstGeom prst="rect">
+            <a:avLst/>
+          </a:prstGeom>
+        </p:spPr>
+      </p:pic>
     </p:spTree>
   </p:cSld>
   <p:clrMapOvr>
@@ -4698,7 +4833,7 @@
       </p:grpSpPr>
       <p:sp>
         <p:nvSpPr>
-          <p:cNvPr id="1634651692" name="Заголовок 1" hidden="0"/>
+          <p:cNvPr id="1831208734" name="Заголовок 1" hidden="0"/>
           <p:cNvSpPr>
             <a:spLocks noGrp="1"/>
           </p:cNvSpPr>
@@ -4725,7 +4860,7 @@
                 <a:latin typeface="Arial"/>
                 <a:cs typeface="Arial"/>
               </a:rPr>
-              <a:t>Uncertainty</a:t>
+              <a:t>Synthesising costs and effects</a:t>
             </a:r>
             <a:endParaRPr/>
           </a:p>
@@ -4733,7 +4868,7 @@
       </p:sp>
       <p:sp>
         <p:nvSpPr>
-          <p:cNvPr id="309910196" name="Объект 2" hidden="0"/>
+          <p:cNvPr id="1155402581" name="Объект 2" hidden="0"/>
           <p:cNvSpPr>
             <a:spLocks noGrp="1"/>
           </p:cNvSpPr>
@@ -4777,7 +4912,7 @@
                 <a:latin typeface="Arial"/>
                 <a:cs typeface="Arial"/>
               </a:rPr>
-              <a:t>Investigating uncertainty &amp; diversity: (which sensitivity / scenario / subgroup analysis)</a:t>
+              <a:t>Calculation of ICER/ICUR</a:t>
             </a:r>
             <a:endParaRPr lang="bg-BG" sz="3200" b="0" i="0" u="none" strike="noStrike" cap="none" spc="0">
               <a:solidFill>
@@ -4805,35 +4940,7 @@
                 <a:latin typeface="Arial"/>
                 <a:cs typeface="Arial"/>
               </a:rPr>
-              <a:t>CEA plane, CEAC curve</a:t>
-            </a:r>
-            <a:endParaRPr lang="bg-BG" sz="3200" b="0" i="0" u="none" strike="noStrike" cap="none" spc="0">
-              <a:solidFill>
-                <a:schemeClr val="tx1">
-                  <a:lumMod val="75000"/>
-                  <a:lumOff val="25000"/>
-                </a:schemeClr>
-              </a:solidFill>
-              <a:latin typeface="Arial"/>
-              <a:cs typeface="Arial"/>
-            </a:endParaRPr>
-          </a:p>
-          <a:p>
-            <a:pPr>
-              <a:defRPr/>
-            </a:pPr>
-            <a:r>
-              <a:rPr lang="bg-BG" sz="3200" b="0" i="0" u="none" strike="noStrike" cap="none" spc="0">
-                <a:solidFill>
-                  <a:schemeClr val="tx1">
-                    <a:lumMod val="75000"/>
-                    <a:lumOff val="25000"/>
-                  </a:schemeClr>
-                </a:solidFill>
-                <a:latin typeface="Arial"/>
-                <a:cs typeface="Arial"/>
-              </a:rPr>
-              <a:t>Chosen threshold for the WTP of CUA and why</a:t>
+              <a:t>Interpretation of ICER; what does it mean, comparable studies</a:t>
             </a:r>
             <a:endParaRPr/>
           </a:p>
@@ -4874,7 +4981,7 @@
       </p:grpSpPr>
       <p:sp>
         <p:nvSpPr>
-          <p:cNvPr id="1855313048" name="Заголовок 1" hidden="0"/>
+          <p:cNvPr id="1634651692" name="Заголовок 1" hidden="0"/>
           <p:cNvSpPr>
             <a:spLocks noGrp="1"/>
           </p:cNvSpPr>
@@ -4901,7 +5008,7 @@
                 <a:latin typeface="Arial"/>
                 <a:cs typeface="Arial"/>
               </a:rPr>
-              <a:t>Discussion of the expected outcomes</a:t>
+              <a:t>Uncertainty</a:t>
             </a:r>
             <a:endParaRPr/>
           </a:p>
@@ -4909,7 +5016,7 @@
       </p:sp>
       <p:sp>
         <p:nvSpPr>
-          <p:cNvPr id="1781115270" name="Объект 2" hidden="0"/>
+          <p:cNvPr id="309910196" name="Объект 2" hidden="0"/>
           <p:cNvSpPr>
             <a:spLocks noGrp="1"/>
           </p:cNvSpPr>
@@ -4919,9 +5026,7 @@
         </p:nvSpPr>
         <p:spPr bwMode="auto"/>
         <p:txBody>
-          <a:bodyPr vertOverflow="overflow" horzOverflow="overflow" vert="horz" wrap="square" lIns="91440" tIns="45720" rIns="91440" bIns="45720" numCol="1" spcCol="0" rtlCol="0" fromWordArt="0" anchor="t" anchorCtr="0" forceAA="0" upright="0" compatLnSpc="0">
-            <a:normAutofit fontScale="90000" lnSpcReduction="2000"/>
-          </a:bodyPr>
+          <a:bodyPr/>
           <a:lstStyle/>
           <a:p>
             <a:pPr marL="0" indent="0">
@@ -4955,7 +5060,7 @@
                 <a:latin typeface="Arial"/>
                 <a:cs typeface="Arial"/>
               </a:rPr>
-              <a:t>Expected most important outcome(s) of study, based on the literature</a:t>
+              <a:t>Investigating uncertainty &amp; diversity: (which sensitivity / scenario / subgroup analysis)</a:t>
             </a:r>
             <a:endParaRPr lang="bg-BG" sz="3200" b="0" i="0" u="none" strike="noStrike" cap="none" spc="0">
               <a:solidFill>
@@ -4983,7 +5088,7 @@
                 <a:latin typeface="Arial"/>
                 <a:cs typeface="Arial"/>
               </a:rPr>
-              <a:t>Relationship of results with existing evidence</a:t>
+              <a:t>CEA plane, CEAC curve</a:t>
             </a:r>
             <a:endParaRPr lang="bg-BG" sz="3200" b="0" i="0" u="none" strike="noStrike" cap="none" spc="0">
               <a:solidFill>
@@ -5011,8 +5116,102 @@
                 <a:latin typeface="Arial"/>
                 <a:cs typeface="Arial"/>
               </a:rPr>
-              <a:t>Limitations of design economic evaluation (bias)</a:t>
-            </a:r>
+              <a:t>Chosen threshold for the WTP of CUA and why</a:t>
+            </a:r>
+            <a:endParaRPr/>
+          </a:p>
+        </p:txBody>
+      </p:sp>
+    </p:spTree>
+  </p:cSld>
+  <p:clrMapOvr>
+    <a:masterClrMapping/>
+  </p:clrMapOvr>
+  <mc:AlternateContent xmlns:mc="http://schemas.openxmlformats.org/markup-compatibility/2006">
+    <mc:Choice xmlns:p14="http://schemas.microsoft.com/office/powerpoint/2010/main" Requires="p14">
+      <p:transition p14:dur="2000" advClick="1"/>
+    </mc:Choice>
+    <mc:Fallback>
+      <p:transition advClick="1"/>
+    </mc:Fallback>
+  </mc:AlternateContent>
+</p:sld>
+</file>
+
+<file path=ppt/slides/slide12.xml><?xml version="1.0" encoding="utf-8"?>
+<p:sld xmlns:a="http://schemas.openxmlformats.org/drawingml/2006/main" xmlns:r="http://schemas.openxmlformats.org/officeDocument/2006/relationships" xmlns:p="http://schemas.openxmlformats.org/presentationml/2006/main" xmlns:m="http://schemas.openxmlformats.org/officeDocument/2006/math" xmlns:w="http://schemas.openxmlformats.org/wordprocessingml/2006/main" showMasterPhAnim="0" show="1">
+  <p:cSld name="">
+    <p:spTree>
+      <p:nvGrpSpPr>
+        <p:cNvPr id="1" name="" hidden="0"/>
+        <p:cNvGrpSpPr/>
+        <p:nvPr isPhoto="0" userDrawn="0"/>
+      </p:nvGrpSpPr>
+      <p:grpSpPr bwMode="auto">
+        <a:xfrm>
+          <a:off x="0" y="0"/>
+          <a:ext cx="0" cy="0"/>
+          <a:chOff x="0" y="0"/>
+          <a:chExt cx="0" cy="0"/>
+        </a:xfrm>
+      </p:grpSpPr>
+      <p:sp>
+        <p:nvSpPr>
+          <p:cNvPr id="1855313048" name="Заголовок 1" hidden="0"/>
+          <p:cNvSpPr>
+            <a:spLocks noGrp="1"/>
+          </p:cNvSpPr>
+          <p:nvPr isPhoto="0" userDrawn="0">
+            <p:ph type="title" hasCustomPrompt="0"/>
+          </p:nvPr>
+        </p:nvSpPr>
+        <p:spPr bwMode="auto"/>
+        <p:txBody>
+          <a:bodyPr/>
+          <a:lstStyle/>
+          <a:p>
+            <a:pPr>
+              <a:defRPr/>
+            </a:pPr>
+            <a:r>
+              <a:rPr lang="bg-BG" sz="4400" b="0" i="0" u="none" strike="noStrike" cap="none" spc="0">
+                <a:solidFill>
+                  <a:schemeClr val="tx1">
+                    <a:lumMod val="65000"/>
+                    <a:lumOff val="35000"/>
+                  </a:schemeClr>
+                </a:solidFill>
+                <a:latin typeface="Arial"/>
+                <a:cs typeface="Arial"/>
+              </a:rPr>
+              <a:t>Discussion of the expected outcomes</a:t>
+            </a:r>
+            <a:endParaRPr/>
+          </a:p>
+        </p:txBody>
+      </p:sp>
+      <p:sp>
+        <p:nvSpPr>
+          <p:cNvPr id="1781115270" name="Объект 2" hidden="0"/>
+          <p:cNvSpPr>
+            <a:spLocks noGrp="1"/>
+          </p:cNvSpPr>
+          <p:nvPr isPhoto="0" userDrawn="0">
+            <p:ph idx="1" hasCustomPrompt="0"/>
+          </p:nvPr>
+        </p:nvSpPr>
+        <p:spPr bwMode="auto"/>
+        <p:txBody>
+          <a:bodyPr vertOverflow="overflow" horzOverflow="overflow" vert="horz" wrap="square" lIns="91440" tIns="45720" rIns="91440" bIns="45720" numCol="1" spcCol="0" rtlCol="0" fromWordArt="0" anchor="t" anchorCtr="0" forceAA="0" upright="0" compatLnSpc="0">
+            <a:normAutofit fontScale="90000" lnSpcReduction="2000"/>
+          </a:bodyPr>
+          <a:lstStyle/>
+          <a:p>
+            <a:pPr marL="0" indent="0">
+              <a:buFont typeface="Arial"/>
+              <a:buNone/>
+              <a:defRPr/>
+            </a:pPr>
             <a:endParaRPr lang="bg-BG" sz="3200" b="0" i="0" u="none" strike="noStrike" cap="none" spc="0">
               <a:solidFill>
                 <a:schemeClr val="tx1">
@@ -5039,7 +5238,7 @@
                 <a:latin typeface="Arial"/>
                 <a:cs typeface="Arial"/>
               </a:rPr>
-              <a:t>Generalisability/transferability of the results to other settings and/or patient groups</a:t>
+              <a:t>Expected most important outcome(s) of study, based on the literature</a:t>
             </a:r>
             <a:endParaRPr lang="bg-BG" sz="3200" b="0" i="0" u="none" strike="noStrike" cap="none" spc="0">
               <a:solidFill>
@@ -5067,7 +5266,7 @@
                 <a:latin typeface="Arial"/>
                 <a:cs typeface="Arial"/>
               </a:rPr>
-              <a:t>Other relevant considerations to decision-maker</a:t>
+              <a:t>Relationship of results with existing evidence</a:t>
             </a:r>
             <a:endParaRPr lang="bg-BG" sz="3200" b="0" i="0" u="none" strike="noStrike" cap="none" spc="0">
               <a:solidFill>
@@ -5095,7 +5294,7 @@
                 <a:latin typeface="Arial"/>
                 <a:cs typeface="Arial"/>
               </a:rPr>
-              <a:t>Issues of implementation</a:t>
+              <a:t>Limitations of design economic evaluation (bias)</a:t>
             </a:r>
             <a:endParaRPr lang="bg-BG" sz="3200" b="0" i="0" u="none" strike="noStrike" cap="none" spc="0">
               <a:solidFill>
@@ -5123,9 +5322,375 @@
                 <a:latin typeface="Arial"/>
                 <a:cs typeface="Arial"/>
               </a:rPr>
+              <a:t>Generalisability/transferability of the results to other settings and/or patient groups</a:t>
+            </a:r>
+            <a:endParaRPr lang="bg-BG" sz="3200" b="0" i="0" u="none" strike="noStrike" cap="none" spc="0">
+              <a:solidFill>
+                <a:schemeClr val="tx1">
+                  <a:lumMod val="75000"/>
+                  <a:lumOff val="25000"/>
+                </a:schemeClr>
+              </a:solidFill>
+              <a:latin typeface="Arial"/>
+              <a:cs typeface="Arial"/>
+            </a:endParaRPr>
+          </a:p>
+          <a:p>
+            <a:pPr>
+              <a:defRPr/>
+            </a:pPr>
+            <a:r>
+              <a:rPr lang="bg-BG" sz="3200" b="0" i="0" u="none" strike="noStrike" cap="none" spc="0">
+                <a:solidFill>
+                  <a:schemeClr val="tx1">
+                    <a:lumMod val="75000"/>
+                    <a:lumOff val="25000"/>
+                  </a:schemeClr>
+                </a:solidFill>
+                <a:latin typeface="Arial"/>
+                <a:cs typeface="Arial"/>
+              </a:rPr>
+              <a:t>Other relevant considerations to decision-maker</a:t>
+            </a:r>
+            <a:endParaRPr lang="bg-BG" sz="3200" b="0" i="0" u="none" strike="noStrike" cap="none" spc="0">
+              <a:solidFill>
+                <a:schemeClr val="tx1">
+                  <a:lumMod val="75000"/>
+                  <a:lumOff val="25000"/>
+                </a:schemeClr>
+              </a:solidFill>
+              <a:latin typeface="Arial"/>
+              <a:cs typeface="Arial"/>
+            </a:endParaRPr>
+          </a:p>
+          <a:p>
+            <a:pPr>
+              <a:defRPr/>
+            </a:pPr>
+            <a:r>
+              <a:rPr lang="bg-BG" sz="3200" b="0" i="0" u="none" strike="noStrike" cap="none" spc="0">
+                <a:solidFill>
+                  <a:schemeClr val="tx1">
+                    <a:lumMod val="75000"/>
+                    <a:lumOff val="25000"/>
+                  </a:schemeClr>
+                </a:solidFill>
+                <a:latin typeface="Arial"/>
+                <a:cs typeface="Arial"/>
+              </a:rPr>
+              <a:t>Issues of implementation</a:t>
+            </a:r>
+            <a:endParaRPr lang="bg-BG" sz="3200" b="0" i="0" u="none" strike="noStrike" cap="none" spc="0">
+              <a:solidFill>
+                <a:schemeClr val="tx1">
+                  <a:lumMod val="75000"/>
+                  <a:lumOff val="25000"/>
+                </a:schemeClr>
+              </a:solidFill>
+              <a:latin typeface="Arial"/>
+              <a:cs typeface="Arial"/>
+            </a:endParaRPr>
+          </a:p>
+          <a:p>
+            <a:pPr>
+              <a:defRPr/>
+            </a:pPr>
+            <a:r>
+              <a:rPr lang="bg-BG" sz="3200" b="0" i="0" u="none" strike="noStrike" cap="none" spc="0">
+                <a:solidFill>
+                  <a:schemeClr val="tx1">
+                    <a:lumMod val="75000"/>
+                    <a:lumOff val="25000"/>
+                  </a:schemeClr>
+                </a:solidFill>
+                <a:latin typeface="Arial"/>
+                <a:cs typeface="Arial"/>
+              </a:rPr>
               <a:t>Expected recommendations, and results based on this study</a:t>
             </a:r>
             <a:endParaRPr/>
+          </a:p>
+        </p:txBody>
+      </p:sp>
+    </p:spTree>
+  </p:cSld>
+  <p:clrMapOvr>
+    <a:masterClrMapping/>
+  </p:clrMapOvr>
+  <mc:AlternateContent xmlns:mc="http://schemas.openxmlformats.org/markup-compatibility/2006">
+    <mc:Choice xmlns:p14="http://schemas.microsoft.com/office/powerpoint/2010/main" Requires="p14">
+      <p:transition p14:dur="2000" advClick="1"/>
+    </mc:Choice>
+    <mc:Fallback>
+      <p:transition advClick="1"/>
+    </mc:Fallback>
+  </mc:AlternateContent>
+</p:sld>
+</file>
+
+<file path=ppt/slides/slide13.xml><?xml version="1.0" encoding="utf-8"?>
+<p:sld xmlns:a="http://schemas.openxmlformats.org/drawingml/2006/main" xmlns:r="http://schemas.openxmlformats.org/officeDocument/2006/relationships" xmlns:p="http://schemas.openxmlformats.org/presentationml/2006/main" xmlns:m="http://schemas.openxmlformats.org/officeDocument/2006/math" xmlns:w="http://schemas.openxmlformats.org/wordprocessingml/2006/main" showMasterPhAnim="0" show="1">
+  <p:cSld name="">
+    <p:spTree>
+      <p:nvGrpSpPr>
+        <p:cNvPr id="1" name="" hidden="0"/>
+        <p:cNvGrpSpPr/>
+        <p:nvPr isPhoto="0" userDrawn="0"/>
+      </p:nvGrpSpPr>
+      <p:grpSpPr bwMode="auto">
+        <a:xfrm>
+          <a:off x="0" y="0"/>
+          <a:ext cx="0" cy="0"/>
+          <a:chOff x="0" y="0"/>
+          <a:chExt cx="0" cy="0"/>
+        </a:xfrm>
+      </p:grpSpPr>
+      <p:sp>
+        <p:nvSpPr>
+          <p:cNvPr id="798927287" name="Заголовок 1" hidden="0"/>
+          <p:cNvSpPr>
+            <a:spLocks noGrp="1"/>
+          </p:cNvSpPr>
+          <p:nvPr isPhoto="0" userDrawn="0">
+            <p:ph type="title" hasCustomPrompt="0"/>
+          </p:nvPr>
+        </p:nvSpPr>
+        <p:spPr bwMode="auto"/>
+        <p:txBody>
+          <a:bodyPr/>
+          <a:lstStyle/>
+          <a:p>
+            <a:pPr>
+              <a:defRPr/>
+            </a:pPr>
+            <a:r>
+              <a:rPr/>
+              <a:t>References</a:t>
+            </a:r>
+            <a:endParaRPr/>
+          </a:p>
+        </p:txBody>
+      </p:sp>
+      <p:sp>
+        <p:nvSpPr>
+          <p:cNvPr id="31488328" name="Объект 2" hidden="0"/>
+          <p:cNvSpPr>
+            <a:spLocks noGrp="1"/>
+          </p:cNvSpPr>
+          <p:nvPr isPhoto="0" userDrawn="0">
+            <p:ph idx="1" hasCustomPrompt="0"/>
+          </p:nvPr>
+        </p:nvSpPr>
+        <p:spPr bwMode="auto"/>
+        <p:txBody>
+          <a:bodyPr vertOverflow="overflow" horzOverflow="clip" vert="horz" wrap="square" lIns="91440" tIns="45720" rIns="91440" bIns="45720" numCol="1" spcCol="0" rtlCol="0" fromWordArt="0" anchor="t" anchorCtr="0" forceAA="0" upright="0" compatLnSpc="0">
+            <a:normAutofit/>
+          </a:bodyPr>
+          <a:lstStyle/>
+          <a:p>
+            <a:pPr marL="217793" indent="-217793">
+              <a:buFont typeface="Arial"/>
+              <a:buAutoNum type="arabicPeriod"/>
+              <a:defRPr/>
+            </a:pPr>
+            <a:r>
+              <a:rPr lang="bg-BG" sz="1200" b="0" i="0" u="none" strike="noStrike" cap="none" spc="0">
+                <a:solidFill>
+                  <a:schemeClr val="tx1">
+                    <a:lumMod val="75000"/>
+                    <a:lumOff val="25000"/>
+                  </a:schemeClr>
+                </a:solidFill>
+                <a:latin typeface="Arial"/>
+                <a:ea typeface="Arial"/>
+                <a:cs typeface="Arial"/>
+              </a:rPr>
+              <a:t>Staerk L, Sherer JA, Ko D, Benjamin EJ, Helm RH. Atrial Fibrillation: Epidemiology, Pathophysiology, and Clinical Outcomes. Circ Res. 2017 Apr 28;120(9):1501-1517. doi: 10.1161/CIRCRESAHA.117.309732. PMID: 28450367; PMCID: PMC5500874.</a:t>
+            </a:r>
+            <a:endParaRPr sz="1200"/>
+          </a:p>
+          <a:p>
+            <a:pPr marL="217793" indent="-217793">
+              <a:buFont typeface="Arial"/>
+              <a:buAutoNum type="arabicPeriod"/>
+              <a:defRPr/>
+            </a:pPr>
+            <a:r>
+              <a:rPr lang="bg-BG" sz="1200" b="0" i="0" u="none" strike="noStrike" cap="none" spc="0">
+                <a:solidFill>
+                  <a:schemeClr val="tx1">
+                    <a:lumMod val="75000"/>
+                    <a:lumOff val="25000"/>
+                  </a:schemeClr>
+                </a:solidFill>
+                <a:latin typeface="Arial"/>
+                <a:ea typeface="Arial"/>
+                <a:cs typeface="Arial"/>
+              </a:rPr>
+              <a:t> </a:t>
+            </a:r>
+            <a:r>
+              <a:rPr lang="bg-BG" sz="1200" b="0" i="0" u="none" strike="noStrike" cap="none" spc="0">
+                <a:solidFill>
+                  <a:schemeClr val="tx1">
+                    <a:lumMod val="75000"/>
+                    <a:lumOff val="25000"/>
+                  </a:schemeClr>
+                </a:solidFill>
+                <a:latin typeface="Arial"/>
+                <a:ea typeface="Arial"/>
+                <a:cs typeface="Arial"/>
+              </a:rPr>
+              <a:t>Lippi G, Sanchis-Gomar F, Cervellin G. Global epidemiology of atrial fibrillation: An increasing epidemic and public health challenge. Int J Stroke. 2021 Feb;16(2):217-221. doi: 10.1177/1747493019897870. Epub 2020 Jan 19. Erratum in: Int J Stroke. 2020 Jan 28;:1747493020905964. PMID: 31955707.</a:t>
+            </a:r>
+            <a:endParaRPr sz="1200" b="0" i="0" u="none" strike="noStrike" cap="none" spc="0">
+              <a:solidFill>
+                <a:schemeClr val="tx1">
+                  <a:lumMod val="75000"/>
+                  <a:lumOff val="25000"/>
+                </a:schemeClr>
+              </a:solidFill>
+              <a:latin typeface="Arial"/>
+              <a:ea typeface="Arial"/>
+              <a:cs typeface="Arial"/>
+            </a:endParaRPr>
+          </a:p>
+          <a:p>
+            <a:pPr marL="217793" indent="-217793">
+              <a:buFont typeface="Arial"/>
+              <a:buAutoNum type="arabicPeriod"/>
+              <a:defRPr/>
+            </a:pPr>
+            <a:r>
+              <a:rPr lang="bg-BG" sz="1200" b="0" i="0" u="none" strike="noStrike" cap="none" spc="0">
+                <a:solidFill>
+                  <a:schemeClr val="tx1">
+                    <a:lumMod val="75000"/>
+                    <a:lumOff val="25000"/>
+                  </a:schemeClr>
+                </a:solidFill>
+                <a:latin typeface="Arial"/>
+                <a:ea typeface="Arial"/>
+                <a:cs typeface="Arial"/>
+              </a:rPr>
+              <a:t> </a:t>
+            </a:r>
+            <a:r>
+              <a:rPr lang="bg-BG" sz="1200" b="0" i="0" u="none" strike="noStrike" cap="none" spc="0">
+                <a:solidFill>
+                  <a:schemeClr val="tx1">
+                    <a:lumMod val="75000"/>
+                    <a:lumOff val="25000"/>
+                  </a:schemeClr>
+                </a:solidFill>
+                <a:latin typeface="Arial"/>
+                <a:ea typeface="Arial"/>
+                <a:cs typeface="Arial"/>
+              </a:rPr>
+              <a:t>Sankaranarayanan R, Kirkwood G, Visweswariah R, Fox DJ. How does Chronic Atrial Fibrillation Influence Mortality in the Modern Treatment Era? Curr Cardiol Rev. 2015;11(3):190-8. doi: 10.2174/1573403x10666140902143020. PMID: 25182145; PMCID: PMC4558350.</a:t>
+            </a:r>
+            <a:endParaRPr sz="1200" b="0" i="0" u="none" strike="noStrike" cap="none" spc="0">
+              <a:solidFill>
+                <a:schemeClr val="tx1">
+                  <a:lumMod val="75000"/>
+                  <a:lumOff val="25000"/>
+                </a:schemeClr>
+              </a:solidFill>
+              <a:latin typeface="Arial"/>
+              <a:ea typeface="Arial"/>
+              <a:cs typeface="Arial"/>
+            </a:endParaRPr>
+          </a:p>
+          <a:p>
+            <a:pPr marL="217793" indent="-217793">
+              <a:buFont typeface="Arial"/>
+              <a:buAutoNum type="arabicPeriod"/>
+              <a:defRPr/>
+            </a:pPr>
+            <a:r>
+              <a:rPr sz="1200"/>
+              <a:t> </a:t>
+            </a:r>
+            <a:r>
+              <a:rPr lang="bg-BG" sz="1200" b="0" i="0" u="none" strike="noStrike" cap="none" spc="0">
+                <a:solidFill>
+                  <a:schemeClr val="tx1">
+                    <a:lumMod val="75000"/>
+                    <a:lumOff val="25000"/>
+                  </a:schemeClr>
+                </a:solidFill>
+                <a:latin typeface="Arial"/>
+                <a:ea typeface="Arial"/>
+                <a:cs typeface="Arial"/>
+              </a:rPr>
+              <a:t>Johnsen, S.P., Dalby, L.W., Täckström, T. et al. Cost of illness of atrial fibrillation: a nationwide study of societal impact. BMC Health Serv Res 17, 714 (2017). </a:t>
+            </a:r>
+            <a:r>
+              <a:rPr lang="bg-BG" sz="1200" b="0" i="0" u="sng" strike="noStrike" cap="none" spc="0">
+                <a:solidFill>
+                  <a:schemeClr val="tx1">
+                    <a:lumMod val="75000"/>
+                    <a:lumOff val="25000"/>
+                  </a:schemeClr>
+                </a:solidFill>
+                <a:latin typeface="Arial"/>
+                <a:ea typeface="Arial"/>
+                <a:cs typeface="Arial"/>
+                <a:hlinkClick r:id="rId2" tooltip="https://doi.org/10.1186/s12913-017-2652-y"/>
+              </a:rPr>
+              <a:t>https://doi.org/10.1186/s12913-017-2652-y</a:t>
+            </a:r>
+            <a:endParaRPr sz="1200"/>
+          </a:p>
+          <a:p>
+            <a:pPr marL="217793" indent="-217793">
+              <a:buFont typeface="Arial"/>
+              <a:buAutoNum type="arabicPeriod"/>
+              <a:defRPr/>
+            </a:pPr>
+            <a:r>
+              <a:rPr lang="bg-BG" sz="1200" b="0" i="0" u="none" strike="noStrike" cap="none" spc="0">
+                <a:solidFill>
+                  <a:schemeClr val="tx1">
+                    <a:lumMod val="75000"/>
+                    <a:lumOff val="25000"/>
+                  </a:schemeClr>
+                </a:solidFill>
+                <a:latin typeface="Arial"/>
+                <a:ea typeface="Arial"/>
+                <a:cs typeface="Arial"/>
+              </a:rPr>
+              <a:t>Quality of Life in Patients with Atrial Fibrillation: A Systematic Review </a:t>
+            </a:r>
+            <a:r>
+              <a:rPr lang="bg-BG" sz="1200" b="0" i="0" u="none" strike="noStrike" cap="none" spc="0">
+                <a:solidFill>
+                  <a:schemeClr val="tx1">
+                    <a:lumMod val="75000"/>
+                    <a:lumOff val="25000"/>
+                  </a:schemeClr>
+                </a:solidFill>
+                <a:latin typeface="Arial"/>
+                <a:ea typeface="Arial"/>
+                <a:cs typeface="Arial"/>
+              </a:rPr>
+              <a:t>Thrall, Graham et al. </a:t>
+            </a:r>
+            <a:r>
+              <a:rPr lang="bg-BG" sz="1200" b="0" i="0" u="none" strike="noStrike" cap="none" spc="0">
+                <a:solidFill>
+                  <a:schemeClr val="tx1">
+                    <a:lumMod val="75000"/>
+                    <a:lumOff val="25000"/>
+                  </a:schemeClr>
+                </a:solidFill>
+                <a:latin typeface="Arial"/>
+                <a:ea typeface="Arial"/>
+                <a:cs typeface="Arial"/>
+              </a:rPr>
+              <a:t>The American Journal of Medicine, Volume 119, Issue 5, 448.e1 - 448.e19</a:t>
+            </a:r>
+            <a:endParaRPr sz="1200"/>
           </a:p>
         </p:txBody>
       </p:sp>
@@ -5209,40 +5774,58 @@
           </p:nvPr>
         </p:nvSpPr>
         <p:spPr bwMode="auto">
-          <a:xfrm>
-            <a:off x="415869" y="2019946"/>
-            <a:ext cx="10972800" cy="4525961"/>
+          <a:xfrm flipH="0" flipV="0">
+            <a:off x="367436" y="1417637"/>
+            <a:ext cx="11388759" cy="5565613"/>
           </a:xfrm>
         </p:spPr>
         <p:txBody>
-          <a:bodyPr/>
+          <a:bodyPr vertOverflow="overflow" horzOverflow="clip" vert="horz" wrap="square" lIns="91440" tIns="45720" rIns="91440" bIns="45720" numCol="1" spcCol="0" rtlCol="0" fromWordArt="0" anchor="t" anchorCtr="0" forceAA="0" upright="0" compatLnSpc="0">
+            <a:normAutofit fontScale="95000" lnSpcReduction="1000"/>
+          </a:bodyPr>
           <a:lstStyle/>
           <a:p>
             <a:pPr>
               <a:defRPr/>
             </a:pPr>
             <a:r>
-              <a:rPr lang="bg-BG" sz="3200" b="0" i="0" u="none" strike="noStrike" cap="none" spc="0">
+              <a:rPr lang="en-GB" sz="2600" b="0" i="0" u="none" strike="noStrike" cap="none" spc="0">
                 <a:solidFill>
                   <a:schemeClr val="tx1">
                     <a:lumMod val="75000"/>
                     <a:lumOff val="25000"/>
                   </a:schemeClr>
                 </a:solidFill>
-                <a:latin typeface="Arial"/>
-                <a:cs typeface="Arial"/>
-              </a:rPr>
-              <a:t>Short explanation of the disease</a:t>
-            </a:r>
-            <a:endParaRPr lang="bg-BG" sz="3200" b="0" i="0" u="none" strike="noStrike" cap="none" spc="0">
+                <a:latin typeface="DejaVu Sans Light"/>
+                <a:ea typeface="DejaVu Sans Light"/>
+                <a:cs typeface="DejaVu Sans Light"/>
+              </a:rPr>
+              <a:t>Atrial fibrillation (AF) is a condition characterised by an </a:t>
+            </a:r>
+            <a:r>
+              <a:rPr lang="en-GB" sz="2600" b="1" i="0" u="none" strike="noStrike" cap="none" spc="0">
+                <a:solidFill>
+                  <a:schemeClr val="tx1">
+                    <a:lumMod val="75000"/>
+                    <a:lumOff val="25000"/>
+                  </a:schemeClr>
+                </a:solidFill>
+                <a:latin typeface="DejaVu Sans Light"/>
+                <a:ea typeface="DejaVu Sans Light"/>
+                <a:cs typeface="DejaVu Sans Light"/>
+              </a:rPr>
+              <a:t>abnormal heart rhythm</a:t>
+            </a:r>
+            <a:endParaRPr sz="2600" b="0" i="0" u="none" strike="noStrike" cap="none" spc="0">
               <a:solidFill>
                 <a:schemeClr val="tx1">
                   <a:lumMod val="75000"/>
                   <a:lumOff val="25000"/>
                 </a:schemeClr>
               </a:solidFill>
-              <a:latin typeface="Arial"/>
-              <a:cs typeface="Arial"/>
+              <a:latin typeface="DejaVu Sans Light"/>
+              <a:ea typeface="DejaVu Sans Light"/>
+              <a:cs typeface="DejaVu Sans Light"/>
             </a:endParaRPr>
           </a:p>
           <a:p>
@@ -5250,27 +5833,43 @@
               <a:defRPr/>
             </a:pPr>
             <a:r>
-              <a:rPr lang="bg-BG" sz="3200" b="0" i="0" u="none" strike="noStrike" cap="none" spc="0">
+              <a:rPr lang="en-GB" sz="2600" b="0" i="0" u="none" strike="noStrike" cap="none" spc="0">
                 <a:solidFill>
                   <a:schemeClr val="tx1">
                     <a:lumMod val="75000"/>
                     <a:lumOff val="25000"/>
                   </a:schemeClr>
                 </a:solidFill>
-                <a:latin typeface="Arial"/>
-                <a:cs typeface="Arial"/>
-              </a:rPr>
-              <a:t>Incidence and prevalence</a:t>
-            </a:r>
-            <a:endParaRPr lang="bg-BG" sz="3200" b="0" i="0" u="none" strike="noStrike" cap="none" spc="0">
+                <a:latin typeface="DejaVu Sans Light"/>
+                <a:ea typeface="DejaVu Sans Light"/>
+                <a:cs typeface="DejaVu Sans Light"/>
+              </a:rPr>
+              <a:t>Atrial fibrillation is </a:t>
+            </a:r>
+            <a:r>
+              <a:rPr lang="en-GB" sz="2600" b="1" i="0" u="none" strike="noStrike" cap="none" spc="0">
+                <a:solidFill>
+                  <a:schemeClr val="tx1">
+                    <a:lumMod val="75000"/>
+                    <a:lumOff val="25000"/>
+                  </a:schemeClr>
+                </a:solidFill>
+                <a:latin typeface="DejaVu Sans Light"/>
+                <a:ea typeface="DejaVu Sans Light"/>
+                <a:cs typeface="DejaVu Sans Light"/>
+              </a:rPr>
+              <a:t>difficult to diagnose </a:t>
+            </a:r>
+            <a:endParaRPr lang="en-GB" sz="2600" b="1" i="0" u="none" strike="noStrike" cap="none" spc="0">
               <a:solidFill>
                 <a:schemeClr val="tx1">
                   <a:lumMod val="75000"/>
                   <a:lumOff val="25000"/>
                 </a:schemeClr>
               </a:solidFill>
-              <a:latin typeface="Arial"/>
-              <a:cs typeface="Arial"/>
+              <a:latin typeface="DejaVu Sans Light"/>
+              <a:ea typeface="DejaVu Sans Light"/>
+              <a:cs typeface="DejaVu Sans Light"/>
             </a:endParaRPr>
           </a:p>
           <a:p>
@@ -5278,27 +5877,29 @@
               <a:defRPr/>
             </a:pPr>
             <a:r>
-              <a:rPr lang="bg-BG" sz="3200" b="0" i="0" u="none" strike="noStrike" cap="none" spc="0">
+              <a:rPr lang="en-GB" sz="2500" b="1" i="0" u="none" strike="noStrike" cap="none" spc="0">
                 <a:solidFill>
                   <a:schemeClr val="tx1">
                     <a:lumMod val="75000"/>
                     <a:lumOff val="25000"/>
                   </a:schemeClr>
                 </a:solidFill>
-                <a:latin typeface="Arial"/>
-                <a:cs typeface="Arial"/>
-              </a:rPr>
-              <a:t>Mortality, morbidity, quality of life</a:t>
-            </a:r>
-            <a:endParaRPr lang="bg-BG" sz="3200" b="0" i="0" u="none" strike="noStrike" cap="none" spc="0">
+                <a:latin typeface="DejaVu Sans Light"/>
+                <a:ea typeface="DejaVu Sans Light"/>
+                <a:cs typeface="DejaVu Sans Light"/>
+              </a:rPr>
+              <a:t>Oral anticoagulation (OAC) can prevent AF-related strokes</a:t>
+            </a:r>
+            <a:endParaRPr sz="2600" b="0" i="0" u="none" strike="noStrike" cap="none" spc="0">
               <a:solidFill>
                 <a:schemeClr val="tx1">
                   <a:lumMod val="75000"/>
                   <a:lumOff val="25000"/>
                 </a:schemeClr>
               </a:solidFill>
-              <a:latin typeface="Arial"/>
-              <a:cs typeface="Arial"/>
+              <a:latin typeface="DejaVu Sans Light"/>
+              <a:ea typeface="DejaVu Sans Light"/>
+              <a:cs typeface="DejaVu Sans Light"/>
             </a:endParaRPr>
           </a:p>
           <a:p>
@@ -5306,19 +5907,474 @@
               <a:defRPr/>
             </a:pPr>
             <a:r>
-              <a:rPr lang="bg-BG" sz="3200" b="0" i="0" u="none" strike="noStrike" cap="none" spc="0">
+              <a:rPr lang="en-GB" sz="2600" b="0" i="0" u="none" strike="noStrike" cap="none" spc="0">
                 <a:solidFill>
                   <a:schemeClr val="tx1">
                     <a:lumMod val="75000"/>
                     <a:lumOff val="25000"/>
                   </a:schemeClr>
                 </a:solidFill>
-                <a:latin typeface="Arial"/>
-                <a:cs typeface="Arial"/>
-              </a:rPr>
-              <a:t>Costs (in monetary value), the burden to society (in QALY)</a:t>
-            </a:r>
-            <a:endParaRPr/>
+                <a:latin typeface="DejaVu Sans Light"/>
+                <a:ea typeface="DejaVu Sans Light"/>
+                <a:cs typeface="DejaVu Sans Light"/>
+              </a:rPr>
+              <a:t>Baseline </a:t>
+            </a:r>
+            <a:r>
+              <a:rPr lang="en-GB" sz="2600" b="1" i="0" u="none" strike="noStrike" cap="none" spc="0">
+                <a:solidFill>
+                  <a:schemeClr val="tx1">
+                    <a:lumMod val="75000"/>
+                    <a:lumOff val="25000"/>
+                  </a:schemeClr>
+                </a:solidFill>
+                <a:latin typeface="DejaVu Sans Light"/>
+                <a:ea typeface="DejaVu Sans Light"/>
+                <a:cs typeface="DejaVu Sans Light"/>
+              </a:rPr>
+              <a:t>prevalence 7.2%</a:t>
+            </a:r>
+            <a:r>
+              <a:rPr lang="en-GB" sz="2600" b="0" i="0" u="none" strike="noStrike" cap="none" spc="0">
+                <a:solidFill>
+                  <a:schemeClr val="tx1">
+                    <a:lumMod val="75000"/>
+                    <a:lumOff val="25000"/>
+                  </a:schemeClr>
+                </a:solidFill>
+                <a:latin typeface="DejaVu Sans Light"/>
+                <a:ea typeface="DejaVu Sans Light"/>
+                <a:cs typeface="DejaVu Sans Light"/>
+              </a:rPr>
+              <a:t> </a:t>
+            </a:r>
+            <a:r>
+              <a:rPr lang="en-GB" sz="2600" b="0" i="0" u="none" strike="noStrike" cap="none" spc="0" baseline="30000">
+                <a:solidFill>
+                  <a:schemeClr val="tx1">
+                    <a:lumMod val="75000"/>
+                    <a:lumOff val="25000"/>
+                  </a:schemeClr>
+                </a:solidFill>
+                <a:latin typeface="DejaVu Sans Light"/>
+                <a:ea typeface="DejaVu Sans Light"/>
+                <a:cs typeface="DejaVu Sans Light"/>
+              </a:rPr>
+              <a:t>1</a:t>
+            </a:r>
+            <a:endParaRPr sz="2600" b="0" i="0" u="none" strike="noStrike" cap="none" spc="0">
+              <a:solidFill>
+                <a:schemeClr val="tx1">
+                  <a:lumMod val="75000"/>
+                  <a:lumOff val="25000"/>
+                </a:schemeClr>
+              </a:solidFill>
+              <a:latin typeface="DejaVu Sans Light"/>
+              <a:ea typeface="DejaVu Sans Light"/>
+              <a:cs typeface="DejaVu Sans Light"/>
+            </a:endParaRPr>
+          </a:p>
+          <a:p>
+            <a:pPr>
+              <a:defRPr/>
+            </a:pPr>
+            <a:r>
+              <a:rPr lang="en-GB" sz="2600" b="0" i="0" u="none" strike="noStrike" cap="none" spc="0">
+                <a:solidFill>
+                  <a:schemeClr val="tx1">
+                    <a:lumMod val="75000"/>
+                    <a:lumOff val="25000"/>
+                  </a:schemeClr>
+                </a:solidFill>
+                <a:latin typeface="DejaVu Sans Light"/>
+                <a:ea typeface="DejaVu Sans Light"/>
+                <a:cs typeface="DejaVu Sans Light"/>
+              </a:rPr>
+              <a:t>Incidence rate </a:t>
+            </a:r>
+            <a:r>
+              <a:rPr lang="en-GB" sz="2600" b="1" i="0" u="none" strike="noStrike" cap="none" spc="0">
+                <a:solidFill>
+                  <a:schemeClr val="tx1">
+                    <a:lumMod val="75000"/>
+                    <a:lumOff val="25000"/>
+                  </a:schemeClr>
+                </a:solidFill>
+                <a:latin typeface="DejaVu Sans Light"/>
+                <a:ea typeface="DejaVu Sans Light"/>
+                <a:cs typeface="DejaVu Sans Light"/>
+              </a:rPr>
+              <a:t>31/100 per year</a:t>
+            </a:r>
+            <a:r>
+              <a:rPr lang="en-GB" sz="2600" b="0" i="0" u="none" strike="noStrike" cap="none" spc="0">
+                <a:solidFill>
+                  <a:schemeClr val="tx1">
+                    <a:lumMod val="75000"/>
+                    <a:lumOff val="25000"/>
+                  </a:schemeClr>
+                </a:solidFill>
+                <a:latin typeface="DejaVu Sans Light"/>
+                <a:ea typeface="DejaVu Sans Light"/>
+                <a:cs typeface="DejaVu Sans Light"/>
+              </a:rPr>
+              <a:t> </a:t>
+            </a:r>
+            <a:r>
+              <a:rPr lang="en-GB" sz="2600" b="0" i="0" u="none" strike="noStrike" cap="none" spc="0" baseline="30000">
+                <a:solidFill>
+                  <a:schemeClr val="tx1">
+                    <a:lumMod val="75000"/>
+                    <a:lumOff val="25000"/>
+                  </a:schemeClr>
+                </a:solidFill>
+                <a:latin typeface="DejaVu Sans Light"/>
+                <a:ea typeface="DejaVu Sans Light"/>
+                <a:cs typeface="DejaVu Sans Light"/>
+              </a:rPr>
+              <a:t>2</a:t>
+            </a:r>
+            <a:endParaRPr sz="2600" b="0" i="0" u="none" strike="noStrike" cap="none" spc="0">
+              <a:solidFill>
+                <a:schemeClr val="tx1">
+                  <a:lumMod val="75000"/>
+                  <a:lumOff val="25000"/>
+                </a:schemeClr>
+              </a:solidFill>
+              <a:latin typeface="DejaVu Sans Light"/>
+              <a:ea typeface="DejaVu Sans Light"/>
+              <a:cs typeface="DejaVu Sans Light"/>
+            </a:endParaRPr>
+          </a:p>
+          <a:p>
+            <a:pPr>
+              <a:defRPr/>
+            </a:pPr>
+            <a:r>
+              <a:rPr lang="en-GB" sz="2600" b="0" i="0" u="none" strike="noStrike" cap="none" spc="0">
+                <a:solidFill>
+                  <a:schemeClr val="tx1">
+                    <a:lumMod val="75000"/>
+                    <a:lumOff val="25000"/>
+                  </a:schemeClr>
+                </a:solidFill>
+                <a:latin typeface="DejaVu Sans Light"/>
+                <a:ea typeface="DejaVu Sans Light"/>
+                <a:cs typeface="DejaVu Sans Light"/>
+              </a:rPr>
+              <a:t>Excess in all-cause mortality rates attributable to AF i</a:t>
+            </a:r>
+            <a:r>
+              <a:rPr lang="en-GB" sz="2600" b="1" i="0" u="none" strike="noStrike" cap="none" spc="0">
+                <a:solidFill>
+                  <a:schemeClr val="tx1">
+                    <a:lumMod val="75000"/>
+                    <a:lumOff val="25000"/>
+                  </a:schemeClr>
+                </a:solidFill>
+                <a:latin typeface="DejaVu Sans Light"/>
+                <a:ea typeface="DejaVu Sans Light"/>
+                <a:cs typeface="DejaVu Sans Light"/>
+              </a:rPr>
+              <a:t>s 50% for men, and 90% for women</a:t>
+            </a:r>
+            <a:r>
+              <a:rPr lang="en-GB" sz="2600" b="0" i="0" u="none" strike="noStrike" cap="none" spc="0">
+                <a:solidFill>
+                  <a:schemeClr val="tx1">
+                    <a:lumMod val="75000"/>
+                    <a:lumOff val="25000"/>
+                  </a:schemeClr>
+                </a:solidFill>
+                <a:latin typeface="DejaVu Sans Light"/>
+                <a:ea typeface="DejaVu Sans Light"/>
+                <a:cs typeface="DejaVu Sans Light"/>
+              </a:rPr>
+              <a:t>.</a:t>
+            </a:r>
+            <a:r>
+              <a:rPr lang="en-GB" sz="2600" b="0" i="0" u="none" strike="noStrike" cap="none" spc="0" baseline="30000">
+                <a:solidFill>
+                  <a:schemeClr val="tx1">
+                    <a:lumMod val="75000"/>
+                    <a:lumOff val="25000"/>
+                  </a:schemeClr>
+                </a:solidFill>
+                <a:latin typeface="DejaVu Sans Light"/>
+                <a:ea typeface="DejaVu Sans Light"/>
+                <a:cs typeface="DejaVu Sans Light"/>
+              </a:rPr>
+              <a:t>3</a:t>
+            </a:r>
+            <a:endParaRPr sz="2600" b="0" i="0" u="none" strike="noStrike" cap="none" spc="0">
+              <a:solidFill>
+                <a:schemeClr val="tx1">
+                  <a:lumMod val="75000"/>
+                  <a:lumOff val="25000"/>
+                </a:schemeClr>
+              </a:solidFill>
+              <a:latin typeface="DejaVu Sans Light"/>
+              <a:ea typeface="DejaVu Sans Light"/>
+              <a:cs typeface="DejaVu Sans Light"/>
+            </a:endParaRPr>
+          </a:p>
+          <a:p>
+            <a:pPr>
+              <a:defRPr/>
+            </a:pPr>
+            <a:r>
+              <a:rPr lang="en-GB" sz="2600" b="0" i="0" u="none" strike="noStrike" cap="none" spc="0">
+                <a:solidFill>
+                  <a:schemeClr val="tx1">
+                    <a:lumMod val="75000"/>
+                    <a:lumOff val="25000"/>
+                  </a:schemeClr>
+                </a:solidFill>
+                <a:latin typeface="DejaVu Sans Light"/>
+                <a:ea typeface="DejaVu Sans Light"/>
+                <a:cs typeface="DejaVu Sans Light"/>
+              </a:rPr>
+              <a:t>Iceberg of morbidity</a:t>
+            </a:r>
+            <a:endParaRPr sz="2600" b="0" i="0" u="none" strike="noStrike" cap="none" spc="0">
+              <a:solidFill>
+                <a:schemeClr val="tx1">
+                  <a:lumMod val="75000"/>
+                  <a:lumOff val="25000"/>
+                </a:schemeClr>
+              </a:solidFill>
+              <a:latin typeface="DejaVu Sans Light"/>
+              <a:ea typeface="DejaVu Sans Light"/>
+              <a:cs typeface="DejaVu Sans Light"/>
+            </a:endParaRPr>
+          </a:p>
+          <a:p>
+            <a:pPr>
+              <a:defRPr/>
+            </a:pPr>
+            <a:r>
+              <a:rPr lang="en-GB" sz="2600" b="0" i="0" u="none" strike="noStrike" cap="none" spc="0">
+                <a:solidFill>
+                  <a:schemeClr val="tx1">
+                    <a:lumMod val="75000"/>
+                    <a:lumOff val="25000"/>
+                  </a:schemeClr>
+                </a:solidFill>
+                <a:latin typeface="DejaVu Sans Light"/>
+                <a:ea typeface="DejaVu Sans Light"/>
+                <a:cs typeface="DejaVu Sans Light"/>
+              </a:rPr>
+              <a:t>Average 3-year societal costs </a:t>
+            </a:r>
+            <a:r>
+              <a:rPr lang="en-GB" sz="2600" b="0" i="0" u="none" strike="noStrike" cap="none" spc="0">
+                <a:solidFill>
+                  <a:schemeClr val="tx1">
+                    <a:lumMod val="75000"/>
+                    <a:lumOff val="25000"/>
+                  </a:schemeClr>
+                </a:solidFill>
+                <a:latin typeface="DejaVu Sans Light"/>
+                <a:ea typeface="DejaVu Sans Light"/>
+                <a:cs typeface="DejaVu Sans Light"/>
+              </a:rPr>
+              <a:t>were estimated as </a:t>
+            </a:r>
+            <a:r>
+              <a:rPr lang="en-GB" sz="2600" b="1" i="0" u="none" strike="noStrike" cap="none" spc="0">
+                <a:solidFill>
+                  <a:schemeClr val="tx1">
+                    <a:lumMod val="75000"/>
+                    <a:lumOff val="25000"/>
+                  </a:schemeClr>
+                </a:solidFill>
+                <a:latin typeface="DejaVu Sans Light"/>
+                <a:ea typeface="DejaVu Sans Light"/>
+                <a:cs typeface="DejaVu Sans Light"/>
+              </a:rPr>
+              <a:t>€20,403–26,544 per patient</a:t>
+            </a:r>
+            <a:r>
+              <a:rPr lang="en-GB" sz="2600" b="0" i="0" u="none" strike="noStrike" cap="none" spc="0">
+                <a:solidFill>
+                  <a:schemeClr val="tx1">
+                    <a:lumMod val="75000"/>
+                    <a:lumOff val="25000"/>
+                  </a:schemeClr>
+                </a:solidFill>
+                <a:latin typeface="DejaVu Sans Light"/>
+                <a:ea typeface="DejaVu Sans Light"/>
+                <a:cs typeface="DejaVu Sans Light"/>
+              </a:rPr>
+              <a:t>. The costs were highest during the </a:t>
+            </a:r>
+            <a:r>
+              <a:rPr lang="en-GB" sz="2600" b="1" i="0" u="none" strike="noStrike" cap="none" spc="0">
+                <a:solidFill>
+                  <a:schemeClr val="tx1">
+                    <a:lumMod val="75000"/>
+                    <a:lumOff val="25000"/>
+                  </a:schemeClr>
+                </a:solidFill>
+                <a:latin typeface="DejaVu Sans Light"/>
+                <a:ea typeface="DejaVu Sans Light"/>
+                <a:cs typeface="DejaVu Sans Light"/>
+              </a:rPr>
+              <a:t>first year after diagnosis</a:t>
+            </a:r>
+            <a:r>
+              <a:rPr lang="en-GB" sz="2600" b="0" i="0" u="none" strike="noStrike" cap="none" spc="0">
+                <a:solidFill>
+                  <a:schemeClr val="tx1">
+                    <a:lumMod val="75000"/>
+                    <a:lumOff val="25000"/>
+                  </a:schemeClr>
+                </a:solidFill>
+                <a:latin typeface="DejaVu Sans Light"/>
+                <a:ea typeface="DejaVu Sans Light"/>
+                <a:cs typeface="DejaVu Sans Light"/>
+              </a:rPr>
+              <a:t>. </a:t>
+            </a:r>
+            <a:r>
+              <a:rPr lang="en-GB" sz="2600" b="1" i="0" u="none" strike="noStrike" cap="none" spc="0">
+                <a:solidFill>
+                  <a:schemeClr val="tx1">
+                    <a:lumMod val="75000"/>
+                    <a:lumOff val="25000"/>
+                  </a:schemeClr>
+                </a:solidFill>
+                <a:latin typeface="DejaVu Sans Light"/>
+                <a:ea typeface="DejaVu Sans Light"/>
+                <a:cs typeface="DejaVu Sans Light"/>
+              </a:rPr>
+              <a:t>Admission costs</a:t>
+            </a:r>
+            <a:r>
+              <a:rPr lang="en-GB" sz="2600" b="0" i="0" u="none" strike="noStrike" cap="none" spc="0">
+                <a:solidFill>
+                  <a:schemeClr val="tx1">
+                    <a:lumMod val="75000"/>
+                    <a:lumOff val="25000"/>
+                  </a:schemeClr>
+                </a:solidFill>
+                <a:latin typeface="DejaVu Sans Light"/>
+                <a:ea typeface="DejaVu Sans Light"/>
+                <a:cs typeface="DejaVu Sans Light"/>
+              </a:rPr>
+              <a:t> constituted the largest cost component </a:t>
+            </a:r>
+            <a:r>
+              <a:rPr lang="en-GB" sz="2600" b="0" i="0" u="none" strike="noStrike" cap="none" spc="0" baseline="30000">
+                <a:solidFill>
+                  <a:schemeClr val="tx1">
+                    <a:lumMod val="75000"/>
+                    <a:lumOff val="25000"/>
+                  </a:schemeClr>
+                </a:solidFill>
+                <a:latin typeface="DejaVu Sans Light"/>
+                <a:ea typeface="DejaVu Sans Light"/>
+                <a:cs typeface="DejaVu Sans Light"/>
+              </a:rPr>
+              <a:t>4</a:t>
+            </a:r>
+            <a:endParaRPr lang="en-GB" sz="2600" b="0" i="0" u="none" strike="noStrike" cap="none" spc="0">
+              <a:solidFill>
+                <a:schemeClr val="tx1">
+                  <a:lumMod val="75000"/>
+                  <a:lumOff val="25000"/>
+                </a:schemeClr>
+              </a:solidFill>
+              <a:latin typeface="DejaVu Sans Light"/>
+              <a:ea typeface="DejaVu Sans Light"/>
+              <a:cs typeface="DejaVu Sans Light"/>
+            </a:endParaRPr>
+          </a:p>
+          <a:p>
+            <a:pPr>
+              <a:defRPr/>
+            </a:pPr>
+            <a:r>
+              <a:rPr lang="en-GB" sz="2600" b="0" i="0" u="none" strike="noStrike" cap="none" spc="0">
+                <a:solidFill>
+                  <a:schemeClr val="tx1">
+                    <a:lumMod val="75000"/>
+                    <a:lumOff val="25000"/>
+                  </a:schemeClr>
+                </a:solidFill>
+                <a:latin typeface="DejaVu Sans Light"/>
+                <a:ea typeface="DejaVu Sans Light"/>
+                <a:cs typeface="DejaVu Sans Light"/>
+              </a:rPr>
+              <a:t>Pts. with AF reported a </a:t>
+            </a:r>
+            <a:r>
+              <a:rPr lang="en-GB" sz="2600" b="0" i="0" u="none" strike="noStrike" cap="none" spc="0">
+                <a:solidFill>
+                  <a:schemeClr val="tx1">
+                    <a:lumMod val="75000"/>
+                    <a:lumOff val="25000"/>
+                  </a:schemeClr>
+                </a:solidFill>
+                <a:latin typeface="DejaVu Sans Light"/>
+                <a:ea typeface="DejaVu Sans Light"/>
+                <a:cs typeface="DejaVu Sans Light"/>
+              </a:rPr>
+              <a:t>reduced QoL compared </a:t>
+            </a:r>
+            <a:r>
+              <a:rPr lang="en-GB" sz="2600" b="0" i="0" u="none" strike="noStrike" cap="none" spc="0">
+                <a:solidFill>
+                  <a:schemeClr val="tx1">
+                    <a:lumMod val="75000"/>
+                    <a:lumOff val="25000"/>
+                  </a:schemeClr>
+                </a:solidFill>
+                <a:latin typeface="DejaVu Sans Light"/>
+                <a:ea typeface="DejaVu Sans Light"/>
+                <a:cs typeface="DejaVu Sans Light"/>
+              </a:rPr>
+              <a:t>with healthy controls</a:t>
+            </a:r>
+            <a:r>
+              <a:rPr lang="en-GB" sz="2600" b="0" i="0" u="none" strike="noStrike" cap="none" spc="0">
+                <a:solidFill>
+                  <a:schemeClr val="tx1">
+                    <a:lumMod val="75000"/>
+                    <a:lumOff val="25000"/>
+                  </a:schemeClr>
+                </a:solidFill>
+                <a:latin typeface="DejaVu Sans Light"/>
+                <a:ea typeface="DejaVu Sans Light"/>
+                <a:cs typeface="DejaVu Sans Light"/>
+              </a:rPr>
+              <a:t> </a:t>
+            </a:r>
+            <a:r>
+              <a:rPr lang="en-GB" sz="2600" b="0" i="0" u="none" strike="noStrike" cap="none" spc="0" baseline="30000">
+                <a:solidFill>
+                  <a:schemeClr val="tx1">
+                    <a:lumMod val="75000"/>
+                    <a:lumOff val="25000"/>
+                  </a:schemeClr>
+                </a:solidFill>
+                <a:latin typeface="DejaVu Sans Light"/>
+                <a:ea typeface="DejaVu Sans Light"/>
+                <a:cs typeface="DejaVu Sans Light"/>
+              </a:rPr>
+              <a:t>5</a:t>
+            </a:r>
+            <a:endParaRPr lang="en-GB" sz="2600" b="0" i="0" u="none" strike="noStrike" cap="none" spc="0">
+              <a:solidFill>
+                <a:schemeClr val="tx1">
+                  <a:lumMod val="75000"/>
+                  <a:lumOff val="25000"/>
+                </a:schemeClr>
+              </a:solidFill>
+              <a:latin typeface="DejaVu Sans Light"/>
+              <a:ea typeface="DejaVu Sans Light"/>
+              <a:cs typeface="DejaVu Sans Light"/>
+            </a:endParaRPr>
           </a:p>
         </p:txBody>
       </p:sp>
@@ -5355,131 +6411,30 @@
           <a:chExt cx="0" cy="0"/>
         </a:xfrm>
       </p:grpSpPr>
-      <p:sp>
-        <p:nvSpPr>
-          <p:cNvPr id="86301605" name="Заголовок 1" hidden="0"/>
-          <p:cNvSpPr>
-            <a:spLocks noGrp="1"/>
-          </p:cNvSpPr>
-          <p:nvPr isPhoto="0" userDrawn="0">
-            <p:ph type="title" hasCustomPrompt="0"/>
-          </p:nvPr>
-        </p:nvSpPr>
-        <p:spPr bwMode="auto"/>
-        <p:txBody>
-          <a:bodyPr/>
-          <a:lstStyle/>
-          <a:p>
-            <a:pPr>
-              <a:defRPr/>
-            </a:pPr>
-            <a:r>
-              <a:rPr lang="bg-BG" sz="4400" b="0" i="0" u="none" strike="noStrike" cap="none" spc="0">
-                <a:solidFill>
-                  <a:schemeClr val="tx1"/>
-                </a:solidFill>
-                <a:latin typeface="Arial"/>
-                <a:cs typeface="Arial"/>
-              </a:rPr>
-              <a:t>Characteristics of patients</a:t>
-            </a:r>
-            <a:endParaRPr>
-              <a:solidFill>
-                <a:schemeClr val="tx1"/>
-              </a:solidFill>
-            </a:endParaRPr>
-          </a:p>
-        </p:txBody>
-      </p:sp>
-      <p:sp>
-        <p:nvSpPr>
-          <p:cNvPr id="1258433282" name="Объект 2" hidden="0"/>
-          <p:cNvSpPr>
-            <a:spLocks noGrp="1"/>
-          </p:cNvSpPr>
+      <p:pic>
+        <p:nvPicPr>
+          <p:cNvPr id="1878932307" name="" hidden="0"/>
+          <p:cNvPicPr>
+            <a:picLocks noChangeAspect="1"/>
+          </p:cNvPicPr>
           <p:nvPr isPhoto="0" userDrawn="0">
             <p:ph idx="1" hasCustomPrompt="0"/>
           </p:nvPr>
-        </p:nvSpPr>
-        <p:spPr bwMode="auto"/>
-        <p:txBody>
-          <a:bodyPr/>
-          <a:lstStyle/>
-          <a:p>
-            <a:pPr marL="0" indent="0">
-              <a:buFont typeface="Arial"/>
-              <a:buNone/>
-              <a:defRPr/>
-            </a:pPr>
-            <a:endParaRPr lang="bg-BG" sz="3200" b="0" i="0" u="none" strike="noStrike" cap="none" spc="0">
-              <a:solidFill>
-                <a:schemeClr val="tx1">
-                  <a:lumMod val="75000"/>
-                  <a:lumOff val="25000"/>
-                </a:schemeClr>
-              </a:solidFill>
-              <a:latin typeface="Arial"/>
-              <a:cs typeface="Arial"/>
-            </a:endParaRPr>
-          </a:p>
-          <a:p>
-            <a:pPr>
-              <a:defRPr/>
-            </a:pPr>
-            <a:r>
-              <a:rPr lang="bg-BG" sz="3200" b="0" i="0" u="none" strike="noStrike" cap="none" spc="0">
-                <a:solidFill>
-                  <a:schemeClr val="tx1">
-                    <a:lumMod val="75000"/>
-                    <a:lumOff val="25000"/>
-                  </a:schemeClr>
-                </a:solidFill>
-                <a:latin typeface="Arial"/>
-                <a:cs typeface="Arial"/>
-              </a:rPr>
-              <a:t>Age, gender</a:t>
-            </a:r>
-            <a:endParaRPr lang="bg-BG" sz="3200" b="0" i="0" u="none" strike="noStrike" cap="none" spc="0">
-              <a:solidFill>
-                <a:schemeClr val="tx1">
-                  <a:lumMod val="75000"/>
-                  <a:lumOff val="25000"/>
-                </a:schemeClr>
-              </a:solidFill>
-              <a:latin typeface="Arial"/>
-              <a:cs typeface="Arial"/>
-            </a:endParaRPr>
-          </a:p>
-          <a:p>
-            <a:pPr>
-              <a:defRPr/>
-            </a:pPr>
-            <a:r>
-              <a:rPr lang="bg-BG" sz="3200" b="0" i="0" u="none" strike="noStrike" cap="none" spc="0">
-                <a:solidFill>
-                  <a:schemeClr val="tx1">
-                    <a:lumMod val="75000"/>
-                    <a:lumOff val="25000"/>
-                  </a:schemeClr>
-                </a:solidFill>
-                <a:latin typeface="Arial"/>
-                <a:cs typeface="Arial"/>
-              </a:rPr>
-              <a:t>Cultural background</a:t>
-            </a:r>
-            <a:endParaRPr lang="bg-BG" sz="3200" b="0" i="0" u="none" strike="noStrike" cap="none" spc="0">
-              <a:solidFill>
-                <a:schemeClr val="tx1">
-                  <a:lumMod val="75000"/>
-                  <a:lumOff val="25000"/>
-                </a:schemeClr>
-              </a:solidFill>
-              <a:latin typeface="Arial"/>
-              <a:cs typeface="Arial"/>
-            </a:endParaRPr>
-          </a:p>
-        </p:txBody>
-      </p:sp>
+        </p:nvPicPr>
+        <p:blipFill>
+          <a:blip r:embed="rId2"/>
+          <a:stretch/>
+        </p:blipFill>
+        <p:spPr bwMode="auto">
+          <a:xfrm rot="0" flipH="0" flipV="0">
+            <a:off x="1846192" y="266700"/>
+            <a:ext cx="8109056" cy="6319409"/>
+          </a:xfrm>
+          <a:prstGeom prst="rect">
+            <a:avLst/>
+          </a:prstGeom>
+        </p:spPr>
+      </p:pic>
     </p:spTree>
   </p:cSld>
   <p:clrMapOvr>
@@ -5513,179 +6468,30 @@
           <a:chExt cx="0" cy="0"/>
         </a:xfrm>
       </p:grpSpPr>
-      <p:sp>
-        <p:nvSpPr>
-          <p:cNvPr id="738719686" name="Заголовок 1" hidden="0"/>
-          <p:cNvSpPr>
-            <a:spLocks noGrp="1"/>
-          </p:cNvSpPr>
-          <p:nvPr isPhoto="0" userDrawn="0">
-            <p:ph type="title" hasCustomPrompt="0"/>
-          </p:nvPr>
-        </p:nvSpPr>
-        <p:spPr bwMode="auto"/>
-        <p:txBody>
-          <a:bodyPr/>
-          <a:lstStyle/>
-          <a:p>
-            <a:pPr>
-              <a:defRPr/>
-            </a:pPr>
-            <a:r>
-              <a:rPr lang="bg-BG" sz="4400" b="0" i="0" u="none" strike="noStrike" cap="none" spc="0">
-                <a:solidFill>
-                  <a:schemeClr val="tx1">
-                    <a:lumMod val="65000"/>
-                    <a:lumOff val="35000"/>
-                  </a:schemeClr>
-                </a:solidFill>
-                <a:latin typeface="Arial"/>
-                <a:cs typeface="Arial"/>
-              </a:rPr>
-              <a:t> Interventions and comparators</a:t>
-            </a:r>
-            <a:endParaRPr/>
-          </a:p>
-        </p:txBody>
-      </p:sp>
-      <p:sp>
-        <p:nvSpPr>
-          <p:cNvPr id="2000400029" name="Объект 2" hidden="0"/>
-          <p:cNvSpPr>
-            <a:spLocks noGrp="1"/>
-          </p:cNvSpPr>
+      <p:pic>
+        <p:nvPicPr>
+          <p:cNvPr id="391144965" name="" hidden="0"/>
+          <p:cNvPicPr>
+            <a:picLocks noChangeAspect="1"/>
+          </p:cNvPicPr>
           <p:nvPr isPhoto="0" userDrawn="0">
             <p:ph idx="1" hasCustomPrompt="0"/>
           </p:nvPr>
-        </p:nvSpPr>
-        <p:spPr bwMode="auto"/>
-        <p:txBody>
-          <a:bodyPr vertOverflow="overflow" horzOverflow="overflow" vert="horz" wrap="square" lIns="91440" tIns="45720" rIns="91440" bIns="45720" numCol="1" spcCol="0" rtlCol="0" fromWordArt="0" anchor="t" anchorCtr="0" forceAA="0" upright="0" compatLnSpc="0">
-            <a:normAutofit/>
-          </a:bodyPr>
-          <a:lstStyle/>
-          <a:p>
-            <a:pPr marL="0" indent="0">
-              <a:buFont typeface="Arial"/>
-              <a:buNone/>
-              <a:defRPr/>
-            </a:pPr>
-            <a:endParaRPr lang="bg-BG" sz="3200" b="0" i="0" u="none" strike="noStrike" cap="none" spc="0">
-              <a:solidFill>
-                <a:schemeClr val="tx1">
-                  <a:lumMod val="75000"/>
-                  <a:lumOff val="25000"/>
-                </a:schemeClr>
-              </a:solidFill>
-              <a:latin typeface="Arial"/>
-              <a:cs typeface="Arial"/>
-            </a:endParaRPr>
-          </a:p>
-          <a:p>
-            <a:pPr>
-              <a:defRPr/>
-            </a:pPr>
-            <a:r>
-              <a:rPr lang="bg-BG" sz="3200" b="0" i="0" u="none" strike="noStrike" cap="none" spc="0">
-                <a:solidFill>
-                  <a:schemeClr val="tx1">
-                    <a:lumMod val="75000"/>
-                    <a:lumOff val="25000"/>
-                  </a:schemeClr>
-                </a:solidFill>
-                <a:latin typeface="Arial"/>
-                <a:cs typeface="Arial"/>
-              </a:rPr>
-              <a:t>What is the background problem you want to solve</a:t>
-            </a:r>
-            <a:endParaRPr lang="bg-BG" sz="3200" b="0" i="0" u="none" strike="noStrike" cap="none" spc="0">
-              <a:solidFill>
-                <a:schemeClr val="tx1">
-                  <a:lumMod val="75000"/>
-                  <a:lumOff val="25000"/>
-                </a:schemeClr>
-              </a:solidFill>
-              <a:latin typeface="Arial"/>
-              <a:cs typeface="Arial"/>
-            </a:endParaRPr>
-          </a:p>
-          <a:p>
-            <a:pPr>
-              <a:defRPr/>
-            </a:pPr>
-            <a:r>
-              <a:rPr lang="bg-BG" sz="3200" b="0" i="0" u="none" strike="noStrike" cap="none" spc="0">
-                <a:solidFill>
-                  <a:schemeClr val="tx1">
-                    <a:lumMod val="75000"/>
-                    <a:lumOff val="25000"/>
-                  </a:schemeClr>
-                </a:solidFill>
-                <a:latin typeface="Arial"/>
-                <a:cs typeface="Arial"/>
-              </a:rPr>
-              <a:t>Available interventions</a:t>
-            </a:r>
-            <a:endParaRPr lang="bg-BG" sz="3200" b="0" i="0" u="none" strike="noStrike" cap="none" spc="0">
-              <a:solidFill>
-                <a:schemeClr val="tx1">
-                  <a:lumMod val="75000"/>
-                  <a:lumOff val="25000"/>
-                </a:schemeClr>
-              </a:solidFill>
-              <a:latin typeface="Arial"/>
-              <a:cs typeface="Arial"/>
-            </a:endParaRPr>
-          </a:p>
-          <a:p>
-            <a:pPr>
-              <a:defRPr/>
-            </a:pPr>
-            <a:r>
-              <a:rPr lang="bg-BG" sz="3200" b="0" i="0" u="none" strike="noStrike" cap="none" spc="0">
-                <a:solidFill>
-                  <a:schemeClr val="tx1">
-                    <a:lumMod val="75000"/>
-                    <a:lumOff val="25000"/>
-                  </a:schemeClr>
-                </a:solidFill>
-                <a:latin typeface="Arial"/>
-                <a:cs typeface="Arial"/>
-              </a:rPr>
-              <a:t>Important health and/or cost consequences of these interventions</a:t>
-            </a:r>
-            <a:endParaRPr lang="bg-BG" sz="3200" b="0" i="0" u="none" strike="noStrike" cap="none" spc="0">
-              <a:solidFill>
-                <a:schemeClr val="tx1">
-                  <a:lumMod val="75000"/>
-                  <a:lumOff val="25000"/>
-                </a:schemeClr>
-              </a:solidFill>
-              <a:latin typeface="Arial"/>
-              <a:cs typeface="Arial"/>
-            </a:endParaRPr>
-          </a:p>
-          <a:p>
-            <a:pPr>
-              <a:defRPr/>
-            </a:pPr>
-            <a:r>
-              <a:rPr lang="bg-BG" sz="3200" b="0" i="0" u="none" strike="noStrike" cap="none" spc="0">
-                <a:solidFill>
-                  <a:schemeClr val="tx1">
-                    <a:lumMod val="75000"/>
-                    <a:lumOff val="25000"/>
-                  </a:schemeClr>
-                </a:solidFill>
-                <a:latin typeface="Arial"/>
-                <a:cs typeface="Arial"/>
-              </a:rPr>
-              <a:t>Which interventions will be compared in the economic evaluation and why?</a:t>
-            </a:r>
-            <a:endParaRPr/>
-          </a:p>
-        </p:txBody>
-      </p:sp>
+        </p:nvPicPr>
+        <p:blipFill>
+          <a:blip r:embed="rId2"/>
+          <a:stretch/>
+        </p:blipFill>
+        <p:spPr bwMode="auto">
+          <a:xfrm rot="0" flipH="0" flipV="0">
+            <a:off x="592499" y="1325657"/>
+            <a:ext cx="10863167" cy="4579842"/>
+          </a:xfrm>
+          <a:prstGeom prst="rect">
+            <a:avLst/>
+          </a:prstGeom>
+        </p:spPr>
+      </p:pic>
     </p:spTree>
   </p:cSld>
   <p:clrMapOvr>
@@ -5721,7 +6527,7 @@
       </p:grpSpPr>
       <p:sp>
         <p:nvSpPr>
-          <p:cNvPr id="1439137211" name="Заголовок 1" hidden="0"/>
+          <p:cNvPr id="738719686" name="Заголовок 1" hidden="0"/>
           <p:cNvSpPr>
             <a:spLocks noGrp="1"/>
           </p:cNvSpPr>
@@ -5748,7 +6554,7 @@
                 <a:latin typeface="Arial"/>
                 <a:cs typeface="Arial"/>
               </a:rPr>
-              <a:t>Aim/research question</a:t>
+              <a:t> Interventions and comparators</a:t>
             </a:r>
             <a:endParaRPr/>
           </a:p>
@@ -5756,7 +6562,7 @@
       </p:sp>
       <p:sp>
         <p:nvSpPr>
-          <p:cNvPr id="544118936" name="Объект 2" hidden="0"/>
+          <p:cNvPr id="2000400029" name="Объект 2" hidden="0"/>
           <p:cNvSpPr>
             <a:spLocks noGrp="1"/>
           </p:cNvSpPr>
@@ -5766,7 +6572,9 @@
         </p:nvSpPr>
         <p:spPr bwMode="auto"/>
         <p:txBody>
-          <a:bodyPr/>
+          <a:bodyPr vertOverflow="overflow" horzOverflow="overflow" vert="horz" wrap="square" lIns="91440" tIns="45720" rIns="91440" bIns="45720" numCol="1" spcCol="0" rtlCol="0" fromWordArt="0" anchor="t" anchorCtr="0" forceAA="0" upright="0" compatLnSpc="0">
+            <a:normAutofit/>
+          </a:bodyPr>
           <a:lstStyle/>
           <a:p>
             <a:pPr marL="0" indent="0">
@@ -5800,7 +6608,7 @@
                 <a:latin typeface="Arial"/>
                 <a:cs typeface="Arial"/>
               </a:rPr>
-              <a:t>Answerable research question (Use PICOT, include perspective, target group, and</a:t>
+              <a:t>What is the background problem you want to solve</a:t>
             </a:r>
             <a:endParaRPr lang="bg-BG" sz="3200" b="0" i="0" u="none" strike="noStrike" cap="none" spc="0">
               <a:solidFill>
@@ -5828,7 +6636,7 @@
                 <a:latin typeface="Arial"/>
                 <a:cs typeface="Arial"/>
               </a:rPr>
-              <a:t>intervention and comparator, time horizon)</a:t>
+              <a:t>Available interventions</a:t>
             </a:r>
             <a:endParaRPr lang="bg-BG" sz="3200" b="0" i="0" u="none" strike="noStrike" cap="none" spc="0">
               <a:solidFill>
@@ -5856,9 +6664,18 @@
                 <a:latin typeface="Arial"/>
                 <a:cs typeface="Arial"/>
               </a:rPr>
-              <a:t>Expected efficiency based on evidence (hypothesis)</a:t>
-            </a:r>
-            <a:endParaRPr/>
+              <a:t>Important health and/or cost consequences of these interventions</a:t>
+            </a:r>
+            <a:endParaRPr lang="bg-BG" sz="3200" b="0" i="0" u="none" strike="noStrike" cap="none" spc="0">
+              <a:solidFill>
+                <a:schemeClr val="tx1">
+                  <a:lumMod val="75000"/>
+                  <a:lumOff val="25000"/>
+                </a:schemeClr>
+              </a:solidFill>
+              <a:latin typeface="Arial"/>
+              <a:cs typeface="Arial"/>
+            </a:endParaRPr>
           </a:p>
         </p:txBody>
       </p:sp>
@@ -5897,7 +6714,7 @@
       </p:grpSpPr>
       <p:sp>
         <p:nvSpPr>
-          <p:cNvPr id="1090714944" name="Заголовок 1" hidden="0"/>
+          <p:cNvPr id="1439137211" name="Заголовок 1" hidden="0"/>
           <p:cNvSpPr>
             <a:spLocks noGrp="1"/>
           </p:cNvSpPr>
@@ -5924,7 +6741,7 @@
                 <a:latin typeface="Arial"/>
                 <a:cs typeface="Arial"/>
               </a:rPr>
-              <a:t>Overall framing</a:t>
+              <a:t>Aim/research question</a:t>
             </a:r>
             <a:endParaRPr/>
           </a:p>
@@ -5932,7 +6749,7 @@
       </p:sp>
       <p:sp>
         <p:nvSpPr>
-          <p:cNvPr id="1133048120" name="Объект 2" hidden="0"/>
+          <p:cNvPr id="544118936" name="Объект 2" hidden="0"/>
           <p:cNvSpPr>
             <a:spLocks noGrp="1"/>
           </p:cNvSpPr>
@@ -5942,9 +6759,7 @@
         </p:nvSpPr>
         <p:spPr bwMode="auto"/>
         <p:txBody>
-          <a:bodyPr vertOverflow="overflow" horzOverflow="overflow" vert="horz" wrap="square" lIns="91440" tIns="45720" rIns="91440" bIns="45720" numCol="1" spcCol="0" rtlCol="0" fromWordArt="0" anchor="t" anchorCtr="0" forceAA="0" upright="0" compatLnSpc="0">
-            <a:normAutofit/>
-          </a:bodyPr>
+          <a:bodyPr/>
           <a:lstStyle/>
           <a:p>
             <a:pPr marL="0" indent="0">
@@ -5952,7 +6767,7 @@
               <a:buNone/>
               <a:defRPr/>
             </a:pPr>
-            <a:endParaRPr sz="2400" b="0" i="0" u="none" strike="noStrike" cap="none" spc="0">
+            <a:endParaRPr lang="bg-BG" sz="3200" b="0" i="0" u="none" strike="noStrike" cap="none" spc="0">
               <a:solidFill>
                 <a:schemeClr val="tx1">
                   <a:lumMod val="75000"/>
@@ -5968,7 +6783,7 @@
               <a:defRPr/>
             </a:pPr>
             <a:r>
-              <a:rPr lang="bg-BG" sz="2400" b="0" i="0" u="none" strike="noStrike" cap="none" spc="0">
+              <a:rPr lang="bg-BG" sz="3200" b="0" i="0" u="none" strike="noStrike" cap="none" spc="0">
                 <a:solidFill>
                   <a:schemeClr val="tx1">
                     <a:lumMod val="75000"/>
@@ -5978,9 +6793,9 @@
                 <a:latin typeface="Arial"/>
                 <a:cs typeface="Arial"/>
               </a:rPr>
-              <a:t>Objective of economic evaluation (e.g. reimbursement, standardisation of care)</a:t>
-            </a:r>
-            <a:endParaRPr sz="2400" b="0" i="0" u="none" strike="noStrike" cap="none" spc="0">
+              <a:t>Answerable research question (Use PICOT, include perspective, target group, and</a:t>
+            </a:r>
+            <a:endParaRPr lang="bg-BG" sz="3200" b="0" i="0" u="none" strike="noStrike" cap="none" spc="0">
               <a:solidFill>
                 <a:schemeClr val="tx1">
                   <a:lumMod val="75000"/>
@@ -5996,7 +6811,7 @@
               <a:defRPr/>
             </a:pPr>
             <a:r>
-              <a:rPr lang="bg-BG" sz="2400" b="0" i="0" u="none" strike="noStrike" cap="none" spc="0">
+              <a:rPr lang="bg-BG" sz="3200" b="0" i="0" u="none" strike="noStrike" cap="none" spc="0">
                 <a:solidFill>
                   <a:schemeClr val="tx1">
                     <a:lumMod val="75000"/>
@@ -6006,9 +6821,9 @@
                 <a:latin typeface="Arial"/>
                 <a:cs typeface="Arial"/>
               </a:rPr>
-              <a:t>Relevant audience(s); to whom will the results be of importance?</a:t>
-            </a:r>
-            <a:endParaRPr sz="2400" b="0" i="0" u="none" strike="noStrike" cap="none" spc="0">
+              <a:t>intervention and comparator, time horizon)</a:t>
+            </a:r>
+            <a:endParaRPr lang="bg-BG" sz="3200" b="0" i="0" u="none" strike="noStrike" cap="none" spc="0">
               <a:solidFill>
                 <a:schemeClr val="tx1">
                   <a:lumMod val="75000"/>
@@ -6024,7 +6839,7 @@
               <a:defRPr/>
             </a:pPr>
             <a:r>
-              <a:rPr lang="bg-BG" sz="2400" b="0" i="0" u="none" strike="noStrike" cap="none" spc="0">
+              <a:rPr lang="bg-BG" sz="3200" b="0" i="0" u="none" strike="noStrike" cap="none" spc="0">
                 <a:solidFill>
                   <a:schemeClr val="tx1">
                     <a:lumMod val="75000"/>
@@ -6034,168 +6849,9 @@
                 <a:latin typeface="Arial"/>
                 <a:cs typeface="Arial"/>
               </a:rPr>
-              <a:t>Time horizon and perspective</a:t>
-            </a:r>
-            <a:endParaRPr sz="2400" b="0" i="0" u="none" strike="noStrike" cap="none" spc="0">
-              <a:solidFill>
-                <a:schemeClr val="tx1">
-                  <a:lumMod val="75000"/>
-                  <a:lumOff val="25000"/>
-                </a:schemeClr>
-              </a:solidFill>
-              <a:latin typeface="Arial"/>
-              <a:cs typeface="Arial"/>
-            </a:endParaRPr>
-          </a:p>
-          <a:p>
-            <a:pPr>
-              <a:defRPr/>
-            </a:pPr>
-            <a:r>
-              <a:rPr lang="bg-BG" sz="2400" b="0" i="0" u="none" strike="noStrike" cap="none" spc="0">
-                <a:solidFill>
-                  <a:schemeClr val="tx1">
-                    <a:lumMod val="75000"/>
-                    <a:lumOff val="25000"/>
-                  </a:schemeClr>
-                </a:solidFill>
-                <a:latin typeface="Arial"/>
-                <a:cs typeface="Arial"/>
-              </a:rPr>
-              <a:t>Target group (in and exclusion criteria e.g. age, gender, disease severity, co-morbidities)</a:t>
-            </a:r>
-            <a:endParaRPr sz="2400" b="0" i="0" u="none" strike="noStrike" cap="none" spc="0">
-              <a:solidFill>
-                <a:schemeClr val="tx1">
-                  <a:lumMod val="75000"/>
-                  <a:lumOff val="25000"/>
-                </a:schemeClr>
-              </a:solidFill>
-              <a:latin typeface="Arial"/>
-              <a:cs typeface="Arial"/>
-            </a:endParaRPr>
-          </a:p>
-          <a:p>
-            <a:pPr>
-              <a:defRPr/>
-            </a:pPr>
-            <a:r>
-              <a:rPr lang="bg-BG" sz="2400" b="0" i="0" u="none" strike="noStrike" cap="none" spc="0">
-                <a:solidFill>
-                  <a:schemeClr val="tx1">
-                    <a:lumMod val="75000"/>
-                    <a:lumOff val="25000"/>
-                  </a:schemeClr>
-                </a:solidFill>
-                <a:latin typeface="Arial"/>
-                <a:cs typeface="Arial"/>
-              </a:rPr>
-              <a:t>Type of economic evaluation (CEA, CUA, and optional CMA, CBA)</a:t>
-            </a:r>
-            <a:endParaRPr sz="2400" b="0" i="0" u="none" strike="noStrike" cap="none" spc="0">
-              <a:solidFill>
-                <a:schemeClr val="tx1">
-                  <a:lumMod val="75000"/>
-                  <a:lumOff val="25000"/>
-                </a:schemeClr>
-              </a:solidFill>
-              <a:latin typeface="Arial"/>
-              <a:cs typeface="Arial"/>
-            </a:endParaRPr>
-          </a:p>
-          <a:p>
-            <a:pPr>
-              <a:defRPr/>
-            </a:pPr>
-            <a:r>
-              <a:rPr lang="bg-BG" sz="2400" b="0" i="0" u="none" strike="noStrike" cap="none" spc="0">
-                <a:solidFill>
-                  <a:schemeClr val="tx1">
-                    <a:lumMod val="75000"/>
-                    <a:lumOff val="25000"/>
-                  </a:schemeClr>
-                </a:solidFill>
-                <a:latin typeface="Arial"/>
-                <a:cs typeface="Arial"/>
-              </a:rPr>
-              <a:t>Definition of incremental cost-effectiveness ratio (ICER)</a:t>
-            </a:r>
-            <a:endParaRPr sz="2400" b="0" i="0" u="none" strike="noStrike" cap="none" spc="0">
-              <a:solidFill>
-                <a:schemeClr val="tx1">
-                  <a:lumMod val="75000"/>
-                  <a:lumOff val="25000"/>
-                </a:schemeClr>
-              </a:solidFill>
-              <a:latin typeface="Arial"/>
-              <a:cs typeface="Arial"/>
-            </a:endParaRPr>
-          </a:p>
-          <a:p>
-            <a:pPr>
-              <a:defRPr/>
-            </a:pPr>
-            <a:r>
-              <a:rPr lang="bg-BG" sz="2400" b="0" i="0" u="none" strike="noStrike" cap="none" spc="0">
-                <a:solidFill>
-                  <a:schemeClr val="tx1">
-                    <a:lumMod val="75000"/>
-                    <a:lumOff val="25000"/>
-                  </a:schemeClr>
-                </a:solidFill>
-                <a:latin typeface="Arial"/>
-                <a:cs typeface="Arial"/>
-              </a:rPr>
-              <a:t>Country and centres included (look at the relevant guidelines for that country)</a:t>
-            </a:r>
-            <a:endParaRPr sz="2400"/>
-          </a:p>
-          <a:p>
-            <a:pPr>
-              <a:defRPr/>
-            </a:pPr>
-            <a:r>
-              <a:rPr lang="bg-BG" sz="2400" b="0" i="0" u="none" strike="noStrike" cap="none" spc="0">
-                <a:solidFill>
-                  <a:schemeClr val="tx1">
-                    <a:lumMod val="75000"/>
-                    <a:lumOff val="25000"/>
-                  </a:schemeClr>
-                </a:solidFill>
-                <a:latin typeface="Arial"/>
-                <a:cs typeface="Arial"/>
-              </a:rPr>
-              <a:t>Analytical approach, i.e. TBEE/MBEE (and why) and specifics for the design</a:t>
-            </a:r>
-            <a:endParaRPr sz="2400" b="0" i="0" u="none" strike="noStrike" cap="none" spc="0">
-              <a:solidFill>
-                <a:schemeClr val="tx1">
-                  <a:lumMod val="75000"/>
-                  <a:lumOff val="25000"/>
-                </a:schemeClr>
-              </a:solidFill>
-              <a:latin typeface="Arial"/>
-              <a:cs typeface="Arial"/>
-            </a:endParaRPr>
-          </a:p>
-          <a:p>
-            <a:pPr>
-              <a:defRPr/>
-            </a:pPr>
-            <a:r>
-              <a:rPr lang="bg-BG" sz="2400" b="0" i="0" u="none" strike="noStrike" cap="none" spc="0">
-                <a:solidFill>
-                  <a:schemeClr val="tx1">
-                    <a:lumMod val="75000"/>
-                    <a:lumOff val="25000"/>
-                  </a:schemeClr>
-                </a:solidFill>
-                <a:latin typeface="Arial"/>
-                <a:cs typeface="Arial"/>
-              </a:rPr>
-              <a:t>Data sources and collection</a:t>
-            </a:r>
-            <a:endParaRPr sz="2400"/>
+              <a:t>Expected efficiency based on evidence (hypothesis)</a:t>
+            </a:r>
+            <a:endParaRPr/>
           </a:p>
         </p:txBody>
       </p:sp>
@@ -6234,7 +6890,7 @@
       </p:grpSpPr>
       <p:sp>
         <p:nvSpPr>
-          <p:cNvPr id="817312774" name="Заголовок 1" hidden="0"/>
+          <p:cNvPr id="1090714944" name="Заголовок 1" hidden="0"/>
           <p:cNvSpPr>
             <a:spLocks noGrp="1"/>
           </p:cNvSpPr>
@@ -6261,7 +6917,7 @@
                 <a:latin typeface="Arial"/>
                 <a:cs typeface="Arial"/>
               </a:rPr>
-              <a:t>Costs</a:t>
+              <a:t>Overall framing</a:t>
             </a:r>
             <a:endParaRPr/>
           </a:p>
@@ -6269,7 +6925,7 @@
       </p:sp>
       <p:sp>
         <p:nvSpPr>
-          <p:cNvPr id="1202703553" name="Объект 2" hidden="0"/>
+          <p:cNvPr id="1133048120" name="Объект 2" hidden="0"/>
           <p:cNvSpPr>
             <a:spLocks noGrp="1"/>
           </p:cNvSpPr>
@@ -6280,7 +6936,7 @@
         <p:spPr bwMode="auto"/>
         <p:txBody>
           <a:bodyPr vertOverflow="overflow" horzOverflow="overflow" vert="horz" wrap="square" lIns="91440" tIns="45720" rIns="91440" bIns="45720" numCol="1" spcCol="0" rtlCol="0" fromWordArt="0" anchor="t" anchorCtr="0" forceAA="0" upright="0" compatLnSpc="0">
-            <a:normAutofit fontScale="95000" lnSpcReduction="1000"/>
+            <a:normAutofit/>
           </a:bodyPr>
           <a:lstStyle/>
           <a:p>
@@ -6289,7 +6945,7 @@
               <a:buNone/>
               <a:defRPr/>
             </a:pPr>
-            <a:endParaRPr lang="bg-BG" sz="3200" b="0" i="0" u="none" strike="noStrike" cap="none" spc="0">
+            <a:endParaRPr sz="2400" b="0" i="0" u="none" strike="noStrike" cap="none" spc="0">
               <a:solidFill>
                 <a:schemeClr val="tx1">
                   <a:lumMod val="75000"/>
@@ -6305,7 +6961,7 @@
               <a:defRPr/>
             </a:pPr>
             <a:r>
-              <a:rPr lang="bg-BG" sz="3200" b="0" i="0" u="none" strike="noStrike" cap="none" spc="0">
+              <a:rPr lang="bg-BG" sz="2400" b="0" i="0" u="none" strike="noStrike" cap="none" spc="0">
                 <a:solidFill>
                   <a:schemeClr val="tx1">
                     <a:lumMod val="75000"/>
@@ -6315,9 +6971,9 @@
                 <a:latin typeface="Arial"/>
                 <a:cs typeface="Arial"/>
               </a:rPr>
-              <a:t>Identification of relevant cost categories (use a formal classification and societal perspective</a:t>
-            </a:r>
-            <a:endParaRPr lang="bg-BG" sz="3200" b="0" i="0" u="none" strike="noStrike" cap="none" spc="0">
+              <a:t>Objective of economic evaluation (e.g. reimbursement, standardisation of care)</a:t>
+            </a:r>
+            <a:endParaRPr sz="2400" b="0" i="0" u="none" strike="noStrike" cap="none" spc="0">
               <a:solidFill>
                 <a:schemeClr val="tx1">
                   <a:lumMod val="75000"/>
@@ -6333,7 +6989,7 @@
               <a:defRPr/>
             </a:pPr>
             <a:r>
-              <a:rPr lang="bg-BG" sz="3200" b="0" i="0" u="none" strike="noStrike" cap="none" spc="0">
+              <a:rPr lang="bg-BG" sz="2400" b="0" i="0" u="none" strike="noStrike" cap="none" spc="0">
                 <a:solidFill>
                   <a:schemeClr val="tx1">
                     <a:lumMod val="75000"/>
@@ -6343,9 +6999,9 @@
                 <a:latin typeface="Arial"/>
                 <a:cs typeface="Arial"/>
               </a:rPr>
-              <a:t>Instrument used for measurement of cost categories</a:t>
-            </a:r>
-            <a:endParaRPr lang="bg-BG" sz="3200" b="0" i="0" u="none" strike="noStrike" cap="none" spc="0">
+              <a:t>Relevant audience(s); to whom will the results be of importance?</a:t>
+            </a:r>
+            <a:endParaRPr sz="2400" b="0" i="0" u="none" strike="noStrike" cap="none" spc="0">
               <a:solidFill>
                 <a:schemeClr val="tx1">
                   <a:lumMod val="75000"/>
@@ -6361,7 +7017,7 @@
               <a:defRPr/>
             </a:pPr>
             <a:r>
-              <a:rPr lang="bg-BG" sz="3200" b="0" i="0" u="none" strike="noStrike" cap="none" spc="0">
+              <a:rPr lang="bg-BG" sz="2400" b="0" i="0" u="none" strike="noStrike" cap="none" spc="0">
                 <a:solidFill>
                   <a:schemeClr val="tx1">
                     <a:lumMod val="75000"/>
@@ -6371,9 +7027,9 @@
                 <a:latin typeface="Arial"/>
                 <a:cs typeface="Arial"/>
               </a:rPr>
-              <a:t>Valuation; sources for of cost prices (guidelines for costing)</a:t>
-            </a:r>
-            <a:endParaRPr lang="bg-BG" sz="3200" b="0" i="0" u="none" strike="noStrike" cap="none" spc="0">
+              <a:t>Time horizon and perspective</a:t>
+            </a:r>
+            <a:endParaRPr sz="2400" b="0" i="0" u="none" strike="noStrike" cap="none" spc="0">
               <a:solidFill>
                 <a:schemeClr val="tx1">
                   <a:lumMod val="75000"/>
@@ -6389,7 +7045,7 @@
               <a:defRPr/>
             </a:pPr>
             <a:r>
-              <a:rPr lang="bg-BG" sz="3200" b="0" i="0" u="none" strike="noStrike" cap="none" spc="0">
+              <a:rPr lang="bg-BG" sz="2400" b="0" i="0" u="none" strike="noStrike" cap="none" spc="0">
                 <a:solidFill>
                   <a:schemeClr val="tx1">
                     <a:lumMod val="75000"/>
@@ -6399,9 +7055,9 @@
                 <a:latin typeface="Arial"/>
                 <a:cs typeface="Arial"/>
               </a:rPr>
-              <a:t>Valuation; which method to use for paid work, unpaid work, informal care, etc.</a:t>
-            </a:r>
-            <a:endParaRPr lang="bg-BG" sz="3200" b="0" i="0" u="none" strike="noStrike" cap="none" spc="0">
+              <a:t>Target group (in and exclusion criteria e.g. age, gender, disease severity, co-morbidities)</a:t>
+            </a:r>
+            <a:endParaRPr sz="2400" b="0" i="0" u="none" strike="noStrike" cap="none" spc="0">
               <a:solidFill>
                 <a:schemeClr val="tx1">
                   <a:lumMod val="75000"/>
@@ -6417,7 +7073,7 @@
               <a:defRPr/>
             </a:pPr>
             <a:r>
-              <a:rPr lang="bg-BG" sz="3200" b="0" i="0" u="none" strike="noStrike" cap="none" spc="0">
+              <a:rPr lang="bg-BG" sz="2400" b="0" i="0" u="none" strike="noStrike" cap="none" spc="0">
                 <a:solidFill>
                   <a:schemeClr val="tx1">
                     <a:lumMod val="75000"/>
@@ -6427,9 +7083,9 @@
                 <a:latin typeface="Arial"/>
                 <a:cs typeface="Arial"/>
               </a:rPr>
-              <a:t>Chosen cost price year and why</a:t>
-            </a:r>
-            <a:endParaRPr lang="bg-BG" sz="3200" b="0" i="0" u="none" strike="noStrike" cap="none" spc="0">
+              <a:t>Type of economic evaluation (CEA, CUA, and optional CMA, CBA)</a:t>
+            </a:r>
+            <a:endParaRPr sz="2400" b="0" i="0" u="none" strike="noStrike" cap="none" spc="0">
               <a:solidFill>
                 <a:schemeClr val="tx1">
                   <a:lumMod val="75000"/>
@@ -6445,7 +7101,7 @@
               <a:defRPr/>
             </a:pPr>
             <a:r>
-              <a:rPr lang="bg-BG" sz="3200" b="0" i="0" u="none" strike="noStrike" cap="none" spc="0">
+              <a:rPr lang="bg-BG" sz="2400" b="0" i="0" u="none" strike="noStrike" cap="none" spc="0">
                 <a:solidFill>
                   <a:schemeClr val="tx1">
                     <a:lumMod val="75000"/>
@@ -6455,9 +7111,84 @@
                 <a:latin typeface="Arial"/>
                 <a:cs typeface="Arial"/>
               </a:rPr>
-              <a:t>Discounting, look at guidelines</a:t>
-            </a:r>
-            <a:endParaRPr/>
+              <a:t>Definition of incremental cost-effectiveness ratio (ICER)</a:t>
+            </a:r>
+            <a:endParaRPr sz="2400" b="0" i="0" u="none" strike="noStrike" cap="none" spc="0">
+              <a:solidFill>
+                <a:schemeClr val="tx1">
+                  <a:lumMod val="75000"/>
+                  <a:lumOff val="25000"/>
+                </a:schemeClr>
+              </a:solidFill>
+              <a:latin typeface="Arial"/>
+              <a:cs typeface="Arial"/>
+            </a:endParaRPr>
+          </a:p>
+          <a:p>
+            <a:pPr>
+              <a:defRPr/>
+            </a:pPr>
+            <a:r>
+              <a:rPr lang="bg-BG" sz="2400" b="0" i="0" u="none" strike="noStrike" cap="none" spc="0">
+                <a:solidFill>
+                  <a:schemeClr val="tx1">
+                    <a:lumMod val="75000"/>
+                    <a:lumOff val="25000"/>
+                  </a:schemeClr>
+                </a:solidFill>
+                <a:latin typeface="Arial"/>
+                <a:cs typeface="Arial"/>
+              </a:rPr>
+              <a:t>Country and centres included (look at the relevant guidelines for that country)</a:t>
+            </a:r>
+            <a:endParaRPr sz="2400"/>
+          </a:p>
+          <a:p>
+            <a:pPr>
+              <a:defRPr/>
+            </a:pPr>
+            <a:r>
+              <a:rPr lang="bg-BG" sz="2400" b="0" i="0" u="none" strike="noStrike" cap="none" spc="0">
+                <a:solidFill>
+                  <a:schemeClr val="tx1">
+                    <a:lumMod val="75000"/>
+                    <a:lumOff val="25000"/>
+                  </a:schemeClr>
+                </a:solidFill>
+                <a:latin typeface="Arial"/>
+                <a:cs typeface="Arial"/>
+              </a:rPr>
+              <a:t>Analytical approach, i.e. TBEE/MBEE (and why) and specifics for the design</a:t>
+            </a:r>
+            <a:endParaRPr sz="2400" b="0" i="0" u="none" strike="noStrike" cap="none" spc="0">
+              <a:solidFill>
+                <a:schemeClr val="tx1">
+                  <a:lumMod val="75000"/>
+                  <a:lumOff val="25000"/>
+                </a:schemeClr>
+              </a:solidFill>
+              <a:latin typeface="Arial"/>
+              <a:cs typeface="Arial"/>
+            </a:endParaRPr>
+          </a:p>
+          <a:p>
+            <a:pPr>
+              <a:defRPr/>
+            </a:pPr>
+            <a:r>
+              <a:rPr lang="bg-BG" sz="2400" b="0" i="0" u="none" strike="noStrike" cap="none" spc="0">
+                <a:solidFill>
+                  <a:schemeClr val="tx1">
+                    <a:lumMod val="75000"/>
+                    <a:lumOff val="25000"/>
+                  </a:schemeClr>
+                </a:solidFill>
+                <a:latin typeface="Arial"/>
+                <a:cs typeface="Arial"/>
+              </a:rPr>
+              <a:t>Data sources and collection</a:t>
+            </a:r>
+            <a:endParaRPr sz="2400"/>
           </a:p>
         </p:txBody>
       </p:sp>
@@ -6496,7 +7227,7 @@
       </p:grpSpPr>
       <p:sp>
         <p:nvSpPr>
-          <p:cNvPr id="2137994161" name="Заголовок 1" hidden="0"/>
+          <p:cNvPr id="817312774" name="Заголовок 1" hidden="0"/>
           <p:cNvSpPr>
             <a:spLocks noGrp="1"/>
           </p:cNvSpPr>
@@ -6523,7 +7254,7 @@
                 <a:latin typeface="Arial"/>
                 <a:cs typeface="Arial"/>
               </a:rPr>
-              <a:t> Outcome measurement</a:t>
+              <a:t>Costs</a:t>
             </a:r>
             <a:endParaRPr/>
           </a:p>
@@ -6531,7 +7262,7 @@
       </p:sp>
       <p:sp>
         <p:nvSpPr>
-          <p:cNvPr id="726372431" name="Объект 2" hidden="0"/>
+          <p:cNvPr id="1202703553" name="Объект 2" hidden="0"/>
           <p:cNvSpPr>
             <a:spLocks noGrp="1"/>
           </p:cNvSpPr>
@@ -6541,7 +7272,9 @@
         </p:nvSpPr>
         <p:spPr bwMode="auto"/>
         <p:txBody>
-          <a:bodyPr/>
+          <a:bodyPr vertOverflow="overflow" horzOverflow="overflow" vert="horz" wrap="square" lIns="91440" tIns="45720" rIns="91440" bIns="45720" numCol="1" spcCol="0" rtlCol="0" fromWordArt="0" anchor="t" anchorCtr="0" forceAA="0" upright="0" compatLnSpc="0">
+            <a:normAutofit fontScale="95000" lnSpcReduction="1000"/>
+          </a:bodyPr>
           <a:lstStyle/>
           <a:p>
             <a:pPr marL="0" indent="0">
@@ -6575,7 +7308,7 @@
                 <a:latin typeface="Arial"/>
                 <a:cs typeface="Arial"/>
               </a:rPr>
-              <a:t>Primary and secondary outcomes</a:t>
+              <a:t>Identification of relevant cost categories (use a formal classification and societal perspective</a:t>
             </a:r>
             <a:endParaRPr lang="bg-BG" sz="3200" b="0" i="0" u="none" strike="noStrike" cap="none" spc="0">
               <a:solidFill>
@@ -6603,7 +7336,7 @@
                 <a:latin typeface="Arial"/>
                 <a:cs typeface="Arial"/>
               </a:rPr>
-              <a:t>Selected outcomes for effectiveness and utilities, and why</a:t>
+              <a:t>Instrument used for measurement of cost categories</a:t>
             </a:r>
             <a:endParaRPr lang="bg-BG" sz="3200" b="0" i="0" u="none" strike="noStrike" cap="none" spc="0">
               <a:solidFill>
@@ -6631,7 +7364,7 @@
                 <a:latin typeface="Arial"/>
                 <a:cs typeface="Arial"/>
               </a:rPr>
-              <a:t>Instruments used for outcomes, and why</a:t>
+              <a:t>Valuation; sources for of cost prices (guidelines for costing)</a:t>
             </a:r>
             <a:endParaRPr lang="bg-BG" sz="3200" b="0" i="0" u="none" strike="noStrike" cap="none" spc="0">
               <a:solidFill>
@@ -6659,7 +7392,63 @@
                 <a:latin typeface="Arial"/>
                 <a:cs typeface="Arial"/>
               </a:rPr>
-              <a:t>Valuation method to derive utilities (instruments, population)</a:t>
+              <a:t>Valuation; which method to use for paid work, unpaid work, informal care, etc.</a:t>
+            </a:r>
+            <a:endParaRPr lang="bg-BG" sz="3200" b="0" i="0" u="none" strike="noStrike" cap="none" spc="0">
+              <a:solidFill>
+                <a:schemeClr val="tx1">
+                  <a:lumMod val="75000"/>
+                  <a:lumOff val="25000"/>
+                </a:schemeClr>
+              </a:solidFill>
+              <a:latin typeface="Arial"/>
+              <a:cs typeface="Arial"/>
+            </a:endParaRPr>
+          </a:p>
+          <a:p>
+            <a:pPr>
+              <a:defRPr/>
+            </a:pPr>
+            <a:r>
+              <a:rPr lang="bg-BG" sz="3200" b="0" i="0" u="none" strike="noStrike" cap="none" spc="0">
+                <a:solidFill>
+                  <a:schemeClr val="tx1">
+                    <a:lumMod val="75000"/>
+                    <a:lumOff val="25000"/>
+                  </a:schemeClr>
+                </a:solidFill>
+                <a:latin typeface="Arial"/>
+                <a:cs typeface="Arial"/>
+              </a:rPr>
+              <a:t>Chosen cost price year and why</a:t>
+            </a:r>
+            <a:endParaRPr lang="bg-BG" sz="3200" b="0" i="0" u="none" strike="noStrike" cap="none" spc="0">
+              <a:solidFill>
+                <a:schemeClr val="tx1">
+                  <a:lumMod val="75000"/>
+                  <a:lumOff val="25000"/>
+                </a:schemeClr>
+              </a:solidFill>
+              <a:latin typeface="Arial"/>
+              <a:cs typeface="Arial"/>
+            </a:endParaRPr>
+          </a:p>
+          <a:p>
+            <a:pPr>
+              <a:defRPr/>
+            </a:pPr>
+            <a:r>
+              <a:rPr lang="bg-BG" sz="3200" b="0" i="0" u="none" strike="noStrike" cap="none" spc="0">
+                <a:solidFill>
+                  <a:schemeClr val="tx1">
+                    <a:lumMod val="75000"/>
+                    <a:lumOff val="25000"/>
+                  </a:schemeClr>
+                </a:solidFill>
+                <a:latin typeface="Arial"/>
+                <a:cs typeface="Arial"/>
+              </a:rPr>
+              <a:t>Discounting, look at guidelines</a:t>
             </a:r>
             <a:endParaRPr/>
           </a:p>
@@ -6700,7 +7489,7 @@
       </p:grpSpPr>
       <p:sp>
         <p:nvSpPr>
-          <p:cNvPr id="1831208734" name="Заголовок 1" hidden="0"/>
+          <p:cNvPr id="2137994161" name="Заголовок 1" hidden="0"/>
           <p:cNvSpPr>
             <a:spLocks noGrp="1"/>
           </p:cNvSpPr>
@@ -6727,7 +7516,7 @@
                 <a:latin typeface="Arial"/>
                 <a:cs typeface="Arial"/>
               </a:rPr>
-              <a:t>Synthesising costs and effects</a:t>
+              <a:t> Outcome measurement</a:t>
             </a:r>
             <a:endParaRPr/>
           </a:p>
@@ -6735,7 +7524,7 @@
       </p:sp>
       <p:sp>
         <p:nvSpPr>
-          <p:cNvPr id="1155402581" name="Объект 2" hidden="0"/>
+          <p:cNvPr id="726372431" name="Объект 2" hidden="0"/>
           <p:cNvSpPr>
             <a:spLocks noGrp="1"/>
           </p:cNvSpPr>
@@ -6779,7 +7568,7 @@
                 <a:latin typeface="Arial"/>
                 <a:cs typeface="Arial"/>
               </a:rPr>
-              <a:t>Calculation of ICER/ICUR</a:t>
+              <a:t>Primary and secondary outcomes</a:t>
             </a:r>
             <a:endParaRPr lang="bg-BG" sz="3200" b="0" i="0" u="none" strike="noStrike" cap="none" spc="0">
               <a:solidFill>
@@ -6807,7 +7596,63 @@
                 <a:latin typeface="Arial"/>
                 <a:cs typeface="Arial"/>
               </a:rPr>
-              <a:t>Interpretation of ICER; what does it mean, comparable studies</a:t>
+              <a:t>Selected outcomes for effectiveness and utilities, and why</a:t>
+            </a:r>
+            <a:endParaRPr lang="bg-BG" sz="3200" b="0" i="0" u="none" strike="noStrike" cap="none" spc="0">
+              <a:solidFill>
+                <a:schemeClr val="tx1">
+                  <a:lumMod val="75000"/>
+                  <a:lumOff val="25000"/>
+                </a:schemeClr>
+              </a:solidFill>
+              <a:latin typeface="Arial"/>
+              <a:cs typeface="Arial"/>
+            </a:endParaRPr>
+          </a:p>
+          <a:p>
+            <a:pPr>
+              <a:defRPr/>
+            </a:pPr>
+            <a:r>
+              <a:rPr lang="bg-BG" sz="3200" b="0" i="0" u="none" strike="noStrike" cap="none" spc="0">
+                <a:solidFill>
+                  <a:schemeClr val="tx1">
+                    <a:lumMod val="75000"/>
+                    <a:lumOff val="25000"/>
+                  </a:schemeClr>
+                </a:solidFill>
+                <a:latin typeface="Arial"/>
+                <a:cs typeface="Arial"/>
+              </a:rPr>
+              <a:t>Instruments used for outcomes, and why</a:t>
+            </a:r>
+            <a:endParaRPr lang="bg-BG" sz="3200" b="0" i="0" u="none" strike="noStrike" cap="none" spc="0">
+              <a:solidFill>
+                <a:schemeClr val="tx1">
+                  <a:lumMod val="75000"/>
+                  <a:lumOff val="25000"/>
+                </a:schemeClr>
+              </a:solidFill>
+              <a:latin typeface="Arial"/>
+              <a:cs typeface="Arial"/>
+            </a:endParaRPr>
+          </a:p>
+          <a:p>
+            <a:pPr>
+              <a:defRPr/>
+            </a:pPr>
+            <a:r>
+              <a:rPr lang="bg-BG" sz="3200" b="0" i="0" u="none" strike="noStrike" cap="none" spc="0">
+                <a:solidFill>
+                  <a:schemeClr val="tx1">
+                    <a:lumMod val="75000"/>
+                    <a:lumOff val="25000"/>
+                  </a:schemeClr>
+                </a:solidFill>
+                <a:latin typeface="Arial"/>
+                <a:cs typeface="Arial"/>
+              </a:rPr>
+              <a:t>Valuation method to derive utilities (instruments, population)</a:t>
             </a:r>
             <a:endParaRPr/>
           </a:p>

</xml_diff>

<commit_message>
modified:   README.md 	modified:   group_assigment/group_assigment.pptx 	modified:   lectures/07.md 	deleted:    lectures/08.md
</commit_message>
<xml_diff>
--- a/group_assigment/group_assigment.pptx
+++ b/group_assigment/group_assigment.pptx
@@ -6484,8 +6484,8 @@
         </p:blipFill>
         <p:spPr bwMode="auto">
           <a:xfrm rot="0" flipH="0" flipV="0">
-            <a:off x="592499" y="1325657"/>
-            <a:ext cx="10863167" cy="4579842"/>
+            <a:off x="592498" y="1325656"/>
+            <a:ext cx="10863166" cy="4357054"/>
           </a:xfrm>
           <a:prstGeom prst="rect">
             <a:avLst/>

</xml_diff>